<commit_message>
Progress on BA</SAM ppt
 Changes to be committed:
	modified:   Flip Presentations/NGS_Intro/BAM_CIGAR/BAM_CIGAR.pptx
</commit_message>
<xml_diff>
--- a/Flip Presentations/NGS_Intro/BAM_CIGAR/BAM_CIGAR.pptx
+++ b/Flip Presentations/NGS_Intro/BAM_CIGAR/BAM_CIGAR.pptx
@@ -6,26 +6,27 @@
     <p:sldMasterId id="2147483660" r:id="rId2"/>
   </p:sldMasterIdLst>
   <p:notesMasterIdLst>
-    <p:notesMasterId r:id="rId20"/>
+    <p:notesMasterId r:id="rId21"/>
   </p:notesMasterIdLst>
   <p:sldIdLst>
     <p:sldId id="290" r:id="rId3"/>
-    <p:sldId id="256" r:id="rId4"/>
-    <p:sldId id="258" r:id="rId5"/>
-    <p:sldId id="276" r:id="rId6"/>
-    <p:sldId id="277" r:id="rId7"/>
-    <p:sldId id="278" r:id="rId8"/>
-    <p:sldId id="281" r:id="rId9"/>
-    <p:sldId id="287" r:id="rId10"/>
-    <p:sldId id="286" r:id="rId11"/>
-    <p:sldId id="283" r:id="rId12"/>
-    <p:sldId id="288" r:id="rId13"/>
-    <p:sldId id="279" r:id="rId14"/>
-    <p:sldId id="280" r:id="rId15"/>
-    <p:sldId id="282" r:id="rId16"/>
-    <p:sldId id="284" r:id="rId17"/>
-    <p:sldId id="285" r:id="rId18"/>
-    <p:sldId id="289" r:id="rId19"/>
+    <p:sldId id="291" r:id="rId4"/>
+    <p:sldId id="256" r:id="rId5"/>
+    <p:sldId id="258" r:id="rId6"/>
+    <p:sldId id="276" r:id="rId7"/>
+    <p:sldId id="277" r:id="rId8"/>
+    <p:sldId id="278" r:id="rId9"/>
+    <p:sldId id="281" r:id="rId10"/>
+    <p:sldId id="287" r:id="rId11"/>
+    <p:sldId id="286" r:id="rId12"/>
+    <p:sldId id="283" r:id="rId13"/>
+    <p:sldId id="288" r:id="rId14"/>
+    <p:sldId id="279" r:id="rId15"/>
+    <p:sldId id="280" r:id="rId16"/>
+    <p:sldId id="282" r:id="rId17"/>
+    <p:sldId id="284" r:id="rId18"/>
+    <p:sldId id="285" r:id="rId19"/>
+    <p:sldId id="289" r:id="rId20"/>
   </p:sldIdLst>
   <p:sldSz cx="12192000" cy="6858000"/>
   <p:notesSz cx="6858000" cy="9144000"/>
@@ -218,7 +219,7 @@
           <a:p>
             <a:fld id="{A1A0514D-38CC-49F5-A912-2794DAAF3AC3}" type="datetimeFigureOut">
               <a:rPr lang="en-GB" smtClean="0"/>
-              <a:t>2017-12-26</a:t>
+              <a:t>2017-12-28</a:t>
             </a:fld>
             <a:endParaRPr lang="en-GB"/>
           </a:p>
@@ -901,7 +902,7 @@
           <a:p>
             <a:fld id="{783B116A-7CF9-49FA-B73A-46949A776ECC}" type="slidenum">
               <a:rPr lang="en-GB" smtClean="0"/>
-              <a:t>2</a:t>
+              <a:t>3</a:t>
             </a:fld>
             <a:endParaRPr lang="en-GB"/>
           </a:p>
@@ -1084,7 +1085,7 @@
           <a:p>
             <a:fld id="{783B116A-7CF9-49FA-B73A-46949A776ECC}" type="slidenum">
               <a:rPr lang="en-GB" smtClean="0"/>
-              <a:t>3</a:t>
+              <a:t>4</a:t>
             </a:fld>
             <a:endParaRPr lang="en-GB"/>
           </a:p>
@@ -1305,7 +1306,7 @@
           <a:p>
             <a:fld id="{783B116A-7CF9-49FA-B73A-46949A776ECC}" type="slidenum">
               <a:rPr lang="en-GB" smtClean="0"/>
-              <a:t>4</a:t>
+              <a:t>5</a:t>
             </a:fld>
             <a:endParaRPr lang="en-GB"/>
           </a:p>
@@ -1450,7 +1451,7 @@
           <a:p>
             <a:fld id="{783B116A-7CF9-49FA-B73A-46949A776ECC}" type="slidenum">
               <a:rPr lang="en-GB" smtClean="0"/>
-              <a:t>5</a:t>
+              <a:t>6</a:t>
             </a:fld>
             <a:endParaRPr lang="en-GB"/>
           </a:p>
@@ -1618,7 +1619,7 @@
           <a:p>
             <a:fld id="{AEC09C50-853A-420B-8C26-7439C86401C0}" type="datetimeFigureOut">
               <a:rPr lang="en-GB" smtClean="0"/>
-              <a:t>2017-12-26</a:t>
+              <a:t>2017-12-28</a:t>
             </a:fld>
             <a:endParaRPr lang="en-GB"/>
           </a:p>
@@ -1818,7 +1819,7 @@
           <a:p>
             <a:fld id="{AEC09C50-853A-420B-8C26-7439C86401C0}" type="datetimeFigureOut">
               <a:rPr lang="en-GB" smtClean="0"/>
-              <a:t>2017-12-26</a:t>
+              <a:t>2017-12-28</a:t>
             </a:fld>
             <a:endParaRPr lang="en-GB"/>
           </a:p>
@@ -2028,7 +2029,7 @@
           <a:p>
             <a:fld id="{AEC09C50-853A-420B-8C26-7439C86401C0}" type="datetimeFigureOut">
               <a:rPr lang="en-GB" smtClean="0"/>
-              <a:t>2017-12-26</a:t>
+              <a:t>2017-12-28</a:t>
             </a:fld>
             <a:endParaRPr lang="en-GB"/>
           </a:p>
@@ -2282,7 +2283,7 @@
           <a:p>
             <a:fld id="{BB2556DB-1519-40E4-AF1C-F909855EDD97}" type="datetimeFigureOut">
               <a:rPr lang="en-GB" smtClean="0"/>
-              <a:t>2017-12-26</a:t>
+              <a:t>2017-12-28</a:t>
             </a:fld>
             <a:endParaRPr lang="en-GB"/>
           </a:p>
@@ -2452,7 +2453,7 @@
           <a:p>
             <a:fld id="{BB2556DB-1519-40E4-AF1C-F909855EDD97}" type="datetimeFigureOut">
               <a:rPr lang="en-GB" smtClean="0"/>
-              <a:t>2017-12-26</a:t>
+              <a:t>2017-12-28</a:t>
             </a:fld>
             <a:endParaRPr lang="en-GB"/>
           </a:p>
@@ -2698,7 +2699,7 @@
           <a:p>
             <a:fld id="{BB2556DB-1519-40E4-AF1C-F909855EDD97}" type="datetimeFigureOut">
               <a:rPr lang="en-GB" smtClean="0"/>
-              <a:t>2017-12-26</a:t>
+              <a:t>2017-12-28</a:t>
             </a:fld>
             <a:endParaRPr lang="en-GB"/>
           </a:p>
@@ -2986,7 +2987,7 @@
           <a:p>
             <a:fld id="{BB2556DB-1519-40E4-AF1C-F909855EDD97}" type="datetimeFigureOut">
               <a:rPr lang="en-GB" smtClean="0"/>
-              <a:t>2017-12-26</a:t>
+              <a:t>2017-12-28</a:t>
             </a:fld>
             <a:endParaRPr lang="en-GB"/>
           </a:p>
@@ -3408,7 +3409,7 @@
           <a:p>
             <a:fld id="{BB2556DB-1519-40E4-AF1C-F909855EDD97}" type="datetimeFigureOut">
               <a:rPr lang="en-GB" smtClean="0"/>
-              <a:t>2017-12-26</a:t>
+              <a:t>2017-12-28</a:t>
             </a:fld>
             <a:endParaRPr lang="en-GB"/>
           </a:p>
@@ -3526,7 +3527,7 @@
           <a:p>
             <a:fld id="{BB2556DB-1519-40E4-AF1C-F909855EDD97}" type="datetimeFigureOut">
               <a:rPr lang="en-GB" smtClean="0"/>
-              <a:t>2017-12-26</a:t>
+              <a:t>2017-12-28</a:t>
             </a:fld>
             <a:endParaRPr lang="en-GB"/>
           </a:p>
@@ -3621,7 +3622,7 @@
           <a:p>
             <a:fld id="{BB2556DB-1519-40E4-AF1C-F909855EDD97}" type="datetimeFigureOut">
               <a:rPr lang="en-GB" smtClean="0"/>
-              <a:t>2017-12-26</a:t>
+              <a:t>2017-12-28</a:t>
             </a:fld>
             <a:endParaRPr lang="en-GB"/>
           </a:p>
@@ -3898,7 +3899,7 @@
           <a:p>
             <a:fld id="{BB2556DB-1519-40E4-AF1C-F909855EDD97}" type="datetimeFigureOut">
               <a:rPr lang="en-GB" smtClean="0"/>
-              <a:t>2017-12-26</a:t>
+              <a:t>2017-12-28</a:t>
             </a:fld>
             <a:endParaRPr lang="en-GB"/>
           </a:p>
@@ -4086,7 +4087,7 @@
           <a:p>
             <a:fld id="{AEC09C50-853A-420B-8C26-7439C86401C0}" type="datetimeFigureOut">
               <a:rPr lang="en-GB" smtClean="0"/>
-              <a:t>2017-12-26</a:t>
+              <a:t>2017-12-28</a:t>
             </a:fld>
             <a:endParaRPr lang="en-GB"/>
           </a:p>
@@ -4351,7 +4352,7 @@
           <a:p>
             <a:fld id="{BB2556DB-1519-40E4-AF1C-F909855EDD97}" type="datetimeFigureOut">
               <a:rPr lang="en-GB" smtClean="0"/>
-              <a:t>2017-12-26</a:t>
+              <a:t>2017-12-28</a:t>
             </a:fld>
             <a:endParaRPr lang="en-GB"/>
           </a:p>
@@ -4521,7 +4522,7 @@
           <a:p>
             <a:fld id="{BB2556DB-1519-40E4-AF1C-F909855EDD97}" type="datetimeFigureOut">
               <a:rPr lang="en-GB" smtClean="0"/>
-              <a:t>2017-12-26</a:t>
+              <a:t>2017-12-28</a:t>
             </a:fld>
             <a:endParaRPr lang="en-GB"/>
           </a:p>
@@ -4701,7 +4702,7 @@
           <a:p>
             <a:fld id="{BB2556DB-1519-40E4-AF1C-F909855EDD97}" type="datetimeFigureOut">
               <a:rPr lang="en-GB" smtClean="0"/>
-              <a:t>2017-12-26</a:t>
+              <a:t>2017-12-28</a:t>
             </a:fld>
             <a:endParaRPr lang="en-GB"/>
           </a:p>
@@ -4819,7 +4820,7 @@
           <a:p>
             <a:fld id="{BB2556DB-1519-40E4-AF1C-F909855EDD97}" type="datetimeFigureOut">
               <a:rPr lang="en-GB" smtClean="0"/>
-              <a:t>2017-12-26</a:t>
+              <a:t>2017-12-28</a:t>
             </a:fld>
             <a:endParaRPr lang="en-GB"/>
           </a:p>
@@ -5083,7 +5084,7 @@
           <a:p>
             <a:fld id="{AEC09C50-853A-420B-8C26-7439C86401C0}" type="datetimeFigureOut">
               <a:rPr lang="en-GB" smtClean="0"/>
-              <a:t>2017-12-26</a:t>
+              <a:t>2017-12-28</a:t>
             </a:fld>
             <a:endParaRPr lang="en-GB"/>
           </a:p>
@@ -5351,7 +5352,7 @@
           <a:p>
             <a:fld id="{AEC09C50-853A-420B-8C26-7439C86401C0}" type="datetimeFigureOut">
               <a:rPr lang="en-GB" smtClean="0"/>
-              <a:t>2017-12-26</a:t>
+              <a:t>2017-12-28</a:t>
             </a:fld>
             <a:endParaRPr lang="en-GB"/>
           </a:p>
@@ -5766,7 +5767,7 @@
           <a:p>
             <a:fld id="{AEC09C50-853A-420B-8C26-7439C86401C0}" type="datetimeFigureOut">
               <a:rPr lang="en-GB" smtClean="0"/>
-              <a:t>2017-12-26</a:t>
+              <a:t>2017-12-28</a:t>
             </a:fld>
             <a:endParaRPr lang="en-GB"/>
           </a:p>
@@ -5908,7 +5909,7 @@
           <a:p>
             <a:fld id="{AEC09C50-853A-420B-8C26-7439C86401C0}" type="datetimeFigureOut">
               <a:rPr lang="en-GB" smtClean="0"/>
-              <a:t>2017-12-26</a:t>
+              <a:t>2017-12-28</a:t>
             </a:fld>
             <a:endParaRPr lang="en-GB"/>
           </a:p>
@@ -6021,7 +6022,7 @@
           <a:p>
             <a:fld id="{AEC09C50-853A-420B-8C26-7439C86401C0}" type="datetimeFigureOut">
               <a:rPr lang="en-GB" smtClean="0"/>
-              <a:t>2017-12-26</a:t>
+              <a:t>2017-12-28</a:t>
             </a:fld>
             <a:endParaRPr lang="en-GB"/>
           </a:p>
@@ -6334,7 +6335,7 @@
           <a:p>
             <a:fld id="{AEC09C50-853A-420B-8C26-7439C86401C0}" type="datetimeFigureOut">
               <a:rPr lang="en-GB" smtClean="0"/>
-              <a:t>2017-12-26</a:t>
+              <a:t>2017-12-28</a:t>
             </a:fld>
             <a:endParaRPr lang="en-GB"/>
           </a:p>
@@ -6623,7 +6624,7 @@
           <a:p>
             <a:fld id="{AEC09C50-853A-420B-8C26-7439C86401C0}" type="datetimeFigureOut">
               <a:rPr lang="en-GB" smtClean="0"/>
-              <a:t>2017-12-26</a:t>
+              <a:t>2017-12-28</a:t>
             </a:fld>
             <a:endParaRPr lang="en-GB"/>
           </a:p>
@@ -6866,7 +6867,7 @@
           <a:p>
             <a:fld id="{AEC09C50-853A-420B-8C26-7439C86401C0}" type="datetimeFigureOut">
               <a:rPr lang="en-GB" smtClean="0"/>
-              <a:t>2017-12-26</a:t>
+              <a:t>2017-12-28</a:t>
             </a:fld>
             <a:endParaRPr lang="en-GB"/>
           </a:p>
@@ -7418,7 +7419,7 @@
           <a:p>
             <a:fld id="{BB2556DB-1519-40E4-AF1C-F909855EDD97}" type="datetimeFigureOut">
               <a:rPr lang="en-GB" smtClean="0"/>
-              <a:t>2017-12-26</a:t>
+              <a:t>2017-12-28</a:t>
             </a:fld>
             <a:endParaRPr lang="en-GB"/>
           </a:p>
@@ -7884,6 +7885,1488 @@
 </file>
 
 <file path=ppt/slides/slide10.xml><?xml version="1.0" encoding="utf-8"?>
+<p:sld xmlns:a="http://schemas.openxmlformats.org/drawingml/2006/main" xmlns:r="http://schemas.openxmlformats.org/officeDocument/2006/relationships" xmlns:p="http://schemas.openxmlformats.org/presentationml/2006/main">
+  <p:cSld>
+    <p:spTree>
+      <p:nvGrpSpPr>
+        <p:cNvPr id="1" name=""/>
+        <p:cNvGrpSpPr/>
+        <p:nvPr/>
+      </p:nvGrpSpPr>
+      <p:grpSpPr>
+        <a:xfrm>
+          <a:off x="0" y="0"/>
+          <a:ext cx="0" cy="0"/>
+          <a:chOff x="0" y="0"/>
+          <a:chExt cx="0" cy="0"/>
+        </a:xfrm>
+      </p:grpSpPr>
+      <p:sp>
+        <p:nvSpPr>
+          <p:cNvPr id="14" name="TextBox 13">
+            <a:extLst>
+              <a:ext uri="{FF2B5EF4-FFF2-40B4-BE49-F238E27FC236}">
+                <a16:creationId xmlns:a16="http://schemas.microsoft.com/office/drawing/2014/main" xmlns="" id="{FDE44C33-EA15-4D14-8324-71F27282442F}"/>
+              </a:ext>
+            </a:extLst>
+          </p:cNvPr>
+          <p:cNvSpPr txBox="1"/>
+          <p:nvPr/>
+        </p:nvSpPr>
+        <p:spPr>
+          <a:xfrm>
+            <a:off x="3037110" y="-6111"/>
+            <a:ext cx="6075106" cy="644235"/>
+          </a:xfrm>
+          <a:prstGeom prst="rect">
+            <a:avLst/>
+          </a:prstGeom>
+          <a:solidFill>
+            <a:schemeClr val="bg1"/>
+          </a:solidFill>
+        </p:spPr>
+        <p:txBody>
+          <a:bodyPr wrap="square" rtlCol="0" anchor="ctr">
+            <a:spAutoFit/>
+          </a:bodyPr>
+          <a:lstStyle/>
+          <a:p>
+            <a:r>
+              <a:rPr lang="en-GB" sz="3600" b="1" u="sng" dirty="0">
+                <a:solidFill>
+                  <a:srgbClr val="FF0000"/>
+                </a:solidFill>
+                <a:highlight>
+                  <a:srgbClr val="FFFF00"/>
+                </a:highlight>
+                <a:latin typeface="Courier New" panose="02070309020205020404" pitchFamily="49" charset="0"/>
+                <a:cs typeface="Courier New" panose="02070309020205020404" pitchFamily="49" charset="0"/>
+                <a:hlinkClick r:id="rId2"/>
+              </a:rPr>
+              <a:t>FASTQ Sequence format</a:t>
+            </a:r>
+            <a:endParaRPr lang="en-GB" sz="3600" b="1" u="sng" dirty="0">
+              <a:solidFill>
+                <a:srgbClr val="FF0000"/>
+              </a:solidFill>
+              <a:highlight>
+                <a:srgbClr val="FFFF00"/>
+              </a:highlight>
+              <a:latin typeface="Courier New" panose="02070309020205020404" pitchFamily="49" charset="0"/>
+              <a:cs typeface="Courier New" panose="02070309020205020404" pitchFamily="49" charset="0"/>
+            </a:endParaRPr>
+          </a:p>
+        </p:txBody>
+      </p:sp>
+      <p:sp>
+        <p:nvSpPr>
+          <p:cNvPr id="4" name="TextBox 3">
+            <a:extLst>
+              <a:ext uri="{FF2B5EF4-FFF2-40B4-BE49-F238E27FC236}">
+                <a16:creationId xmlns:a16="http://schemas.microsoft.com/office/drawing/2014/main" xmlns="" id="{438442CF-1B82-4A10-87A1-614331CA498E}"/>
+              </a:ext>
+            </a:extLst>
+          </p:cNvPr>
+          <p:cNvSpPr txBox="1"/>
+          <p:nvPr/>
+        </p:nvSpPr>
+        <p:spPr>
+          <a:xfrm>
+            <a:off x="1019114" y="1291702"/>
+            <a:ext cx="10153772" cy="400110"/>
+          </a:xfrm>
+          <a:prstGeom prst="rect">
+            <a:avLst/>
+          </a:prstGeom>
+          <a:solidFill>
+            <a:schemeClr val="accent2">
+              <a:lumMod val="40000"/>
+              <a:lumOff val="60000"/>
+            </a:schemeClr>
+          </a:solidFill>
+        </p:spPr>
+        <p:txBody>
+          <a:bodyPr wrap="square" rtlCol="0">
+            <a:spAutoFit/>
+          </a:bodyPr>
+          <a:lstStyle/>
+          <a:p>
+            <a:r>
+              <a:rPr lang="en-GB" sz="2000" dirty="0" smtClean="0">
+                <a:latin typeface="Times New Roman" panose="02020603050405020304" pitchFamily="18" charset="0"/>
+                <a:cs typeface="Times New Roman" panose="02020603050405020304" pitchFamily="18" charset="0"/>
+              </a:rPr>
+              <a:t>The </a:t>
+            </a:r>
+            <a:r>
+              <a:rPr lang="en-GB" sz="2000" b="1" dirty="0" smtClean="0">
+                <a:latin typeface="Times New Roman" panose="02020603050405020304" pitchFamily="18" charset="0"/>
+                <a:cs typeface="Times New Roman" panose="02020603050405020304" pitchFamily="18" charset="0"/>
+              </a:rPr>
+              <a:t>Base Quality Scores </a:t>
+            </a:r>
+            <a:r>
+              <a:rPr lang="en-GB" sz="2000" dirty="0" smtClean="0">
+                <a:latin typeface="Times New Roman" panose="02020603050405020304" pitchFamily="18" charset="0"/>
+                <a:cs typeface="Times New Roman" panose="02020603050405020304" pitchFamily="18" charset="0"/>
+              </a:rPr>
+              <a:t>in </a:t>
+            </a:r>
+            <a:r>
+              <a:rPr lang="en-GB" sz="2000" b="1" dirty="0" smtClean="0">
+                <a:latin typeface="Times New Roman" panose="02020603050405020304" pitchFamily="18" charset="0"/>
+                <a:cs typeface="Times New Roman" panose="02020603050405020304" pitchFamily="18" charset="0"/>
+              </a:rPr>
+              <a:t>FASTQ</a:t>
+            </a:r>
+            <a:r>
+              <a:rPr lang="en-GB" sz="2000" dirty="0" smtClean="0">
+                <a:latin typeface="Times New Roman" panose="02020603050405020304" pitchFamily="18" charset="0"/>
+                <a:cs typeface="Times New Roman" panose="02020603050405020304" pitchFamily="18" charset="0"/>
+              </a:rPr>
+              <a:t> files are </a:t>
+            </a:r>
+            <a:r>
+              <a:rPr lang="en-GB" sz="2000" b="1" dirty="0" smtClean="0">
+                <a:latin typeface="Times New Roman" panose="02020603050405020304" pitchFamily="18" charset="0"/>
+                <a:cs typeface="Times New Roman" panose="02020603050405020304" pitchFamily="18" charset="0"/>
+              </a:rPr>
+              <a:t>PHRED</a:t>
+            </a:r>
+            <a:r>
+              <a:rPr lang="en-GB" sz="2000" dirty="0" smtClean="0">
+                <a:latin typeface="Times New Roman" panose="02020603050405020304" pitchFamily="18" charset="0"/>
+                <a:cs typeface="Times New Roman" panose="02020603050405020304" pitchFamily="18" charset="0"/>
+              </a:rPr>
+              <a:t> </a:t>
+            </a:r>
+            <a:r>
+              <a:rPr lang="en-GB" sz="2000" b="1" dirty="0" smtClean="0">
+                <a:latin typeface="Times New Roman" panose="02020603050405020304" pitchFamily="18" charset="0"/>
+                <a:cs typeface="Times New Roman" panose="02020603050405020304" pitchFamily="18" charset="0"/>
+              </a:rPr>
+              <a:t>Scores</a:t>
+            </a:r>
+            <a:r>
+              <a:rPr lang="en-GB" sz="2000" dirty="0" smtClean="0">
+                <a:latin typeface="Times New Roman" panose="02020603050405020304" pitchFamily="18" charset="0"/>
+                <a:cs typeface="Times New Roman" panose="02020603050405020304" pitchFamily="18" charset="0"/>
+              </a:rPr>
+              <a:t>.</a:t>
+            </a:r>
+            <a:endParaRPr lang="en-GB" sz="2000" dirty="0"/>
+          </a:p>
+        </p:txBody>
+      </p:sp>
+      <p:sp>
+        <p:nvSpPr>
+          <p:cNvPr id="6" name="TextBox 5">
+            <a:extLst>
+              <a:ext uri="{FF2B5EF4-FFF2-40B4-BE49-F238E27FC236}">
+                <a16:creationId xmlns:a16="http://schemas.microsoft.com/office/drawing/2014/main" xmlns="" id="{438442CF-1B82-4A10-87A1-614331CA498E}"/>
+              </a:ext>
+            </a:extLst>
+          </p:cNvPr>
+          <p:cNvSpPr txBox="1"/>
+          <p:nvPr/>
+        </p:nvSpPr>
+        <p:spPr>
+          <a:xfrm>
+            <a:off x="1019114" y="2023991"/>
+            <a:ext cx="10153772" cy="707886"/>
+          </a:xfrm>
+          <a:prstGeom prst="rect">
+            <a:avLst/>
+          </a:prstGeom>
+          <a:solidFill>
+            <a:schemeClr val="accent2">
+              <a:lumMod val="40000"/>
+              <a:lumOff val="60000"/>
+            </a:schemeClr>
+          </a:solidFill>
+        </p:spPr>
+        <p:txBody>
+          <a:bodyPr wrap="square" rtlCol="0">
+            <a:spAutoFit/>
+          </a:bodyPr>
+          <a:lstStyle/>
+          <a:p>
+            <a:r>
+              <a:rPr lang="en-GB" sz="2000" dirty="0" smtClean="0">
+                <a:latin typeface="Times New Roman" panose="02020603050405020304" pitchFamily="18" charset="0"/>
+                <a:cs typeface="Times New Roman" panose="02020603050405020304" pitchFamily="18" charset="0"/>
+              </a:rPr>
+              <a:t>The </a:t>
+            </a:r>
+            <a:r>
+              <a:rPr lang="en-GB" sz="2000" b="1" dirty="0">
+                <a:latin typeface="Times New Roman" panose="02020603050405020304" pitchFamily="18" charset="0"/>
+                <a:cs typeface="Times New Roman" panose="02020603050405020304" pitchFamily="18" charset="0"/>
+              </a:rPr>
+              <a:t>PHRED</a:t>
+            </a:r>
+            <a:r>
+              <a:rPr lang="en-GB" sz="2000" dirty="0">
+                <a:latin typeface="Times New Roman" panose="02020603050405020304" pitchFamily="18" charset="0"/>
+                <a:cs typeface="Times New Roman" panose="02020603050405020304" pitchFamily="18" charset="0"/>
+              </a:rPr>
+              <a:t> </a:t>
+            </a:r>
+            <a:r>
+              <a:rPr lang="en-GB" sz="2000" b="1" dirty="0" smtClean="0">
+                <a:latin typeface="Times New Roman" panose="02020603050405020304" pitchFamily="18" charset="0"/>
+                <a:cs typeface="Times New Roman" panose="02020603050405020304" pitchFamily="18" charset="0"/>
+              </a:rPr>
+              <a:t>Score</a:t>
+            </a:r>
+            <a:r>
+              <a:rPr lang="en-GB" sz="2000" dirty="0" smtClean="0">
+                <a:latin typeface="Times New Roman" panose="02020603050405020304" pitchFamily="18" charset="0"/>
+                <a:cs typeface="Times New Roman" panose="02020603050405020304" pitchFamily="18" charset="0"/>
+              </a:rPr>
+              <a:t> for a given </a:t>
+            </a:r>
+            <a:r>
+              <a:rPr lang="en-GB" sz="2000" b="1" dirty="0" smtClean="0">
+                <a:latin typeface="Times New Roman" panose="02020603050405020304" pitchFamily="18" charset="0"/>
+                <a:cs typeface="Times New Roman" panose="02020603050405020304" pitchFamily="18" charset="0"/>
+              </a:rPr>
+              <a:t>Base Call </a:t>
+            </a:r>
+            <a:r>
+              <a:rPr lang="en-GB" sz="2000" dirty="0" smtClean="0">
+                <a:latin typeface="Times New Roman" panose="02020603050405020304" pitchFamily="18" charset="0"/>
+                <a:cs typeface="Times New Roman" panose="02020603050405020304" pitchFamily="18" charset="0"/>
+              </a:rPr>
+              <a:t>is derived from an estimate of the </a:t>
+            </a:r>
+            <a:r>
+              <a:rPr lang="en-GB" sz="2000" b="1" dirty="0" smtClean="0">
+                <a:latin typeface="Times New Roman" panose="02020603050405020304" pitchFamily="18" charset="0"/>
+                <a:cs typeface="Times New Roman" panose="02020603050405020304" pitchFamily="18" charset="0"/>
+              </a:rPr>
+              <a:t>Probability</a:t>
+            </a:r>
+            <a:r>
+              <a:rPr lang="en-GB" sz="2000" dirty="0" smtClean="0">
+                <a:latin typeface="Times New Roman" panose="02020603050405020304" pitchFamily="18" charset="0"/>
+                <a:cs typeface="Times New Roman" panose="02020603050405020304" pitchFamily="18" charset="0"/>
+              </a:rPr>
+              <a:t> of that </a:t>
+            </a:r>
+            <a:r>
+              <a:rPr lang="en-GB" sz="2000" b="1" dirty="0">
+                <a:latin typeface="Times New Roman" panose="02020603050405020304" pitchFamily="18" charset="0"/>
+                <a:cs typeface="Times New Roman" panose="02020603050405020304" pitchFamily="18" charset="0"/>
+              </a:rPr>
+              <a:t>B</a:t>
+            </a:r>
+            <a:r>
+              <a:rPr lang="en-GB" sz="2000" b="1" dirty="0" smtClean="0">
+                <a:latin typeface="Times New Roman" panose="02020603050405020304" pitchFamily="18" charset="0"/>
+                <a:cs typeface="Times New Roman" panose="02020603050405020304" pitchFamily="18" charset="0"/>
+              </a:rPr>
+              <a:t>ase</a:t>
+            </a:r>
+            <a:r>
+              <a:rPr lang="en-GB" sz="2000" dirty="0" smtClean="0">
+                <a:latin typeface="Times New Roman" panose="02020603050405020304" pitchFamily="18" charset="0"/>
+                <a:cs typeface="Times New Roman" panose="02020603050405020304" pitchFamily="18" charset="0"/>
+              </a:rPr>
+              <a:t> being </a:t>
+            </a:r>
+            <a:r>
+              <a:rPr lang="en-GB" sz="2000" b="1" dirty="0" smtClean="0">
+                <a:latin typeface="Times New Roman" panose="02020603050405020304" pitchFamily="18" charset="0"/>
+                <a:cs typeface="Times New Roman" panose="02020603050405020304" pitchFamily="18" charset="0"/>
+              </a:rPr>
+              <a:t>Called</a:t>
+            </a:r>
+            <a:r>
+              <a:rPr lang="en-GB" sz="2000" dirty="0" smtClean="0">
+                <a:latin typeface="Times New Roman" panose="02020603050405020304" pitchFamily="18" charset="0"/>
+                <a:cs typeface="Times New Roman" panose="02020603050405020304" pitchFamily="18" charset="0"/>
+              </a:rPr>
+              <a:t> incorrectly</a:t>
+            </a:r>
+            <a:endParaRPr lang="en-GB" sz="2000" dirty="0"/>
+          </a:p>
+        </p:txBody>
+      </p:sp>
+      <p:sp>
+        <p:nvSpPr>
+          <p:cNvPr id="7" name="TextBox 6">
+            <a:extLst>
+              <a:ext uri="{FF2B5EF4-FFF2-40B4-BE49-F238E27FC236}">
+                <a16:creationId xmlns:a16="http://schemas.microsoft.com/office/drawing/2014/main" xmlns="" id="{438442CF-1B82-4A10-87A1-614331CA498E}"/>
+              </a:ext>
+            </a:extLst>
+          </p:cNvPr>
+          <p:cNvSpPr txBox="1"/>
+          <p:nvPr/>
+        </p:nvSpPr>
+        <p:spPr>
+          <a:xfrm>
+            <a:off x="1019114" y="3064056"/>
+            <a:ext cx="10153772" cy="707886"/>
+          </a:xfrm>
+          <a:prstGeom prst="rect">
+            <a:avLst/>
+          </a:prstGeom>
+          <a:solidFill>
+            <a:schemeClr val="accent2">
+              <a:lumMod val="40000"/>
+              <a:lumOff val="60000"/>
+            </a:schemeClr>
+          </a:solidFill>
+        </p:spPr>
+        <p:txBody>
+          <a:bodyPr wrap="square" rtlCol="0">
+            <a:spAutoFit/>
+          </a:bodyPr>
+          <a:lstStyle/>
+          <a:p>
+            <a:r>
+              <a:rPr lang="en-GB" sz="2000" dirty="0" smtClean="0">
+                <a:latin typeface="Times New Roman" panose="02020603050405020304" pitchFamily="18" charset="0"/>
+                <a:cs typeface="Times New Roman" panose="02020603050405020304" pitchFamily="18" charset="0"/>
+              </a:rPr>
+              <a:t>Where</a:t>
+            </a:r>
+            <a:r>
+              <a:rPr lang="en-GB" sz="2000" b="1" dirty="0" smtClean="0">
+                <a:latin typeface="Times New Roman" panose="02020603050405020304" pitchFamily="18" charset="0"/>
+                <a:cs typeface="Times New Roman" panose="02020603050405020304" pitchFamily="18" charset="0"/>
+              </a:rPr>
+              <a:t> Q</a:t>
+            </a:r>
+            <a:r>
+              <a:rPr lang="en-GB" sz="2000" dirty="0" smtClean="0">
+                <a:latin typeface="Times New Roman" panose="02020603050405020304" pitchFamily="18" charset="0"/>
+                <a:cs typeface="Times New Roman" panose="02020603050405020304" pitchFamily="18" charset="0"/>
+              </a:rPr>
+              <a:t> is the </a:t>
+            </a:r>
+            <a:r>
+              <a:rPr lang="en-GB" sz="2000" b="1" dirty="0">
+                <a:latin typeface="Times New Roman" panose="02020603050405020304" pitchFamily="18" charset="0"/>
+                <a:cs typeface="Times New Roman" panose="02020603050405020304" pitchFamily="18" charset="0"/>
+              </a:rPr>
+              <a:t>PHRED</a:t>
+            </a:r>
+            <a:r>
+              <a:rPr lang="en-GB" sz="2000" dirty="0">
+                <a:latin typeface="Times New Roman" panose="02020603050405020304" pitchFamily="18" charset="0"/>
+                <a:cs typeface="Times New Roman" panose="02020603050405020304" pitchFamily="18" charset="0"/>
+              </a:rPr>
+              <a:t> </a:t>
+            </a:r>
+            <a:r>
+              <a:rPr lang="en-GB" sz="2000" b="1" dirty="0" smtClean="0">
+                <a:latin typeface="Times New Roman" panose="02020603050405020304" pitchFamily="18" charset="0"/>
+                <a:cs typeface="Times New Roman" panose="02020603050405020304" pitchFamily="18" charset="0"/>
+              </a:rPr>
+              <a:t>Score </a:t>
+            </a:r>
+            <a:r>
+              <a:rPr lang="en-GB" sz="2000" dirty="0" smtClean="0">
+                <a:latin typeface="Times New Roman" panose="02020603050405020304" pitchFamily="18" charset="0"/>
+                <a:cs typeface="Times New Roman" panose="02020603050405020304" pitchFamily="18" charset="0"/>
+              </a:rPr>
+              <a:t>for a given </a:t>
+            </a:r>
+            <a:r>
+              <a:rPr lang="en-GB" sz="2000" b="1" dirty="0" smtClean="0">
+                <a:latin typeface="Times New Roman" panose="02020603050405020304" pitchFamily="18" charset="0"/>
+                <a:cs typeface="Times New Roman" panose="02020603050405020304" pitchFamily="18" charset="0"/>
+              </a:rPr>
+              <a:t>Base Call </a:t>
+            </a:r>
+            <a:r>
+              <a:rPr lang="en-GB" sz="2000" dirty="0" smtClean="0">
+                <a:latin typeface="Times New Roman" panose="02020603050405020304" pitchFamily="18" charset="0"/>
+                <a:cs typeface="Times New Roman" panose="02020603050405020304" pitchFamily="18" charset="0"/>
+              </a:rPr>
+              <a:t>and </a:t>
+            </a:r>
+            <a:r>
+              <a:rPr lang="en-GB" sz="2000" b="1" dirty="0" smtClean="0">
+                <a:latin typeface="Times New Roman" panose="02020603050405020304" pitchFamily="18" charset="0"/>
+                <a:cs typeface="Times New Roman" panose="02020603050405020304" pitchFamily="18" charset="0"/>
+              </a:rPr>
+              <a:t>P </a:t>
+            </a:r>
+            <a:r>
+              <a:rPr lang="en-GB" sz="2000" dirty="0" smtClean="0">
+                <a:latin typeface="Times New Roman" panose="02020603050405020304" pitchFamily="18" charset="0"/>
+                <a:cs typeface="Times New Roman" panose="02020603050405020304" pitchFamily="18" charset="0"/>
+              </a:rPr>
+              <a:t>is the estimated </a:t>
+            </a:r>
+            <a:r>
+              <a:rPr lang="en-GB" sz="2000" b="1" dirty="0" smtClean="0">
+                <a:latin typeface="Times New Roman" panose="02020603050405020304" pitchFamily="18" charset="0"/>
+                <a:cs typeface="Times New Roman" panose="02020603050405020304" pitchFamily="18" charset="0"/>
+              </a:rPr>
+              <a:t>Probability of Error </a:t>
+            </a:r>
+            <a:r>
+              <a:rPr lang="en-GB" sz="2000" dirty="0" smtClean="0">
+                <a:latin typeface="Times New Roman" panose="02020603050405020304" pitchFamily="18" charset="0"/>
+                <a:cs typeface="Times New Roman" panose="02020603050405020304" pitchFamily="18" charset="0"/>
+              </a:rPr>
+              <a:t>for that </a:t>
+            </a:r>
+            <a:r>
+              <a:rPr lang="en-GB" sz="2000" b="1" dirty="0" smtClean="0">
+                <a:latin typeface="Times New Roman" panose="02020603050405020304" pitchFamily="18" charset="0"/>
+                <a:cs typeface="Times New Roman" panose="02020603050405020304" pitchFamily="18" charset="0"/>
+              </a:rPr>
+              <a:t>Base Call</a:t>
+            </a:r>
+            <a:r>
+              <a:rPr lang="en-GB" sz="2000" dirty="0" smtClean="0">
+                <a:latin typeface="Times New Roman" panose="02020603050405020304" pitchFamily="18" charset="0"/>
+                <a:cs typeface="Times New Roman" panose="02020603050405020304" pitchFamily="18" charset="0"/>
+              </a:rPr>
+              <a:t>, the following formula applies:</a:t>
+            </a:r>
+          </a:p>
+        </p:txBody>
+      </p:sp>
+      <p:sp>
+        <p:nvSpPr>
+          <p:cNvPr id="3" name="AutoShape 2" descr="Q=-10\ \log _{{10}}P"/>
+          <p:cNvSpPr>
+            <a:spLocks noChangeAspect="1" noChangeArrowheads="1"/>
+          </p:cNvSpPr>
+          <p:nvPr/>
+        </p:nvSpPr>
+        <p:spPr bwMode="auto">
+          <a:xfrm>
+            <a:off x="6313955" y="-144463"/>
+            <a:ext cx="304800" cy="304801"/>
+          </a:xfrm>
+          <a:prstGeom prst="rect">
+            <a:avLst/>
+          </a:prstGeom>
+          <a:noFill/>
+          <a:extLst>
+            <a:ext uri="{909E8E84-426E-40DD-AFC4-6F175D3DCCD1}">
+              <a14:hiddenFill xmlns:a14="http://schemas.microsoft.com/office/drawing/2010/main">
+                <a:solidFill>
+                  <a:srgbClr val="FFFFFF"/>
+                </a:solidFill>
+              </a14:hiddenFill>
+            </a:ext>
+          </a:extLst>
+        </p:spPr>
+        <p:txBody>
+          <a:bodyPr vert="horz" wrap="square" lIns="91440" tIns="45720" rIns="91440" bIns="45720" numCol="1" anchor="t" anchorCtr="0" compatLnSpc="1">
+            <a:prstTxWarp prst="textNoShape">
+              <a:avLst/>
+            </a:prstTxWarp>
+          </a:bodyPr>
+          <a:lstStyle/>
+          <a:p>
+            <a:endParaRPr lang="en-GB"/>
+          </a:p>
+        </p:txBody>
+      </p:sp>
+      <p:sp>
+        <p:nvSpPr>
+          <p:cNvPr id="9" name="AutoShape 4" descr="Q=-10\ \log _{{10}}P"/>
+          <p:cNvSpPr>
+            <a:spLocks noChangeAspect="1" noChangeArrowheads="1"/>
+          </p:cNvSpPr>
+          <p:nvPr/>
+        </p:nvSpPr>
+        <p:spPr bwMode="auto">
+          <a:xfrm>
+            <a:off x="6313955" y="7937"/>
+            <a:ext cx="304800" cy="304801"/>
+          </a:xfrm>
+          <a:prstGeom prst="rect">
+            <a:avLst/>
+          </a:prstGeom>
+          <a:noFill/>
+          <a:extLst>
+            <a:ext uri="{909E8E84-426E-40DD-AFC4-6F175D3DCCD1}">
+              <a14:hiddenFill xmlns:a14="http://schemas.microsoft.com/office/drawing/2010/main">
+                <a:solidFill>
+                  <a:srgbClr val="FFFFFF"/>
+                </a:solidFill>
+              </a14:hiddenFill>
+            </a:ext>
+          </a:extLst>
+        </p:spPr>
+        <p:txBody>
+          <a:bodyPr vert="horz" wrap="square" lIns="91440" tIns="45720" rIns="91440" bIns="45720" numCol="1" anchor="t" anchorCtr="0" compatLnSpc="1">
+            <a:prstTxWarp prst="textNoShape">
+              <a:avLst/>
+            </a:prstTxWarp>
+          </a:bodyPr>
+          <a:lstStyle/>
+          <a:p>
+            <a:endParaRPr lang="en-GB"/>
+          </a:p>
+        </p:txBody>
+      </p:sp>
+      <p:sp>
+        <p:nvSpPr>
+          <p:cNvPr id="10" name="TextBox 9">
+            <a:extLst>
+              <a:ext uri="{FF2B5EF4-FFF2-40B4-BE49-F238E27FC236}">
+                <a16:creationId xmlns:a16="http://schemas.microsoft.com/office/drawing/2014/main" xmlns="" id="{438442CF-1B82-4A10-87A1-614331CA498E}"/>
+              </a:ext>
+            </a:extLst>
+          </p:cNvPr>
+          <p:cNvSpPr txBox="1"/>
+          <p:nvPr/>
+        </p:nvSpPr>
+        <p:spPr>
+          <a:xfrm>
+            <a:off x="1808073" y="5451963"/>
+            <a:ext cx="5599641" cy="400110"/>
+          </a:xfrm>
+          <a:prstGeom prst="rect">
+            <a:avLst/>
+          </a:prstGeom>
+          <a:solidFill>
+            <a:schemeClr val="accent6">
+              <a:lumMod val="20000"/>
+              <a:lumOff val="80000"/>
+            </a:schemeClr>
+          </a:solidFill>
+        </p:spPr>
+        <p:txBody>
+          <a:bodyPr wrap="square" rtlCol="0">
+            <a:spAutoFit/>
+          </a:bodyPr>
+          <a:lstStyle/>
+          <a:p>
+            <a:r>
+              <a:rPr lang="en-GB" sz="2000" b="1" dirty="0" smtClean="0">
+                <a:latin typeface="Times New Roman" panose="02020603050405020304" pitchFamily="18" charset="0"/>
+                <a:cs typeface="Times New Roman" panose="02020603050405020304" pitchFamily="18" charset="0"/>
+              </a:rPr>
+              <a:t>P</a:t>
+            </a:r>
+            <a:r>
+              <a:rPr lang="en-GB" sz="2000" dirty="0" smtClean="0">
+                <a:latin typeface="Times New Roman" panose="02020603050405020304" pitchFamily="18" charset="0"/>
+                <a:cs typeface="Times New Roman" panose="02020603050405020304" pitchFamily="18" charset="0"/>
+              </a:rPr>
+              <a:t> is a </a:t>
+            </a:r>
+            <a:r>
+              <a:rPr lang="en-GB" sz="2000" b="1" dirty="0" smtClean="0">
+                <a:latin typeface="Times New Roman" panose="02020603050405020304" pitchFamily="18" charset="0"/>
+                <a:cs typeface="Times New Roman" panose="02020603050405020304" pitchFamily="18" charset="0"/>
+              </a:rPr>
+              <a:t>Probability</a:t>
+            </a:r>
+            <a:r>
+              <a:rPr lang="en-GB" sz="2000" dirty="0" smtClean="0">
+                <a:latin typeface="Times New Roman" panose="02020603050405020304" pitchFamily="18" charset="0"/>
+                <a:cs typeface="Times New Roman" panose="02020603050405020304" pitchFamily="18" charset="0"/>
+              </a:rPr>
+              <a:t> and so has </a:t>
+            </a:r>
+            <a:r>
+              <a:rPr lang="en-GB" sz="2000" b="1" dirty="0" smtClean="0">
+                <a:latin typeface="Times New Roman" panose="02020603050405020304" pitchFamily="18" charset="0"/>
+                <a:cs typeface="Times New Roman" panose="02020603050405020304" pitchFamily="18" charset="0"/>
+              </a:rPr>
+              <a:t>Range</a:t>
+            </a:r>
+            <a:r>
+              <a:rPr lang="en-GB" sz="2000" dirty="0" smtClean="0">
+                <a:latin typeface="Times New Roman" panose="02020603050405020304" pitchFamily="18" charset="0"/>
+                <a:cs typeface="Times New Roman" panose="02020603050405020304" pitchFamily="18" charset="0"/>
+              </a:rPr>
+              <a:t> </a:t>
+            </a:r>
+            <a:r>
+              <a:rPr lang="en-GB" sz="2000" b="1" dirty="0" smtClean="0">
+                <a:latin typeface="Times New Roman" panose="02020603050405020304" pitchFamily="18" charset="0"/>
+                <a:cs typeface="Times New Roman" panose="02020603050405020304" pitchFamily="18" charset="0"/>
+              </a:rPr>
+              <a:t>0 </a:t>
+            </a:r>
+            <a:r>
+              <a:rPr lang="en-GB" sz="2000" b="1" dirty="0" smtClean="0">
+                <a:latin typeface="Times New Roman" panose="02020603050405020304" pitchFamily="18" charset="0"/>
+                <a:cs typeface="Times New Roman" panose="02020603050405020304" pitchFamily="18" charset="0"/>
+                <a:sym typeface="Wingdings" panose="05000000000000000000" pitchFamily="2" charset="2"/>
+              </a:rPr>
+              <a:t></a:t>
+            </a:r>
+            <a:r>
+              <a:rPr lang="en-GB" sz="2000" b="1" dirty="0" smtClean="0">
+                <a:latin typeface="Times New Roman" panose="02020603050405020304" pitchFamily="18" charset="0"/>
+                <a:cs typeface="Times New Roman" panose="02020603050405020304" pitchFamily="18" charset="0"/>
+              </a:rPr>
+              <a:t> 1</a:t>
+            </a:r>
+            <a:endParaRPr lang="en-GB" sz="2000" b="1" dirty="0"/>
+          </a:p>
+        </p:txBody>
+      </p:sp>
+      <p:sp>
+        <p:nvSpPr>
+          <p:cNvPr id="11" name="TextBox 10">
+            <a:extLst>
+              <a:ext uri="{FF2B5EF4-FFF2-40B4-BE49-F238E27FC236}">
+                <a16:creationId xmlns:a16="http://schemas.microsoft.com/office/drawing/2014/main" xmlns="" id="{438442CF-1B82-4A10-87A1-614331CA498E}"/>
+              </a:ext>
+            </a:extLst>
+          </p:cNvPr>
+          <p:cNvSpPr txBox="1"/>
+          <p:nvPr/>
+        </p:nvSpPr>
+        <p:spPr>
+          <a:xfrm>
+            <a:off x="1797404" y="6184253"/>
+            <a:ext cx="5620978" cy="400110"/>
+          </a:xfrm>
+          <a:prstGeom prst="rect">
+            <a:avLst/>
+          </a:prstGeom>
+          <a:solidFill>
+            <a:schemeClr val="accent6">
+              <a:lumMod val="20000"/>
+              <a:lumOff val="80000"/>
+            </a:schemeClr>
+          </a:solidFill>
+        </p:spPr>
+        <p:txBody>
+          <a:bodyPr wrap="square" rtlCol="0">
+            <a:spAutoFit/>
+          </a:bodyPr>
+          <a:lstStyle/>
+          <a:p>
+            <a:r>
+              <a:rPr lang="en-GB" sz="2000" b="1" dirty="0">
+                <a:latin typeface="Times New Roman" panose="02020603050405020304" pitchFamily="18" charset="0"/>
+                <a:cs typeface="Times New Roman" panose="02020603050405020304" pitchFamily="18" charset="0"/>
+              </a:rPr>
+              <a:t>Q</a:t>
+            </a:r>
+            <a:r>
+              <a:rPr lang="en-GB" sz="2000" dirty="0" smtClean="0">
+                <a:latin typeface="Times New Roman" panose="02020603050405020304" pitchFamily="18" charset="0"/>
+                <a:cs typeface="Times New Roman" panose="02020603050405020304" pitchFamily="18" charset="0"/>
+              </a:rPr>
+              <a:t> is a function of </a:t>
+            </a:r>
+            <a:r>
+              <a:rPr lang="en-GB" sz="2000" b="1" dirty="0" smtClean="0">
+                <a:latin typeface="Times New Roman" panose="02020603050405020304" pitchFamily="18" charset="0"/>
+                <a:cs typeface="Times New Roman" panose="02020603050405020304" pitchFamily="18" charset="0"/>
+              </a:rPr>
+              <a:t>P</a:t>
+            </a:r>
+            <a:r>
+              <a:rPr lang="en-GB" sz="2000" dirty="0" smtClean="0">
+                <a:latin typeface="Times New Roman" panose="02020603050405020304" pitchFamily="18" charset="0"/>
+                <a:cs typeface="Times New Roman" panose="02020603050405020304" pitchFamily="18" charset="0"/>
+              </a:rPr>
+              <a:t> that has </a:t>
+            </a:r>
+            <a:r>
+              <a:rPr lang="en-GB" sz="2000" b="1" dirty="0" smtClean="0">
+                <a:latin typeface="Times New Roman" panose="02020603050405020304" pitchFamily="18" charset="0"/>
+                <a:cs typeface="Times New Roman" panose="02020603050405020304" pitchFamily="18" charset="0"/>
+              </a:rPr>
+              <a:t>Range</a:t>
+            </a:r>
+            <a:r>
+              <a:rPr lang="en-GB" sz="2000" dirty="0" smtClean="0">
+                <a:latin typeface="Times New Roman" panose="02020603050405020304" pitchFamily="18" charset="0"/>
+                <a:cs typeface="Times New Roman" panose="02020603050405020304" pitchFamily="18" charset="0"/>
+              </a:rPr>
+              <a:t> </a:t>
+            </a:r>
+            <a:r>
+              <a:rPr lang="en-GB" sz="2000" b="1" dirty="0" smtClean="0">
+                <a:latin typeface="Times New Roman" panose="02020603050405020304" pitchFamily="18" charset="0"/>
+                <a:cs typeface="Times New Roman" panose="02020603050405020304" pitchFamily="18" charset="0"/>
+              </a:rPr>
+              <a:t> 0 </a:t>
+            </a:r>
+            <a:r>
+              <a:rPr lang="en-GB" sz="2000" b="1" dirty="0" smtClean="0">
+                <a:latin typeface="Times New Roman" panose="02020603050405020304" pitchFamily="18" charset="0"/>
+                <a:cs typeface="Times New Roman" panose="02020603050405020304" pitchFamily="18" charset="0"/>
+                <a:sym typeface="Wingdings" panose="05000000000000000000" pitchFamily="2" charset="2"/>
+              </a:rPr>
+              <a:t></a:t>
+            </a:r>
+            <a:r>
+              <a:rPr lang="en-GB" sz="2000" b="1" dirty="0" smtClean="0">
+                <a:latin typeface="Times New Roman" panose="02020603050405020304" pitchFamily="18" charset="0"/>
+                <a:cs typeface="Times New Roman" panose="02020603050405020304" pitchFamily="18" charset="0"/>
+              </a:rPr>
+              <a:t> infinity</a:t>
+            </a:r>
+            <a:r>
+              <a:rPr lang="en-GB" sz="2000" dirty="0" smtClean="0">
+                <a:latin typeface="Times New Roman" panose="02020603050405020304" pitchFamily="18" charset="0"/>
+                <a:cs typeface="Times New Roman" panose="02020603050405020304" pitchFamily="18" charset="0"/>
+              </a:rPr>
+              <a:t>.</a:t>
+            </a:r>
+            <a:endParaRPr lang="en-GB" sz="2000" dirty="0"/>
+          </a:p>
+        </p:txBody>
+      </p:sp>
+      <p:sp>
+        <p:nvSpPr>
+          <p:cNvPr id="12" name="TextBox 11">
+            <a:extLst>
+              <a:ext uri="{FF2B5EF4-FFF2-40B4-BE49-F238E27FC236}">
+                <a16:creationId xmlns:a16="http://schemas.microsoft.com/office/drawing/2014/main" xmlns="" id="{438442CF-1B82-4A10-87A1-614331CA498E}"/>
+              </a:ext>
+            </a:extLst>
+          </p:cNvPr>
+          <p:cNvSpPr txBox="1"/>
+          <p:nvPr/>
+        </p:nvSpPr>
+        <p:spPr>
+          <a:xfrm>
+            <a:off x="1765004" y="4104121"/>
+            <a:ext cx="8661992" cy="1015663"/>
+          </a:xfrm>
+          <a:prstGeom prst="rect">
+            <a:avLst/>
+          </a:prstGeom>
+          <a:solidFill>
+            <a:srgbClr val="FFFF00"/>
+          </a:solidFill>
+        </p:spPr>
+        <p:txBody>
+          <a:bodyPr wrap="square" rtlCol="0">
+            <a:spAutoFit/>
+          </a:bodyPr>
+          <a:lstStyle/>
+          <a:p>
+            <a:pPr algn="ctr"/>
+            <a:r>
+              <a:rPr lang="en-GB" sz="6000" b="1" dirty="0" smtClean="0">
+                <a:latin typeface="Courier New" panose="02070309020205020404" pitchFamily="49" charset="0"/>
+                <a:cs typeface="Courier New" panose="02070309020205020404" pitchFamily="49" charset="0"/>
+              </a:rPr>
+              <a:t>Q =  -10 * log</a:t>
+            </a:r>
+            <a:r>
+              <a:rPr lang="en-GB" sz="6000" b="1" baseline="-25000" dirty="0" smtClean="0">
+                <a:latin typeface="Courier New" panose="02070309020205020404" pitchFamily="49" charset="0"/>
+                <a:cs typeface="Courier New" panose="02070309020205020404" pitchFamily="49" charset="0"/>
+              </a:rPr>
+              <a:t>10</a:t>
+            </a:r>
+            <a:r>
+              <a:rPr lang="en-GB" sz="6000" b="1" dirty="0" smtClean="0">
+                <a:latin typeface="Courier New" panose="02070309020205020404" pitchFamily="49" charset="0"/>
+                <a:cs typeface="Courier New" panose="02070309020205020404" pitchFamily="49" charset="0"/>
+              </a:rPr>
+              <a:t>(P)</a:t>
+            </a:r>
+            <a:endParaRPr lang="en-GB" sz="6000" b="1" dirty="0">
+              <a:latin typeface="Courier New" panose="02070309020205020404" pitchFamily="49" charset="0"/>
+              <a:cs typeface="Courier New" panose="02070309020205020404" pitchFamily="49" charset="0"/>
+            </a:endParaRPr>
+          </a:p>
+        </p:txBody>
+      </p:sp>
+      <p:sp>
+        <p:nvSpPr>
+          <p:cNvPr id="15" name="TextBox 14">
+            <a:extLst>
+              <a:ext uri="{FF2B5EF4-FFF2-40B4-BE49-F238E27FC236}">
+                <a16:creationId xmlns:a16="http://schemas.microsoft.com/office/drawing/2014/main" xmlns="" id="{E43AF4C5-CF5B-4E7E-B438-83CD70BE1265}"/>
+              </a:ext>
+            </a:extLst>
+          </p:cNvPr>
+          <p:cNvSpPr txBox="1"/>
+          <p:nvPr/>
+        </p:nvSpPr>
+        <p:spPr>
+          <a:xfrm>
+            <a:off x="2008528" y="0"/>
+            <a:ext cx="8174945" cy="729430"/>
+          </a:xfrm>
+          <a:prstGeom prst="rect">
+            <a:avLst/>
+          </a:prstGeom>
+          <a:solidFill>
+            <a:srgbClr val="FF0000"/>
+          </a:solidFill>
+        </p:spPr>
+        <p:txBody>
+          <a:bodyPr wrap="square" rtlCol="0" anchor="ctr">
+            <a:spAutoFit/>
+          </a:bodyPr>
+          <a:lstStyle/>
+          <a:p>
+            <a:pPr algn="ctr">
+              <a:lnSpc>
+                <a:spcPct val="115000"/>
+              </a:lnSpc>
+              <a:spcAft>
+                <a:spcPts val="1000"/>
+              </a:spcAft>
+            </a:pPr>
+            <a:r>
+              <a:rPr lang="en-GB" sz="3600" b="1" u="sng" dirty="0">
+                <a:solidFill>
+                  <a:srgbClr val="EEECE1"/>
+                </a:solidFill>
+                <a:highlight>
+                  <a:srgbClr val="FF0000"/>
+                </a:highlight>
+                <a:latin typeface="Courier New" pitchFamily="49" charset="0"/>
+                <a:ea typeface="Calibri"/>
+                <a:cs typeface="Courier New" pitchFamily="49" charset="0"/>
+              </a:rPr>
+              <a:t>Base </a:t>
+            </a:r>
+            <a:r>
+              <a:rPr lang="en-GB" sz="3600" b="1" u="sng" dirty="0" smtClean="0">
+                <a:solidFill>
+                  <a:schemeClr val="bg2"/>
+                </a:solidFill>
+                <a:highlight>
+                  <a:srgbClr val="FF0000"/>
+                </a:highlight>
+                <a:latin typeface="Courier New" pitchFamily="49" charset="0"/>
+                <a:ea typeface="Calibri"/>
+                <a:cs typeface="Courier New" pitchFamily="49" charset="0"/>
+              </a:rPr>
+              <a:t>Quality (</a:t>
+            </a:r>
+            <a:r>
+              <a:rPr lang="en-GB" sz="3600" dirty="0" smtClean="0">
+                <a:solidFill>
+                  <a:schemeClr val="bg2"/>
+                </a:solidFill>
+                <a:latin typeface="Times New Roman" panose="02020603050405020304" pitchFamily="18" charset="0"/>
+                <a:cs typeface="Times New Roman" panose="02020603050405020304" pitchFamily="18" charset="0"/>
+              </a:rPr>
+              <a:t> </a:t>
+            </a:r>
+            <a:r>
+              <a:rPr lang="en-GB" sz="3600" b="1" dirty="0" smtClean="0">
+                <a:solidFill>
+                  <a:schemeClr val="bg2"/>
+                </a:solidFill>
+                <a:latin typeface="Times New Roman" panose="02020603050405020304" pitchFamily="18" charset="0"/>
+                <a:cs typeface="Times New Roman" panose="02020603050405020304" pitchFamily="18" charset="0"/>
+                <a:hlinkClick r:id="rId3"/>
+              </a:rPr>
+              <a:t>PHRED</a:t>
+            </a:r>
+            <a:r>
+              <a:rPr lang="en-GB" sz="3600" b="1" dirty="0" smtClean="0">
+                <a:solidFill>
+                  <a:schemeClr val="bg2"/>
+                </a:solidFill>
+                <a:latin typeface="Times New Roman" panose="02020603050405020304" pitchFamily="18" charset="0"/>
+                <a:cs typeface="Times New Roman" panose="02020603050405020304" pitchFamily="18" charset="0"/>
+              </a:rPr>
+              <a:t>)</a:t>
+            </a:r>
+            <a:r>
+              <a:rPr lang="en-GB" sz="3600" dirty="0" smtClean="0">
+                <a:solidFill>
+                  <a:schemeClr val="bg2"/>
+                </a:solidFill>
+                <a:latin typeface="Times New Roman" panose="02020603050405020304" pitchFamily="18" charset="0"/>
+                <a:cs typeface="Times New Roman" panose="02020603050405020304" pitchFamily="18" charset="0"/>
+              </a:rPr>
+              <a:t> </a:t>
+            </a:r>
+            <a:r>
+              <a:rPr lang="en-GB" sz="3600" b="1" u="sng" dirty="0" smtClean="0">
+                <a:solidFill>
+                  <a:schemeClr val="bg2"/>
+                </a:solidFill>
+                <a:highlight>
+                  <a:srgbClr val="FF0000"/>
+                </a:highlight>
+                <a:latin typeface="Courier New" pitchFamily="49" charset="0"/>
+                <a:ea typeface="Calibri"/>
+                <a:cs typeface="Courier New" pitchFamily="49" charset="0"/>
+              </a:rPr>
+              <a:t> </a:t>
+            </a:r>
+            <a:r>
+              <a:rPr lang="en-GB" sz="3600" b="1" u="sng" dirty="0">
+                <a:solidFill>
+                  <a:schemeClr val="bg2"/>
+                </a:solidFill>
+                <a:highlight>
+                  <a:srgbClr val="FF0000"/>
+                </a:highlight>
+                <a:latin typeface="Courier New" pitchFamily="49" charset="0"/>
+                <a:ea typeface="Calibri"/>
+                <a:cs typeface="Courier New" pitchFamily="49" charset="0"/>
+              </a:rPr>
+              <a:t>Scores</a:t>
+            </a:r>
+            <a:endParaRPr lang="en-GB" sz="3600" dirty="0">
+              <a:solidFill>
+                <a:schemeClr val="bg2"/>
+              </a:solidFill>
+              <a:latin typeface="Courier New" pitchFamily="49" charset="0"/>
+              <a:ea typeface="Calibri"/>
+              <a:cs typeface="Courier New" pitchFamily="49" charset="0"/>
+            </a:endParaRPr>
+          </a:p>
+        </p:txBody>
+      </p:sp>
+    </p:spTree>
+    <p:extLst>
+      <p:ext uri="{BB962C8B-B14F-4D97-AF65-F5344CB8AC3E}">
+        <p14:creationId xmlns:p14="http://schemas.microsoft.com/office/powerpoint/2010/main" val="2463972691"/>
+      </p:ext>
+    </p:extLst>
+  </p:cSld>
+  <p:clrMapOvr>
+    <a:masterClrMapping/>
+  </p:clrMapOvr>
+  <p:timing>
+    <p:tnLst>
+      <p:par>
+        <p:cTn id="1" dur="indefinite" restart="never" nodeType="tmRoot">
+          <p:childTnLst>
+            <p:seq concurrent="1" nextAc="seek">
+              <p:cTn id="2" dur="indefinite" nodeType="mainSeq">
+                <p:childTnLst>
+                  <p:par>
+                    <p:cTn id="3" fill="hold">
+                      <p:stCondLst>
+                        <p:cond delay="indefinite"/>
+                        <p:cond evt="onBegin" delay="0">
+                          <p:tn val="2"/>
+                        </p:cond>
+                      </p:stCondLst>
+                      <p:childTnLst>
+                        <p:par>
+                          <p:cTn id="4" fill="hold">
+                            <p:stCondLst>
+                              <p:cond delay="0"/>
+                            </p:stCondLst>
+                            <p:childTnLst>
+                              <p:par>
+                                <p:cTn id="5" presetID="10" presetClass="exit" presetSubtype="0" fill="hold" grpId="0" nodeType="withEffect">
+                                  <p:stCondLst>
+                                    <p:cond delay="0"/>
+                                  </p:stCondLst>
+                                  <p:childTnLst>
+                                    <p:animEffect transition="out" filter="fade">
+                                      <p:cBhvr>
+                                        <p:cTn id="6" dur="1000"/>
+                                        <p:tgtEl>
+                                          <p:spTgt spid="14"/>
+                                        </p:tgtEl>
+                                      </p:cBhvr>
+                                    </p:animEffect>
+                                    <p:set>
+                                      <p:cBhvr>
+                                        <p:cTn id="7" dur="1" fill="hold">
+                                          <p:stCondLst>
+                                            <p:cond delay="999"/>
+                                          </p:stCondLst>
+                                        </p:cTn>
+                                        <p:tgtEl>
+                                          <p:spTgt spid="14"/>
+                                        </p:tgtEl>
+                                        <p:attrNameLst>
+                                          <p:attrName>style.visibility</p:attrName>
+                                        </p:attrNameLst>
+                                      </p:cBhvr>
+                                      <p:to>
+                                        <p:strVal val="hidden"/>
+                                      </p:to>
+                                    </p:set>
+                                  </p:childTnLst>
+                                </p:cTn>
+                              </p:par>
+                              <p:par>
+                                <p:cTn id="8" presetID="10" presetClass="entr" presetSubtype="0" fill="hold" grpId="0" nodeType="withEffect">
+                                  <p:stCondLst>
+                                    <p:cond delay="0"/>
+                                  </p:stCondLst>
+                                  <p:childTnLst>
+                                    <p:set>
+                                      <p:cBhvr>
+                                        <p:cTn id="9" dur="1" fill="hold">
+                                          <p:stCondLst>
+                                            <p:cond delay="0"/>
+                                          </p:stCondLst>
+                                        </p:cTn>
+                                        <p:tgtEl>
+                                          <p:spTgt spid="15"/>
+                                        </p:tgtEl>
+                                        <p:attrNameLst>
+                                          <p:attrName>style.visibility</p:attrName>
+                                        </p:attrNameLst>
+                                      </p:cBhvr>
+                                      <p:to>
+                                        <p:strVal val="visible"/>
+                                      </p:to>
+                                    </p:set>
+                                    <p:animEffect transition="in" filter="fade">
+                                      <p:cBhvr>
+                                        <p:cTn id="10" dur="2000"/>
+                                        <p:tgtEl>
+                                          <p:spTgt spid="15"/>
+                                        </p:tgtEl>
+                                      </p:cBhvr>
+                                    </p:animEffect>
+                                  </p:childTnLst>
+                                </p:cTn>
+                              </p:par>
+                            </p:childTnLst>
+                          </p:cTn>
+                        </p:par>
+                        <p:par>
+                          <p:cTn id="11" fill="hold">
+                            <p:stCondLst>
+                              <p:cond delay="2000"/>
+                            </p:stCondLst>
+                            <p:childTnLst>
+                              <p:par>
+                                <p:cTn id="12" presetID="22" presetClass="entr" presetSubtype="8" fill="hold" grpId="1" nodeType="afterEffect">
+                                  <p:stCondLst>
+                                    <p:cond delay="0"/>
+                                  </p:stCondLst>
+                                  <p:childTnLst>
+                                    <p:set>
+                                      <p:cBhvr>
+                                        <p:cTn id="13" dur="1" fill="hold">
+                                          <p:stCondLst>
+                                            <p:cond delay="0"/>
+                                          </p:stCondLst>
+                                        </p:cTn>
+                                        <p:tgtEl>
+                                          <p:spTgt spid="4"/>
+                                        </p:tgtEl>
+                                        <p:attrNameLst>
+                                          <p:attrName>style.visibility</p:attrName>
+                                        </p:attrNameLst>
+                                      </p:cBhvr>
+                                      <p:to>
+                                        <p:strVal val="visible"/>
+                                      </p:to>
+                                    </p:set>
+                                    <p:animEffect transition="in" filter="wipe(left)">
+                                      <p:cBhvr>
+                                        <p:cTn id="14" dur="2300"/>
+                                        <p:tgtEl>
+                                          <p:spTgt spid="4"/>
+                                        </p:tgtEl>
+                                      </p:cBhvr>
+                                    </p:animEffect>
+                                  </p:childTnLst>
+                                </p:cTn>
+                              </p:par>
+                            </p:childTnLst>
+                          </p:cTn>
+                        </p:par>
+                      </p:childTnLst>
+                    </p:cTn>
+                  </p:par>
+                  <p:par>
+                    <p:cTn id="15" fill="hold">
+                      <p:stCondLst>
+                        <p:cond delay="indefinite"/>
+                      </p:stCondLst>
+                      <p:childTnLst>
+                        <p:par>
+                          <p:cTn id="16" fill="hold">
+                            <p:stCondLst>
+                              <p:cond delay="0"/>
+                            </p:stCondLst>
+                            <p:childTnLst>
+                              <p:par>
+                                <p:cTn id="17" presetID="22" presetClass="entr" presetSubtype="8" fill="hold" grpId="1" nodeType="clickEffect">
+                                  <p:stCondLst>
+                                    <p:cond delay="0"/>
+                                  </p:stCondLst>
+                                  <p:childTnLst>
+                                    <p:set>
+                                      <p:cBhvr>
+                                        <p:cTn id="18" dur="1" fill="hold">
+                                          <p:stCondLst>
+                                            <p:cond delay="0"/>
+                                          </p:stCondLst>
+                                        </p:cTn>
+                                        <p:tgtEl>
+                                          <p:spTgt spid="6"/>
+                                        </p:tgtEl>
+                                        <p:attrNameLst>
+                                          <p:attrName>style.visibility</p:attrName>
+                                        </p:attrNameLst>
+                                      </p:cBhvr>
+                                      <p:to>
+                                        <p:strVal val="visible"/>
+                                      </p:to>
+                                    </p:set>
+                                    <p:animEffect transition="in" filter="wipe(left)">
+                                      <p:cBhvr>
+                                        <p:cTn id="19" dur="2000"/>
+                                        <p:tgtEl>
+                                          <p:spTgt spid="6"/>
+                                        </p:tgtEl>
+                                      </p:cBhvr>
+                                    </p:animEffect>
+                                  </p:childTnLst>
+                                </p:cTn>
+                              </p:par>
+                              <p:par>
+                                <p:cTn id="20" presetID="9" presetClass="emph" presetSubtype="0" grpId="0" nodeType="withEffect">
+                                  <p:stCondLst>
+                                    <p:cond delay="0"/>
+                                  </p:stCondLst>
+                                  <p:childTnLst>
+                                    <p:set>
+                                      <p:cBhvr rctx="PPT">
+                                        <p:cTn id="21" dur="indefinite"/>
+                                        <p:tgtEl>
+                                          <p:spTgt spid="4"/>
+                                        </p:tgtEl>
+                                        <p:attrNameLst>
+                                          <p:attrName>style.opacity</p:attrName>
+                                        </p:attrNameLst>
+                                      </p:cBhvr>
+                                      <p:to>
+                                        <p:strVal val="0.25"/>
+                                      </p:to>
+                                    </p:set>
+                                    <p:animEffect filter="image" prLst="opacity: 0.25">
+                                      <p:cBhvr rctx="IE">
+                                        <p:cTn id="22" dur="indefinite"/>
+                                        <p:tgtEl>
+                                          <p:spTgt spid="4"/>
+                                        </p:tgtEl>
+                                      </p:cBhvr>
+                                    </p:animEffect>
+                                  </p:childTnLst>
+                                </p:cTn>
+                              </p:par>
+                            </p:childTnLst>
+                          </p:cTn>
+                        </p:par>
+                      </p:childTnLst>
+                    </p:cTn>
+                  </p:par>
+                  <p:par>
+                    <p:cTn id="23" fill="hold">
+                      <p:stCondLst>
+                        <p:cond delay="indefinite"/>
+                      </p:stCondLst>
+                      <p:childTnLst>
+                        <p:par>
+                          <p:cTn id="24" fill="hold">
+                            <p:stCondLst>
+                              <p:cond delay="0"/>
+                            </p:stCondLst>
+                            <p:childTnLst>
+                              <p:par>
+                                <p:cTn id="25" presetID="22" presetClass="entr" presetSubtype="8" fill="hold" grpId="1" nodeType="clickEffect">
+                                  <p:stCondLst>
+                                    <p:cond delay="0"/>
+                                  </p:stCondLst>
+                                  <p:childTnLst>
+                                    <p:set>
+                                      <p:cBhvr>
+                                        <p:cTn id="26" dur="1" fill="hold">
+                                          <p:stCondLst>
+                                            <p:cond delay="0"/>
+                                          </p:stCondLst>
+                                        </p:cTn>
+                                        <p:tgtEl>
+                                          <p:spTgt spid="7"/>
+                                        </p:tgtEl>
+                                        <p:attrNameLst>
+                                          <p:attrName>style.visibility</p:attrName>
+                                        </p:attrNameLst>
+                                      </p:cBhvr>
+                                      <p:to>
+                                        <p:strVal val="visible"/>
+                                      </p:to>
+                                    </p:set>
+                                    <p:animEffect transition="in" filter="wipe(left)">
+                                      <p:cBhvr>
+                                        <p:cTn id="27" dur="2000"/>
+                                        <p:tgtEl>
+                                          <p:spTgt spid="7"/>
+                                        </p:tgtEl>
+                                      </p:cBhvr>
+                                    </p:animEffect>
+                                  </p:childTnLst>
+                                </p:cTn>
+                              </p:par>
+                              <p:par>
+                                <p:cTn id="28" presetID="9" presetClass="emph" presetSubtype="0" grpId="0" nodeType="withEffect">
+                                  <p:stCondLst>
+                                    <p:cond delay="0"/>
+                                  </p:stCondLst>
+                                  <p:childTnLst>
+                                    <p:set>
+                                      <p:cBhvr rctx="PPT">
+                                        <p:cTn id="29" dur="indefinite"/>
+                                        <p:tgtEl>
+                                          <p:spTgt spid="6"/>
+                                        </p:tgtEl>
+                                        <p:attrNameLst>
+                                          <p:attrName>style.opacity</p:attrName>
+                                        </p:attrNameLst>
+                                      </p:cBhvr>
+                                      <p:to>
+                                        <p:strVal val="0.25"/>
+                                      </p:to>
+                                    </p:set>
+                                    <p:animEffect filter="image" prLst="opacity: 0.25">
+                                      <p:cBhvr rctx="IE">
+                                        <p:cTn id="30" dur="indefinite"/>
+                                        <p:tgtEl>
+                                          <p:spTgt spid="6"/>
+                                        </p:tgtEl>
+                                      </p:cBhvr>
+                                    </p:animEffect>
+                                  </p:childTnLst>
+                                </p:cTn>
+                              </p:par>
+                            </p:childTnLst>
+                          </p:cTn>
+                        </p:par>
+                        <p:par>
+                          <p:cTn id="31" fill="hold">
+                            <p:stCondLst>
+                              <p:cond delay="2000"/>
+                            </p:stCondLst>
+                            <p:childTnLst>
+                              <p:par>
+                                <p:cTn id="32" presetID="22" presetClass="entr" presetSubtype="8" fill="hold" grpId="1" nodeType="afterEffect">
+                                  <p:stCondLst>
+                                    <p:cond delay="0"/>
+                                  </p:stCondLst>
+                                  <p:childTnLst>
+                                    <p:set>
+                                      <p:cBhvr>
+                                        <p:cTn id="33" dur="1" fill="hold">
+                                          <p:stCondLst>
+                                            <p:cond delay="0"/>
+                                          </p:stCondLst>
+                                        </p:cTn>
+                                        <p:tgtEl>
+                                          <p:spTgt spid="12"/>
+                                        </p:tgtEl>
+                                        <p:attrNameLst>
+                                          <p:attrName>style.visibility</p:attrName>
+                                        </p:attrNameLst>
+                                      </p:cBhvr>
+                                      <p:to>
+                                        <p:strVal val="visible"/>
+                                      </p:to>
+                                    </p:set>
+                                    <p:animEffect transition="in" filter="wipe(left)">
+                                      <p:cBhvr>
+                                        <p:cTn id="34" dur="2000"/>
+                                        <p:tgtEl>
+                                          <p:spTgt spid="12"/>
+                                        </p:tgtEl>
+                                      </p:cBhvr>
+                                    </p:animEffect>
+                                  </p:childTnLst>
+                                </p:cTn>
+                              </p:par>
+                            </p:childTnLst>
+                          </p:cTn>
+                        </p:par>
+                      </p:childTnLst>
+                    </p:cTn>
+                  </p:par>
+                  <p:par>
+                    <p:cTn id="35" fill="hold">
+                      <p:stCondLst>
+                        <p:cond delay="indefinite"/>
+                      </p:stCondLst>
+                      <p:childTnLst>
+                        <p:par>
+                          <p:cTn id="36" fill="hold">
+                            <p:stCondLst>
+                              <p:cond delay="0"/>
+                            </p:stCondLst>
+                            <p:childTnLst>
+                              <p:par>
+                                <p:cTn id="37" presetID="22" presetClass="entr" presetSubtype="8" fill="hold" grpId="1" nodeType="clickEffect">
+                                  <p:stCondLst>
+                                    <p:cond delay="0"/>
+                                  </p:stCondLst>
+                                  <p:childTnLst>
+                                    <p:set>
+                                      <p:cBhvr>
+                                        <p:cTn id="38" dur="1" fill="hold">
+                                          <p:stCondLst>
+                                            <p:cond delay="0"/>
+                                          </p:stCondLst>
+                                        </p:cTn>
+                                        <p:tgtEl>
+                                          <p:spTgt spid="10"/>
+                                        </p:tgtEl>
+                                        <p:attrNameLst>
+                                          <p:attrName>style.visibility</p:attrName>
+                                        </p:attrNameLst>
+                                      </p:cBhvr>
+                                      <p:to>
+                                        <p:strVal val="visible"/>
+                                      </p:to>
+                                    </p:set>
+                                    <p:animEffect transition="in" filter="wipe(left)">
+                                      <p:cBhvr>
+                                        <p:cTn id="39" dur="2000"/>
+                                        <p:tgtEl>
+                                          <p:spTgt spid="10"/>
+                                        </p:tgtEl>
+                                      </p:cBhvr>
+                                    </p:animEffect>
+                                  </p:childTnLst>
+                                </p:cTn>
+                              </p:par>
+                              <p:par>
+                                <p:cTn id="40" presetID="9" presetClass="emph" presetSubtype="0" grpId="0" nodeType="withEffect">
+                                  <p:stCondLst>
+                                    <p:cond delay="0"/>
+                                  </p:stCondLst>
+                                  <p:childTnLst>
+                                    <p:set>
+                                      <p:cBhvr rctx="PPT">
+                                        <p:cTn id="41" dur="indefinite"/>
+                                        <p:tgtEl>
+                                          <p:spTgt spid="7"/>
+                                        </p:tgtEl>
+                                        <p:attrNameLst>
+                                          <p:attrName>style.opacity</p:attrName>
+                                        </p:attrNameLst>
+                                      </p:cBhvr>
+                                      <p:to>
+                                        <p:strVal val="0.25"/>
+                                      </p:to>
+                                    </p:set>
+                                    <p:animEffect filter="image" prLst="opacity: 0.25">
+                                      <p:cBhvr rctx="IE">
+                                        <p:cTn id="42" dur="indefinite"/>
+                                        <p:tgtEl>
+                                          <p:spTgt spid="7"/>
+                                        </p:tgtEl>
+                                      </p:cBhvr>
+                                    </p:animEffect>
+                                  </p:childTnLst>
+                                </p:cTn>
+                              </p:par>
+                            </p:childTnLst>
+                          </p:cTn>
+                        </p:par>
+                      </p:childTnLst>
+                    </p:cTn>
+                  </p:par>
+                  <p:par>
+                    <p:cTn id="43" fill="hold">
+                      <p:stCondLst>
+                        <p:cond delay="indefinite"/>
+                      </p:stCondLst>
+                      <p:childTnLst>
+                        <p:par>
+                          <p:cTn id="44" fill="hold">
+                            <p:stCondLst>
+                              <p:cond delay="0"/>
+                            </p:stCondLst>
+                            <p:childTnLst>
+                              <p:par>
+                                <p:cTn id="45" presetID="22" presetClass="entr" presetSubtype="8" fill="hold" grpId="1" nodeType="clickEffect">
+                                  <p:stCondLst>
+                                    <p:cond delay="0"/>
+                                  </p:stCondLst>
+                                  <p:childTnLst>
+                                    <p:set>
+                                      <p:cBhvr>
+                                        <p:cTn id="46" dur="1" fill="hold">
+                                          <p:stCondLst>
+                                            <p:cond delay="0"/>
+                                          </p:stCondLst>
+                                        </p:cTn>
+                                        <p:tgtEl>
+                                          <p:spTgt spid="11"/>
+                                        </p:tgtEl>
+                                        <p:attrNameLst>
+                                          <p:attrName>style.visibility</p:attrName>
+                                        </p:attrNameLst>
+                                      </p:cBhvr>
+                                      <p:to>
+                                        <p:strVal val="visible"/>
+                                      </p:to>
+                                    </p:set>
+                                    <p:animEffect transition="in" filter="wipe(left)">
+                                      <p:cBhvr>
+                                        <p:cTn id="47" dur="2000"/>
+                                        <p:tgtEl>
+                                          <p:spTgt spid="11"/>
+                                        </p:tgtEl>
+                                      </p:cBhvr>
+                                    </p:animEffect>
+                                  </p:childTnLst>
+                                </p:cTn>
+                              </p:par>
+                            </p:childTnLst>
+                          </p:cTn>
+                        </p:par>
+                      </p:childTnLst>
+                    </p:cTn>
+                  </p:par>
+                </p:childTnLst>
+              </p:cTn>
+              <p:prevCondLst>
+                <p:cond evt="onPrev" delay="0">
+                  <p:tgtEl>
+                    <p:sldTgt/>
+                  </p:tgtEl>
+                </p:cond>
+              </p:prevCondLst>
+              <p:nextCondLst>
+                <p:cond evt="onNext" delay="0">
+                  <p:tgtEl>
+                    <p:sldTgt/>
+                  </p:tgtEl>
+                </p:cond>
+              </p:nextCondLst>
+            </p:seq>
+          </p:childTnLst>
+        </p:cTn>
+      </p:par>
+    </p:tnLst>
+    <p:bldLst>
+      <p:bldP spid="14" grpId="0" animBg="1"/>
+      <p:bldP spid="4" grpId="0" animBg="1"/>
+      <p:bldP spid="4" grpId="1" animBg="1"/>
+      <p:bldP spid="6" grpId="0" animBg="1"/>
+      <p:bldP spid="6" grpId="1" animBg="1"/>
+      <p:bldP spid="7" grpId="0" animBg="1"/>
+      <p:bldP spid="7" grpId="1" animBg="1"/>
+      <p:bldP spid="10" grpId="1" animBg="1"/>
+      <p:bldP spid="11" grpId="1" animBg="1"/>
+      <p:bldP spid="12" grpId="1" animBg="1"/>
+      <p:bldP spid="15" grpId="0" animBg="1"/>
+    </p:bldLst>
+  </p:timing>
+</p:sld>
+</file>
+
+<file path=ppt/slides/slide11.xml><?xml version="1.0" encoding="utf-8"?>
 <p:sld xmlns:a="http://schemas.openxmlformats.org/drawingml/2006/main" xmlns:r="http://schemas.openxmlformats.org/officeDocument/2006/relationships" xmlns:p="http://schemas.openxmlformats.org/presentationml/2006/main">
   <p:cSld>
     <p:spTree>
@@ -9846,7 +11329,7 @@
 </p:sld>
 </file>
 
-<file path=ppt/slides/slide11.xml><?xml version="1.0" encoding="utf-8"?>
+<file path=ppt/slides/slide12.xml><?xml version="1.0" encoding="utf-8"?>
 <p:sld xmlns:a="http://schemas.openxmlformats.org/drawingml/2006/main" xmlns:r="http://schemas.openxmlformats.org/officeDocument/2006/relationships" xmlns:p="http://schemas.openxmlformats.org/presentationml/2006/main">
   <p:cSld>
     <p:spTree>
@@ -11294,7 +12777,7 @@
 </p:sld>
 </file>
 
-<file path=ppt/slides/slide12.xml><?xml version="1.0" encoding="utf-8"?>
+<file path=ppt/slides/slide13.xml><?xml version="1.0" encoding="utf-8"?>
 <p:sld xmlns:a="http://schemas.openxmlformats.org/drawingml/2006/main" xmlns:r="http://schemas.openxmlformats.org/officeDocument/2006/relationships" xmlns:p="http://schemas.openxmlformats.org/presentationml/2006/main">
   <p:cSld>
     <p:spTree>
@@ -13135,7 +14618,7 @@
 </p:sld>
 </file>
 
-<file path=ppt/slides/slide13.xml><?xml version="1.0" encoding="utf-8"?>
+<file path=ppt/slides/slide14.xml><?xml version="1.0" encoding="utf-8"?>
 <p:sld xmlns:a="http://schemas.openxmlformats.org/drawingml/2006/main" xmlns:r="http://schemas.openxmlformats.org/officeDocument/2006/relationships" xmlns:p="http://schemas.openxmlformats.org/presentationml/2006/main">
   <p:cSld>
     <p:spTree>
@@ -14488,7 +15971,7 @@
 </p:sld>
 </file>
 
-<file path=ppt/slides/slide14.xml><?xml version="1.0" encoding="utf-8"?>
+<file path=ppt/slides/slide15.xml><?xml version="1.0" encoding="utf-8"?>
 <p:sld xmlns:a="http://schemas.openxmlformats.org/drawingml/2006/main" xmlns:r="http://schemas.openxmlformats.org/officeDocument/2006/relationships" xmlns:p="http://schemas.openxmlformats.org/presentationml/2006/main">
   <p:cSld>
     <p:spTree>
@@ -16013,7 +17496,7 @@
 </p:sld>
 </file>
 
-<file path=ppt/slides/slide15.xml><?xml version="1.0" encoding="utf-8"?>
+<file path=ppt/slides/slide16.xml><?xml version="1.0" encoding="utf-8"?>
 <p:sld xmlns:a="http://schemas.openxmlformats.org/drawingml/2006/main" xmlns:r="http://schemas.openxmlformats.org/officeDocument/2006/relationships" xmlns:p="http://schemas.openxmlformats.org/presentationml/2006/main">
   <p:cSld>
     <p:spTree>
@@ -17995,7 +19478,7 @@
 </p:sld>
 </file>
 
-<file path=ppt/slides/slide16.xml><?xml version="1.0" encoding="utf-8"?>
+<file path=ppt/slides/slide17.xml><?xml version="1.0" encoding="utf-8"?>
 <p:sld xmlns:a="http://schemas.openxmlformats.org/drawingml/2006/main" xmlns:r="http://schemas.openxmlformats.org/officeDocument/2006/relationships" xmlns:p="http://schemas.openxmlformats.org/presentationml/2006/main">
   <p:cSld>
     <p:spTree>
@@ -18871,7 +20354,7 @@
 </p:sld>
 </file>
 
-<file path=ppt/slides/slide17.xml><?xml version="1.0" encoding="utf-8"?>
+<file path=ppt/slides/slide18.xml><?xml version="1.0" encoding="utf-8"?>
 <p:sld xmlns:a="http://schemas.openxmlformats.org/drawingml/2006/main" xmlns:r="http://schemas.openxmlformats.org/officeDocument/2006/relationships" xmlns:p="http://schemas.openxmlformats.org/presentationml/2006/main">
   <p:cSld>
     <p:spTree>
@@ -18969,6 +20452,888 @@
 </file>
 
 <file path=ppt/slides/slide2.xml><?xml version="1.0" encoding="utf-8"?>
+<p:sld xmlns:a="http://schemas.openxmlformats.org/drawingml/2006/main" xmlns:r="http://schemas.openxmlformats.org/officeDocument/2006/relationships" xmlns:p="http://schemas.openxmlformats.org/presentationml/2006/main">
+  <p:cSld>
+    <p:spTree>
+      <p:nvGrpSpPr>
+        <p:cNvPr id="1" name=""/>
+        <p:cNvGrpSpPr/>
+        <p:nvPr/>
+      </p:nvGrpSpPr>
+      <p:grpSpPr>
+        <a:xfrm>
+          <a:off x="0" y="0"/>
+          <a:ext cx="0" cy="0"/>
+          <a:chOff x="0" y="0"/>
+          <a:chExt cx="0" cy="0"/>
+        </a:xfrm>
+      </p:grpSpPr>
+      <p:sp>
+        <p:nvSpPr>
+          <p:cNvPr id="4" name="TextBox 3"/>
+          <p:cNvSpPr txBox="1"/>
+          <p:nvPr/>
+        </p:nvSpPr>
+        <p:spPr>
+          <a:xfrm>
+            <a:off x="300444" y="871211"/>
+            <a:ext cx="11614890" cy="830997"/>
+          </a:xfrm>
+          <a:prstGeom prst="rect">
+            <a:avLst/>
+          </a:prstGeom>
+          <a:solidFill>
+            <a:schemeClr val="accent2">
+              <a:lumMod val="40000"/>
+              <a:lumOff val="60000"/>
+            </a:schemeClr>
+          </a:solidFill>
+        </p:spPr>
+        <p:txBody>
+          <a:bodyPr wrap="square" rtlCol="0">
+            <a:spAutoFit/>
+          </a:bodyPr>
+          <a:lstStyle/>
+          <a:p>
+            <a:pPr algn="just"/>
+            <a:r>
+              <a:rPr lang="en-GB" sz="2400" b="1" dirty="0"/>
+              <a:t>Sequence Alignment Map (SAM)</a:t>
+            </a:r>
+            <a:r>
+              <a:rPr lang="en-GB" sz="2400" dirty="0"/>
+              <a:t> is a </a:t>
+            </a:r>
+            <a:r>
+              <a:rPr lang="en-GB" sz="2400" dirty="0" smtClean="0"/>
+              <a:t>format primarily for storing </a:t>
+            </a:r>
+            <a:r>
+              <a:rPr lang="en-GB" sz="2400" b="1" dirty="0" smtClean="0"/>
+              <a:t>Sequencing Reads </a:t>
+            </a:r>
+            <a:r>
+              <a:rPr lang="en-GB" sz="2400" dirty="0" smtClean="0"/>
+              <a:t>aligned to </a:t>
+            </a:r>
+            <a:r>
+              <a:rPr lang="en-GB" sz="2400" b="1" dirty="0" smtClean="0"/>
+              <a:t>Reference Sequence(s)</a:t>
+            </a:r>
+            <a:r>
+              <a:rPr lang="en-GB" sz="2400" dirty="0" smtClean="0"/>
+              <a:t>.</a:t>
+            </a:r>
+            <a:endParaRPr lang="en-GB" sz="2400" dirty="0"/>
+          </a:p>
+        </p:txBody>
+      </p:sp>
+      <p:sp>
+        <p:nvSpPr>
+          <p:cNvPr id="5" name="TextBox 4"/>
+          <p:cNvSpPr txBox="1"/>
+          <p:nvPr/>
+        </p:nvSpPr>
+        <p:spPr>
+          <a:xfrm>
+            <a:off x="300444" y="2101456"/>
+            <a:ext cx="11614891" cy="830997"/>
+          </a:xfrm>
+          <a:prstGeom prst="rect">
+            <a:avLst/>
+          </a:prstGeom>
+          <a:solidFill>
+            <a:schemeClr val="accent2">
+              <a:lumMod val="40000"/>
+              <a:lumOff val="60000"/>
+            </a:schemeClr>
+          </a:solidFill>
+        </p:spPr>
+        <p:txBody>
+          <a:bodyPr wrap="square" rtlCol="0">
+            <a:spAutoFit/>
+          </a:bodyPr>
+          <a:lstStyle/>
+          <a:p>
+            <a:pPr algn="just"/>
+            <a:r>
+              <a:rPr lang="en-GB" sz="2400" b="1" dirty="0" smtClean="0"/>
+              <a:t>Reference Sequences </a:t>
+            </a:r>
+            <a:r>
+              <a:rPr lang="en-GB" sz="2400" dirty="0" smtClean="0"/>
+              <a:t>are typically the sequences of whole </a:t>
+            </a:r>
+            <a:r>
+              <a:rPr lang="en-GB" sz="2400" b="1" dirty="0" smtClean="0"/>
+              <a:t>Chromosomes</a:t>
+            </a:r>
+            <a:r>
+              <a:rPr lang="en-GB" sz="2400" dirty="0" smtClean="0"/>
+              <a:t>/</a:t>
+            </a:r>
+            <a:r>
+              <a:rPr lang="en-GB" sz="2400" b="1" dirty="0" smtClean="0"/>
+              <a:t>Genomes</a:t>
+            </a:r>
+            <a:r>
+              <a:rPr lang="en-GB" sz="2400" dirty="0" smtClean="0"/>
+              <a:t> of the organism from which the </a:t>
+            </a:r>
+            <a:r>
+              <a:rPr lang="en-GB" sz="2400" b="1" dirty="0" smtClean="0"/>
+              <a:t>Sequencing Reads </a:t>
+            </a:r>
+            <a:r>
+              <a:rPr lang="en-GB" sz="2400" dirty="0" smtClean="0"/>
+              <a:t>were derived (or a very similar organism).</a:t>
+            </a:r>
+            <a:endParaRPr lang="en-GB" sz="2400" dirty="0"/>
+          </a:p>
+        </p:txBody>
+      </p:sp>
+      <p:sp>
+        <p:nvSpPr>
+          <p:cNvPr id="6" name="TextBox 5"/>
+          <p:cNvSpPr txBox="1"/>
+          <p:nvPr/>
+        </p:nvSpPr>
+        <p:spPr>
+          <a:xfrm>
+            <a:off x="300444" y="4931277"/>
+            <a:ext cx="11614891" cy="461665"/>
+          </a:xfrm>
+          <a:prstGeom prst="rect">
+            <a:avLst/>
+          </a:prstGeom>
+          <a:solidFill>
+            <a:schemeClr val="accent2">
+              <a:lumMod val="40000"/>
+              <a:lumOff val="60000"/>
+            </a:schemeClr>
+          </a:solidFill>
+        </p:spPr>
+        <p:txBody>
+          <a:bodyPr wrap="square" rtlCol="0">
+            <a:spAutoFit/>
+          </a:bodyPr>
+          <a:lstStyle/>
+          <a:p>
+            <a:pPr algn="just"/>
+            <a:r>
+              <a:rPr lang="en-GB" sz="2400" dirty="0" smtClean="0"/>
+              <a:t>As </a:t>
+            </a:r>
+            <a:r>
+              <a:rPr lang="en-GB" sz="2400" b="1" dirty="0" smtClean="0"/>
+              <a:t>SAM </a:t>
+            </a:r>
+            <a:r>
+              <a:rPr lang="en-GB" sz="2400" b="1" dirty="0" smtClean="0"/>
+              <a:t>Format </a:t>
+            </a:r>
+            <a:r>
+              <a:rPr lang="en-GB" sz="2400" dirty="0" smtClean="0"/>
+              <a:t>files are human </a:t>
+            </a:r>
+            <a:r>
+              <a:rPr lang="en-GB" sz="2400" dirty="0" smtClean="0"/>
+              <a:t>readable, they are the </a:t>
+            </a:r>
+            <a:r>
+              <a:rPr lang="en-GB" sz="2400" dirty="0" smtClean="0"/>
+              <a:t>obvious choice for discussion.</a:t>
+            </a:r>
+            <a:endParaRPr lang="en-GB" sz="2400" dirty="0"/>
+          </a:p>
+        </p:txBody>
+      </p:sp>
+      <p:sp>
+        <p:nvSpPr>
+          <p:cNvPr id="7" name="TextBox 6">
+            <a:extLst>
+              <a:ext uri="{FF2B5EF4-FFF2-40B4-BE49-F238E27FC236}">
+                <a16:creationId xmlns:a16="http://schemas.microsoft.com/office/drawing/2014/main" xmlns="" id="{6F77B270-35F1-4A5B-875A-9BFD13BC898E}"/>
+              </a:ext>
+            </a:extLst>
+          </p:cNvPr>
+          <p:cNvSpPr txBox="1"/>
+          <p:nvPr/>
+        </p:nvSpPr>
+        <p:spPr>
+          <a:xfrm>
+            <a:off x="3779500" y="-6111"/>
+            <a:ext cx="4633001" cy="646331"/>
+          </a:xfrm>
+          <a:prstGeom prst="rect">
+            <a:avLst/>
+          </a:prstGeom>
+          <a:noFill/>
+        </p:spPr>
+        <p:txBody>
+          <a:bodyPr wrap="square" rtlCol="0">
+            <a:spAutoFit/>
+          </a:bodyPr>
+          <a:lstStyle/>
+          <a:p>
+            <a:r>
+              <a:rPr lang="en-GB" sz="3600" b="1" u="sng" dirty="0" smtClean="0">
+                <a:solidFill>
+                  <a:srgbClr val="FF0000"/>
+                </a:solidFill>
+                <a:highlight>
+                  <a:srgbClr val="00FFFF"/>
+                </a:highlight>
+                <a:latin typeface="Courier New" panose="02070309020205020404" pitchFamily="49" charset="0"/>
+                <a:cs typeface="Courier New" panose="02070309020205020404" pitchFamily="49" charset="0"/>
+                <a:hlinkClick r:id="rId2"/>
+              </a:rPr>
+              <a:t>SAM (BAM) Format</a:t>
+            </a:r>
+            <a:endParaRPr lang="en-GB" sz="3600" b="1" u="sng" dirty="0">
+              <a:solidFill>
+                <a:srgbClr val="FF0000"/>
+              </a:solidFill>
+              <a:highlight>
+                <a:srgbClr val="00FFFF"/>
+              </a:highlight>
+              <a:latin typeface="Courier New" panose="02070309020205020404" pitchFamily="49" charset="0"/>
+              <a:cs typeface="Courier New" panose="02070309020205020404" pitchFamily="49" charset="0"/>
+            </a:endParaRPr>
+          </a:p>
+        </p:txBody>
+      </p:sp>
+      <p:sp>
+        <p:nvSpPr>
+          <p:cNvPr id="9" name="TextBox 8"/>
+          <p:cNvSpPr txBox="1"/>
+          <p:nvPr/>
+        </p:nvSpPr>
+        <p:spPr>
+          <a:xfrm>
+            <a:off x="300444" y="3331700"/>
+            <a:ext cx="11614890" cy="1200329"/>
+          </a:xfrm>
+          <a:prstGeom prst="rect">
+            <a:avLst/>
+          </a:prstGeom>
+          <a:solidFill>
+            <a:schemeClr val="accent2">
+              <a:lumMod val="40000"/>
+              <a:lumOff val="60000"/>
+            </a:schemeClr>
+          </a:solidFill>
+        </p:spPr>
+        <p:txBody>
+          <a:bodyPr wrap="square" rtlCol="0">
+            <a:spAutoFit/>
+          </a:bodyPr>
+          <a:lstStyle/>
+          <a:p>
+            <a:pPr algn="just"/>
+            <a:r>
+              <a:rPr lang="en-GB" sz="2400" b="1" dirty="0"/>
+              <a:t>Binary Alignment </a:t>
+            </a:r>
+            <a:r>
+              <a:rPr lang="en-GB" sz="2400" b="1" dirty="0" smtClean="0"/>
+              <a:t>Map (</a:t>
+            </a:r>
+            <a:r>
+              <a:rPr lang="en-GB" sz="2400" b="1" dirty="0" smtClean="0"/>
+              <a:t>BAM)</a:t>
+            </a:r>
+            <a:r>
+              <a:rPr lang="en-GB" sz="2400" dirty="0" smtClean="0"/>
+              <a:t> </a:t>
+            </a:r>
+            <a:r>
+              <a:rPr lang="en-GB" sz="2400" dirty="0" smtClean="0"/>
+              <a:t>files are simply </a:t>
+            </a:r>
+            <a:r>
+              <a:rPr lang="en-GB" sz="2400" b="1" dirty="0" smtClean="0"/>
+              <a:t>SAM</a:t>
+            </a:r>
+            <a:r>
+              <a:rPr lang="en-GB" sz="2400" dirty="0" smtClean="0"/>
+              <a:t> files that have been compressed to save space</a:t>
+            </a:r>
+            <a:r>
+              <a:rPr lang="en-GB" sz="2400" dirty="0"/>
+              <a:t>. So </a:t>
+            </a:r>
+            <a:r>
+              <a:rPr lang="en-GB" sz="2400" b="1" dirty="0"/>
+              <a:t>SAM </a:t>
+            </a:r>
+            <a:r>
+              <a:rPr lang="en-GB" sz="2400" dirty="0" smtClean="0"/>
+              <a:t>and </a:t>
+            </a:r>
+            <a:r>
+              <a:rPr lang="en-GB" sz="2400" b="1" dirty="0"/>
+              <a:t>BAM </a:t>
+            </a:r>
+            <a:r>
+              <a:rPr lang="en-GB" sz="2400" b="1" dirty="0" smtClean="0"/>
+              <a:t>Formats </a:t>
+            </a:r>
+            <a:r>
+              <a:rPr lang="en-GB" sz="2400" dirty="0"/>
+              <a:t>are effectively identical.</a:t>
+            </a:r>
+          </a:p>
+          <a:p>
+            <a:pPr algn="just"/>
+            <a:endParaRPr lang="en-GB" sz="2400" dirty="0"/>
+          </a:p>
+        </p:txBody>
+      </p:sp>
+      <p:sp>
+        <p:nvSpPr>
+          <p:cNvPr id="10" name="TextBox 9"/>
+          <p:cNvSpPr txBox="1"/>
+          <p:nvPr/>
+        </p:nvSpPr>
+        <p:spPr>
+          <a:xfrm>
+            <a:off x="300444" y="5792189"/>
+            <a:ext cx="11614891" cy="830997"/>
+          </a:xfrm>
+          <a:prstGeom prst="rect">
+            <a:avLst/>
+          </a:prstGeom>
+          <a:solidFill>
+            <a:schemeClr val="accent2">
+              <a:lumMod val="40000"/>
+              <a:lumOff val="60000"/>
+            </a:schemeClr>
+          </a:solidFill>
+        </p:spPr>
+        <p:txBody>
+          <a:bodyPr wrap="square" rtlCol="0">
+            <a:spAutoFit/>
+          </a:bodyPr>
+          <a:lstStyle/>
+          <a:p>
+            <a:pPr algn="just"/>
+            <a:r>
+              <a:rPr lang="en-GB" sz="2400" dirty="0" smtClean="0"/>
+              <a:t>Here we will attempt an overview of </a:t>
+            </a:r>
+            <a:r>
+              <a:rPr lang="en-GB" sz="2400" b="1" dirty="0" smtClean="0"/>
+              <a:t>SAM Format </a:t>
+            </a:r>
+            <a:r>
+              <a:rPr lang="en-GB" sz="2400" dirty="0" smtClean="0"/>
+              <a:t>based upon a discussion of </a:t>
+            </a:r>
+            <a:r>
+              <a:rPr lang="en-GB" sz="2400" dirty="0" smtClean="0">
+                <a:hlinkClick r:id="rId3"/>
+              </a:rPr>
+              <a:t>some examples files </a:t>
+            </a:r>
+            <a:r>
+              <a:rPr lang="en-GB" sz="2400" dirty="0" smtClean="0"/>
+              <a:t>offered by the </a:t>
+            </a:r>
+            <a:r>
+              <a:rPr lang="en-GB" sz="2400" b="1" dirty="0" smtClean="0">
+                <a:hlinkClick r:id="rId4"/>
+              </a:rPr>
+              <a:t>NCBI</a:t>
+            </a:r>
+            <a:r>
+              <a:rPr lang="en-GB" sz="2400" dirty="0" smtClean="0"/>
+              <a:t>.</a:t>
+            </a:r>
+            <a:endParaRPr lang="en-GB" sz="2400" dirty="0"/>
+          </a:p>
+        </p:txBody>
+      </p:sp>
+    </p:spTree>
+    <p:extLst>
+      <p:ext uri="{BB962C8B-B14F-4D97-AF65-F5344CB8AC3E}">
+        <p14:creationId xmlns:p14="http://schemas.microsoft.com/office/powerpoint/2010/main" val="4171817021"/>
+      </p:ext>
+    </p:extLst>
+  </p:cSld>
+  <p:clrMapOvr>
+    <a:masterClrMapping/>
+  </p:clrMapOvr>
+  <p:timing>
+    <p:tnLst>
+      <p:par>
+        <p:cTn id="1" dur="indefinite" restart="never" nodeType="tmRoot">
+          <p:childTnLst>
+            <p:seq concurrent="1" nextAc="seek">
+              <p:cTn id="2" dur="indefinite" nodeType="mainSeq">
+                <p:childTnLst>
+                  <p:par>
+                    <p:cTn id="3" fill="hold">
+                      <p:stCondLst>
+                        <p:cond delay="indefinite"/>
+                      </p:stCondLst>
+                      <p:childTnLst>
+                        <p:par>
+                          <p:cTn id="4" fill="hold">
+                            <p:stCondLst>
+                              <p:cond delay="0"/>
+                            </p:stCondLst>
+                            <p:childTnLst>
+                              <p:par>
+                                <p:cTn id="5" presetID="22" presetClass="entr" presetSubtype="8" fill="hold" grpId="0" nodeType="clickEffect">
+                                  <p:stCondLst>
+                                    <p:cond delay="0"/>
+                                  </p:stCondLst>
+                                  <p:childTnLst>
+                                    <p:set>
+                                      <p:cBhvr>
+                                        <p:cTn id="6" dur="1" fill="hold">
+                                          <p:stCondLst>
+                                            <p:cond delay="0"/>
+                                          </p:stCondLst>
+                                        </p:cTn>
+                                        <p:tgtEl>
+                                          <p:spTgt spid="4"/>
+                                        </p:tgtEl>
+                                        <p:attrNameLst>
+                                          <p:attrName>style.visibility</p:attrName>
+                                        </p:attrNameLst>
+                                      </p:cBhvr>
+                                      <p:to>
+                                        <p:strVal val="visible"/>
+                                      </p:to>
+                                    </p:set>
+                                    <p:animEffect transition="in" filter="wipe(left)">
+                                      <p:cBhvr>
+                                        <p:cTn id="7" dur="2000"/>
+                                        <p:tgtEl>
+                                          <p:spTgt spid="4"/>
+                                        </p:tgtEl>
+                                      </p:cBhvr>
+                                    </p:animEffect>
+                                  </p:childTnLst>
+                                </p:cTn>
+                              </p:par>
+                            </p:childTnLst>
+                          </p:cTn>
+                        </p:par>
+                      </p:childTnLst>
+                    </p:cTn>
+                  </p:par>
+                  <p:par>
+                    <p:cTn id="8" fill="hold">
+                      <p:stCondLst>
+                        <p:cond delay="indefinite"/>
+                      </p:stCondLst>
+                      <p:childTnLst>
+                        <p:par>
+                          <p:cTn id="9" fill="hold">
+                            <p:stCondLst>
+                              <p:cond delay="0"/>
+                            </p:stCondLst>
+                            <p:childTnLst>
+                              <p:par>
+                                <p:cTn id="10" presetID="22" presetClass="entr" presetSubtype="8" fill="hold" grpId="0" nodeType="clickEffect">
+                                  <p:stCondLst>
+                                    <p:cond delay="0"/>
+                                  </p:stCondLst>
+                                  <p:childTnLst>
+                                    <p:set>
+                                      <p:cBhvr>
+                                        <p:cTn id="11" dur="1" fill="hold">
+                                          <p:stCondLst>
+                                            <p:cond delay="0"/>
+                                          </p:stCondLst>
+                                        </p:cTn>
+                                        <p:tgtEl>
+                                          <p:spTgt spid="5"/>
+                                        </p:tgtEl>
+                                        <p:attrNameLst>
+                                          <p:attrName>style.visibility</p:attrName>
+                                        </p:attrNameLst>
+                                      </p:cBhvr>
+                                      <p:to>
+                                        <p:strVal val="visible"/>
+                                      </p:to>
+                                    </p:set>
+                                    <p:animEffect transition="in" filter="wipe(left)">
+                                      <p:cBhvr>
+                                        <p:cTn id="12" dur="2000"/>
+                                        <p:tgtEl>
+                                          <p:spTgt spid="5"/>
+                                        </p:tgtEl>
+                                      </p:cBhvr>
+                                    </p:animEffect>
+                                  </p:childTnLst>
+                                </p:cTn>
+                              </p:par>
+                              <p:par>
+                                <p:cTn id="13" presetID="9" presetClass="emph" presetSubtype="0" grpId="1" nodeType="withEffect">
+                                  <p:stCondLst>
+                                    <p:cond delay="0"/>
+                                  </p:stCondLst>
+                                  <p:childTnLst>
+                                    <p:set>
+                                      <p:cBhvr rctx="PPT">
+                                        <p:cTn id="14" dur="indefinite"/>
+                                        <p:tgtEl>
+                                          <p:spTgt spid="4"/>
+                                        </p:tgtEl>
+                                        <p:attrNameLst>
+                                          <p:attrName>style.opacity</p:attrName>
+                                        </p:attrNameLst>
+                                      </p:cBhvr>
+                                      <p:to>
+                                        <p:strVal val="0.35"/>
+                                      </p:to>
+                                    </p:set>
+                                    <p:animEffect filter="image" prLst="opacity: 0.35">
+                                      <p:cBhvr rctx="IE">
+                                        <p:cTn id="15" dur="indefinite"/>
+                                        <p:tgtEl>
+                                          <p:spTgt spid="4"/>
+                                        </p:tgtEl>
+                                      </p:cBhvr>
+                                    </p:animEffect>
+                                  </p:childTnLst>
+                                </p:cTn>
+                              </p:par>
+                            </p:childTnLst>
+                          </p:cTn>
+                        </p:par>
+                      </p:childTnLst>
+                    </p:cTn>
+                  </p:par>
+                  <p:par>
+                    <p:cTn id="16" fill="hold">
+                      <p:stCondLst>
+                        <p:cond delay="indefinite"/>
+                      </p:stCondLst>
+                      <p:childTnLst>
+                        <p:par>
+                          <p:cTn id="17" fill="hold">
+                            <p:stCondLst>
+                              <p:cond delay="0"/>
+                            </p:stCondLst>
+                            <p:childTnLst>
+                              <p:par>
+                                <p:cTn id="18" presetID="22" presetClass="entr" presetSubtype="8" fill="hold" grpId="0" nodeType="clickEffect">
+                                  <p:stCondLst>
+                                    <p:cond delay="0"/>
+                                  </p:stCondLst>
+                                  <p:childTnLst>
+                                    <p:set>
+                                      <p:cBhvr>
+                                        <p:cTn id="19" dur="1" fill="hold">
+                                          <p:stCondLst>
+                                            <p:cond delay="0"/>
+                                          </p:stCondLst>
+                                        </p:cTn>
+                                        <p:tgtEl>
+                                          <p:spTgt spid="6"/>
+                                        </p:tgtEl>
+                                        <p:attrNameLst>
+                                          <p:attrName>style.visibility</p:attrName>
+                                        </p:attrNameLst>
+                                      </p:cBhvr>
+                                      <p:to>
+                                        <p:strVal val="visible"/>
+                                      </p:to>
+                                    </p:set>
+                                    <p:animEffect transition="in" filter="wipe(left)">
+                                      <p:cBhvr>
+                                        <p:cTn id="20" dur="2000"/>
+                                        <p:tgtEl>
+                                          <p:spTgt spid="6"/>
+                                        </p:tgtEl>
+                                      </p:cBhvr>
+                                    </p:animEffect>
+                                  </p:childTnLst>
+                                </p:cTn>
+                              </p:par>
+                              <p:par>
+                                <p:cTn id="21" presetID="9" presetClass="emph" presetSubtype="0" grpId="1" nodeType="withEffect">
+                                  <p:stCondLst>
+                                    <p:cond delay="0"/>
+                                  </p:stCondLst>
+                                  <p:childTnLst>
+                                    <p:set>
+                                      <p:cBhvr rctx="PPT">
+                                        <p:cTn id="22" dur="indefinite"/>
+                                        <p:tgtEl>
+                                          <p:spTgt spid="5"/>
+                                        </p:tgtEl>
+                                        <p:attrNameLst>
+                                          <p:attrName>style.opacity</p:attrName>
+                                        </p:attrNameLst>
+                                      </p:cBhvr>
+                                      <p:to>
+                                        <p:strVal val="0.35"/>
+                                      </p:to>
+                                    </p:set>
+                                    <p:animEffect filter="image" prLst="opacity: 0.35">
+                                      <p:cBhvr rctx="IE">
+                                        <p:cTn id="23" dur="indefinite"/>
+                                        <p:tgtEl>
+                                          <p:spTgt spid="5"/>
+                                        </p:tgtEl>
+                                      </p:cBhvr>
+                                    </p:animEffect>
+                                  </p:childTnLst>
+                                </p:cTn>
+                              </p:par>
+                              <p:par>
+                                <p:cTn id="24" presetID="9" presetClass="emph" presetSubtype="0" grpId="1" nodeType="withEffect">
+                                  <p:stCondLst>
+                                    <p:cond delay="0"/>
+                                  </p:stCondLst>
+                                  <p:childTnLst>
+                                    <p:set>
+                                      <p:cBhvr rctx="PPT">
+                                        <p:cTn id="25" dur="indefinite"/>
+                                        <p:tgtEl>
+                                          <p:spTgt spid="6"/>
+                                        </p:tgtEl>
+                                        <p:attrNameLst>
+                                          <p:attrName>style.opacity</p:attrName>
+                                        </p:attrNameLst>
+                                      </p:cBhvr>
+                                      <p:to>
+                                        <p:strVal val="0.35"/>
+                                      </p:to>
+                                    </p:set>
+                                    <p:animEffect filter="image" prLst="opacity: 0.35">
+                                      <p:cBhvr rctx="IE">
+                                        <p:cTn id="26" dur="indefinite"/>
+                                        <p:tgtEl>
+                                          <p:spTgt spid="6"/>
+                                        </p:tgtEl>
+                                      </p:cBhvr>
+                                    </p:animEffect>
+                                  </p:childTnLst>
+                                </p:cTn>
+                              </p:par>
+                              <p:par>
+                                <p:cTn id="27" presetID="10" presetClass="entr" presetSubtype="0" fill="hold" grpId="0" nodeType="withEffect">
+                                  <p:stCondLst>
+                                    <p:cond delay="0"/>
+                                  </p:stCondLst>
+                                  <p:childTnLst>
+                                    <p:set>
+                                      <p:cBhvr>
+                                        <p:cTn id="28" dur="1" fill="hold">
+                                          <p:stCondLst>
+                                            <p:cond delay="0"/>
+                                          </p:stCondLst>
+                                        </p:cTn>
+                                        <p:tgtEl>
+                                          <p:spTgt spid="7"/>
+                                        </p:tgtEl>
+                                        <p:attrNameLst>
+                                          <p:attrName>style.visibility</p:attrName>
+                                        </p:attrNameLst>
+                                      </p:cBhvr>
+                                      <p:to>
+                                        <p:strVal val="visible"/>
+                                      </p:to>
+                                    </p:set>
+                                    <p:animEffect transition="in" filter="fade">
+                                      <p:cBhvr>
+                                        <p:cTn id="29" dur="3000"/>
+                                        <p:tgtEl>
+                                          <p:spTgt spid="7"/>
+                                        </p:tgtEl>
+                                      </p:cBhvr>
+                                    </p:animEffect>
+                                  </p:childTnLst>
+                                </p:cTn>
+                              </p:par>
+                            </p:childTnLst>
+                          </p:cTn>
+                        </p:par>
+                      </p:childTnLst>
+                    </p:cTn>
+                  </p:par>
+                  <p:par>
+                    <p:cTn id="30" fill="hold">
+                      <p:stCondLst>
+                        <p:cond delay="indefinite"/>
+                      </p:stCondLst>
+                      <p:childTnLst>
+                        <p:par>
+                          <p:cTn id="31" fill="hold">
+                            <p:stCondLst>
+                              <p:cond delay="0"/>
+                            </p:stCondLst>
+                            <p:childTnLst>
+                              <p:par>
+                                <p:cTn id="32" presetID="22" presetClass="entr" presetSubtype="8" fill="hold" grpId="0" nodeType="clickEffect">
+                                  <p:stCondLst>
+                                    <p:cond delay="0"/>
+                                  </p:stCondLst>
+                                  <p:childTnLst>
+                                    <p:set>
+                                      <p:cBhvr>
+                                        <p:cTn id="33" dur="1" fill="hold">
+                                          <p:stCondLst>
+                                            <p:cond delay="0"/>
+                                          </p:stCondLst>
+                                        </p:cTn>
+                                        <p:tgtEl>
+                                          <p:spTgt spid="9"/>
+                                        </p:tgtEl>
+                                        <p:attrNameLst>
+                                          <p:attrName>style.visibility</p:attrName>
+                                        </p:attrNameLst>
+                                      </p:cBhvr>
+                                      <p:to>
+                                        <p:strVal val="visible"/>
+                                      </p:to>
+                                    </p:set>
+                                    <p:animEffect transition="in" filter="wipe(left)">
+                                      <p:cBhvr>
+                                        <p:cTn id="34" dur="2000"/>
+                                        <p:tgtEl>
+                                          <p:spTgt spid="9"/>
+                                        </p:tgtEl>
+                                      </p:cBhvr>
+                                    </p:animEffect>
+                                  </p:childTnLst>
+                                </p:cTn>
+                              </p:par>
+                              <p:par>
+                                <p:cTn id="35" presetID="9" presetClass="emph" presetSubtype="0" grpId="1" nodeType="withEffect">
+                                  <p:stCondLst>
+                                    <p:cond delay="0"/>
+                                  </p:stCondLst>
+                                  <p:childTnLst>
+                                    <p:set>
+                                      <p:cBhvr rctx="PPT">
+                                        <p:cTn id="36" dur="indefinite"/>
+                                        <p:tgtEl>
+                                          <p:spTgt spid="9"/>
+                                        </p:tgtEl>
+                                        <p:attrNameLst>
+                                          <p:attrName>style.opacity</p:attrName>
+                                        </p:attrNameLst>
+                                      </p:cBhvr>
+                                      <p:to>
+                                        <p:strVal val="0.35"/>
+                                      </p:to>
+                                    </p:set>
+                                    <p:animEffect filter="image" prLst="opacity: 0.35">
+                                      <p:cBhvr rctx="IE">
+                                        <p:cTn id="37" dur="indefinite"/>
+                                        <p:tgtEl>
+                                          <p:spTgt spid="9"/>
+                                        </p:tgtEl>
+                                      </p:cBhvr>
+                                    </p:animEffect>
+                                  </p:childTnLst>
+                                </p:cTn>
+                              </p:par>
+                            </p:childTnLst>
+                          </p:cTn>
+                        </p:par>
+                      </p:childTnLst>
+                    </p:cTn>
+                  </p:par>
+                  <p:par>
+                    <p:cTn id="38" fill="hold">
+                      <p:stCondLst>
+                        <p:cond delay="indefinite"/>
+                      </p:stCondLst>
+                      <p:childTnLst>
+                        <p:par>
+                          <p:cTn id="39" fill="hold">
+                            <p:stCondLst>
+                              <p:cond delay="0"/>
+                            </p:stCondLst>
+                            <p:childTnLst>
+                              <p:par>
+                                <p:cTn id="40" presetID="22" presetClass="entr" presetSubtype="8" fill="hold" grpId="0" nodeType="clickEffect">
+                                  <p:stCondLst>
+                                    <p:cond delay="0"/>
+                                  </p:stCondLst>
+                                  <p:childTnLst>
+                                    <p:set>
+                                      <p:cBhvr>
+                                        <p:cTn id="41" dur="1" fill="hold">
+                                          <p:stCondLst>
+                                            <p:cond delay="0"/>
+                                          </p:stCondLst>
+                                        </p:cTn>
+                                        <p:tgtEl>
+                                          <p:spTgt spid="10"/>
+                                        </p:tgtEl>
+                                        <p:attrNameLst>
+                                          <p:attrName>style.visibility</p:attrName>
+                                        </p:attrNameLst>
+                                      </p:cBhvr>
+                                      <p:to>
+                                        <p:strVal val="visible"/>
+                                      </p:to>
+                                    </p:set>
+                                    <p:animEffect transition="in" filter="wipe(left)">
+                                      <p:cBhvr>
+                                        <p:cTn id="42" dur="2000"/>
+                                        <p:tgtEl>
+                                          <p:spTgt spid="10"/>
+                                        </p:tgtEl>
+                                      </p:cBhvr>
+                                    </p:animEffect>
+                                  </p:childTnLst>
+                                </p:cTn>
+                              </p:par>
+                            </p:childTnLst>
+                          </p:cTn>
+                        </p:par>
+                      </p:childTnLst>
+                    </p:cTn>
+                  </p:par>
+                </p:childTnLst>
+              </p:cTn>
+              <p:prevCondLst>
+                <p:cond evt="onPrev" delay="0">
+                  <p:tgtEl>
+                    <p:sldTgt/>
+                  </p:tgtEl>
+                </p:cond>
+              </p:prevCondLst>
+              <p:nextCondLst>
+                <p:cond evt="onNext" delay="0">
+                  <p:tgtEl>
+                    <p:sldTgt/>
+                  </p:tgtEl>
+                </p:cond>
+              </p:nextCondLst>
+            </p:seq>
+          </p:childTnLst>
+        </p:cTn>
+      </p:par>
+    </p:tnLst>
+    <p:bldLst>
+      <p:bldP spid="4" grpId="0" animBg="1"/>
+      <p:bldP spid="4" grpId="1" animBg="1"/>
+      <p:bldP spid="5" grpId="0" animBg="1"/>
+      <p:bldP spid="5" grpId="1" animBg="1"/>
+      <p:bldP spid="6" grpId="0" animBg="1"/>
+      <p:bldP spid="6" grpId="1" animBg="1"/>
+      <p:bldP spid="7" grpId="0"/>
+      <p:bldP spid="9" grpId="0" animBg="1"/>
+      <p:bldP spid="9" grpId="1" animBg="1"/>
+      <p:bldP spid="10" grpId="0" animBg="1"/>
+    </p:bldLst>
+  </p:timing>
+</p:sld>
+</file>
+
+<file path=ppt/slides/slide3.xml><?xml version="1.0" encoding="utf-8"?>
 <p:sld xmlns:a="http://schemas.openxmlformats.org/drawingml/2006/main" xmlns:r="http://schemas.openxmlformats.org/officeDocument/2006/relationships" xmlns:p="http://schemas.openxmlformats.org/presentationml/2006/main">
   <p:cSld>
     <p:spTree>
@@ -19134,75 +21499,7 @@
             </a:r>
             <a:r>
               <a:rPr lang="en-GB" sz="2400" dirty="0" smtClean="0"/>
-              <a:t>are </a:t>
-            </a:r>
-            <a:r>
-              <a:rPr lang="en-GB" sz="2400" dirty="0" smtClean="0"/>
-              <a:t>effectively identical.</a:t>
-            </a:r>
-            <a:endParaRPr lang="en-GB" sz="2400" dirty="0"/>
-          </a:p>
-        </p:txBody>
-      </p:sp>
-      <p:sp>
-        <p:nvSpPr>
-          <p:cNvPr id="66" name="TextBox 65"/>
-          <p:cNvSpPr txBox="1"/>
-          <p:nvPr/>
-        </p:nvSpPr>
-        <p:spPr>
-          <a:xfrm>
-            <a:off x="792715" y="5792189"/>
-            <a:ext cx="10662403" cy="830997"/>
-          </a:xfrm>
-          <a:prstGeom prst="rect">
-            <a:avLst/>
-          </a:prstGeom>
-          <a:solidFill>
-            <a:schemeClr val="accent2">
-              <a:lumMod val="40000"/>
-              <a:lumOff val="60000"/>
-            </a:schemeClr>
-          </a:solidFill>
-        </p:spPr>
-        <p:txBody>
-          <a:bodyPr wrap="square" rtlCol="0">
-            <a:spAutoFit/>
-          </a:bodyPr>
-          <a:lstStyle/>
-          <a:p>
-            <a:pPr algn="just"/>
-            <a:r>
-              <a:rPr lang="en-GB" sz="2400" dirty="0" smtClean="0"/>
-              <a:t>Here we will attempt an overview of </a:t>
-            </a:r>
-            <a:r>
-              <a:rPr lang="en-GB" sz="2400" b="1" dirty="0" smtClean="0"/>
-              <a:t>SAM Format </a:t>
-            </a:r>
-            <a:r>
-              <a:rPr lang="en-GB" sz="2400" dirty="0" smtClean="0"/>
-              <a:t>based upon a discussion of </a:t>
-            </a:r>
-            <a:r>
-              <a:rPr lang="en-GB" sz="2400" dirty="0" smtClean="0">
-                <a:hlinkClick r:id="rId4"/>
-              </a:rPr>
-              <a:t>some examples files </a:t>
-            </a:r>
-            <a:r>
-              <a:rPr lang="en-GB" sz="2400" dirty="0" smtClean="0"/>
-              <a:t>offered by the </a:t>
-            </a:r>
-            <a:r>
-              <a:rPr lang="en-GB" sz="2400" b="1" dirty="0" smtClean="0">
-                <a:hlinkClick r:id="rId5"/>
-              </a:rPr>
-              <a:t>NCBI</a:t>
-            </a:r>
-            <a:r>
-              <a:rPr lang="en-GB" sz="2400" dirty="0" smtClean="0"/>
-              <a:t>.</a:t>
+              <a:t>are effectively identical.</a:t>
             </a:r>
             <a:endParaRPr lang="en-GB" sz="2400" dirty="0"/>
           </a:p>
@@ -19247,66 +21544,6 @@
             <a:r>
               <a:rPr lang="en-GB" sz="2400" dirty="0" smtClean="0"/>
               <a:t>files are human readable and thus the obvious choice for discussion.</a:t>
-            </a:r>
-            <a:endParaRPr lang="en-GB" sz="2400" dirty="0"/>
-          </a:p>
-        </p:txBody>
-      </p:sp>
-      <p:sp>
-        <p:nvSpPr>
-          <p:cNvPr id="70" name="TextBox 69"/>
-          <p:cNvSpPr txBox="1"/>
-          <p:nvPr/>
-        </p:nvSpPr>
-        <p:spPr>
-          <a:xfrm>
-            <a:off x="764798" y="4663882"/>
-            <a:ext cx="10662404" cy="830997"/>
-          </a:xfrm>
-          <a:prstGeom prst="rect">
-            <a:avLst/>
-          </a:prstGeom>
-          <a:solidFill>
-            <a:schemeClr val="accent2">
-              <a:lumMod val="40000"/>
-              <a:lumOff val="60000"/>
-            </a:schemeClr>
-          </a:solidFill>
-        </p:spPr>
-        <p:txBody>
-          <a:bodyPr wrap="square" rtlCol="0">
-            <a:spAutoFit/>
-          </a:bodyPr>
-          <a:lstStyle/>
-          <a:p>
-            <a:pPr algn="just"/>
-            <a:r>
-              <a:rPr lang="en-GB" sz="2400" b="1" dirty="0" smtClean="0"/>
-              <a:t>SAM Format </a:t>
-            </a:r>
-            <a:r>
-              <a:rPr lang="en-GB" sz="2400" dirty="0" smtClean="0"/>
-              <a:t>is </a:t>
-            </a:r>
-            <a:r>
-              <a:rPr lang="en-GB" sz="2400" dirty="0" smtClean="0"/>
-              <a:t>a bit more complex that either </a:t>
-            </a:r>
-            <a:r>
-              <a:rPr lang="en-GB" sz="2400" b="1" dirty="0" smtClean="0"/>
-              <a:t>FASTA</a:t>
-            </a:r>
-            <a:r>
-              <a:rPr lang="en-GB" sz="2400" dirty="0" smtClean="0"/>
-              <a:t> or </a:t>
-            </a:r>
-            <a:r>
-              <a:rPr lang="en-GB" sz="2400" b="1" dirty="0" smtClean="0"/>
-              <a:t>FASTQ Format </a:t>
-            </a:r>
-            <a:r>
-              <a:rPr lang="en-GB" sz="2400" dirty="0" smtClean="0"/>
-              <a:t>(described elsewhere).</a:t>
             </a:r>
             <a:endParaRPr lang="en-GB" sz="2400" dirty="0"/>
           </a:p>
@@ -19601,68 +21838,15 @@
                                   </p:childTnLst>
                                 </p:cTn>
                               </p:par>
-                            </p:childTnLst>
-                          </p:cTn>
-                        </p:par>
-                      </p:childTnLst>
-                    </p:cTn>
-                  </p:par>
-                  <p:par>
-                    <p:cTn id="29" fill="hold">
-                      <p:stCondLst>
-                        <p:cond delay="indefinite"/>
-                      </p:stCondLst>
-                      <p:childTnLst>
-                        <p:par>
-                          <p:cTn id="30" fill="hold">
-                            <p:stCondLst>
-                              <p:cond delay="0"/>
-                            </p:stCondLst>
-                            <p:childTnLst>
                               <p:par>
-                                <p:cTn id="31" presetID="22" presetClass="entr" presetSubtype="8" fill="hold" grpId="0" nodeType="clickEffect">
-                                  <p:stCondLst>
-                                    <p:cond delay="0"/>
-                                  </p:stCondLst>
-                                  <p:childTnLst>
-                                    <p:set>
-                                      <p:cBhvr>
-                                        <p:cTn id="32" dur="1" fill="hold">
-                                          <p:stCondLst>
-                                            <p:cond delay="0"/>
-                                          </p:stCondLst>
-                                        </p:cTn>
-                                        <p:tgtEl>
-                                          <p:spTgt spid="70"/>
-                                        </p:tgtEl>
-                                        <p:attrNameLst>
-                                          <p:attrName>style.visibility</p:attrName>
-                                        </p:attrNameLst>
-                                      </p:cBhvr>
-                                      <p:to>
-                                        <p:strVal val="visible"/>
-                                      </p:to>
-                                    </p:set>
-                                    <p:animEffect transition="in" filter="wipe(left)">
-                                      <p:cBhvr>
-                                        <p:cTn id="33" dur="2000"/>
-                                        <p:tgtEl>
-                                          <p:spTgt spid="70"/>
-                                        </p:tgtEl>
-                                      </p:cBhvr>
-                                    </p:animEffect>
-                                  </p:childTnLst>
-                                </p:cTn>
-                              </p:par>
-                              <p:par>
-                                <p:cTn id="34" presetID="9" presetClass="emph" presetSubtype="0" grpId="1" nodeType="withEffect">
+                                <p:cTn id="29" presetID="9" presetClass="emph" presetSubtype="0" grpId="1" nodeType="withEffect">
                                   <p:stCondLst>
                                     <p:cond delay="0"/>
                                   </p:stCondLst>
                                   <p:childTnLst>
                                     <p:set>
                                       <p:cBhvr rctx="PPT">
-                                        <p:cTn id="35" dur="indefinite"/>
+                                        <p:cTn id="30" dur="indefinite"/>
                                         <p:tgtEl>
                                           <p:spTgt spid="68"/>
                                         </p:tgtEl>
@@ -19676,93 +21860,9 @@
                                     </p:set>
                                     <p:animEffect filter="image" prLst="opacity: 0.35">
                                       <p:cBhvr rctx="IE">
-                                        <p:cTn id="36" dur="indefinite"/>
+                                        <p:cTn id="31" dur="indefinite"/>
                                         <p:tgtEl>
                                           <p:spTgt spid="68"/>
-                                        </p:tgtEl>
-                                      </p:cBhvr>
-                                    </p:animEffect>
-                                  </p:childTnLst>
-                                </p:cTn>
-                              </p:par>
-                            </p:childTnLst>
-                          </p:cTn>
-                        </p:par>
-                      </p:childTnLst>
-                    </p:cTn>
-                  </p:par>
-                  <p:par>
-                    <p:cTn id="37" fill="hold">
-                      <p:stCondLst>
-                        <p:cond delay="indefinite"/>
-                      </p:stCondLst>
-                      <p:childTnLst>
-                        <p:par>
-                          <p:cTn id="38" fill="hold">
-                            <p:stCondLst>
-                              <p:cond delay="0"/>
-                            </p:stCondLst>
-                            <p:childTnLst>
-                              <p:par>
-                                <p:cTn id="39" presetID="22" presetClass="entr" presetSubtype="8" fill="hold" grpId="0" nodeType="clickEffect">
-                                  <p:stCondLst>
-                                    <p:cond delay="0"/>
-                                  </p:stCondLst>
-                                  <p:childTnLst>
-                                    <p:set>
-                                      <p:cBhvr>
-                                        <p:cTn id="40" dur="1" fill="hold">
-                                          <p:stCondLst>
-                                            <p:cond delay="0"/>
-                                          </p:stCondLst>
-                                        </p:cTn>
-                                        <p:tgtEl>
-                                          <p:spTgt spid="66"/>
-                                        </p:tgtEl>
-                                        <p:attrNameLst>
-                                          <p:attrName>style.visibility</p:attrName>
-                                        </p:attrNameLst>
-                                      </p:cBhvr>
-                                      <p:to>
-                                        <p:strVal val="visible"/>
-                                      </p:to>
-                                    </p:set>
-                                    <p:animEffect transition="in" filter="wipe(left)">
-                                      <p:cBhvr>
-                                        <p:cTn id="41" dur="2000"/>
-                                        <p:tgtEl>
-                                          <p:spTgt spid="66"/>
-                                        </p:tgtEl>
-                                      </p:cBhvr>
-                                    </p:animEffect>
-                                  </p:childTnLst>
-                                </p:cTn>
-                              </p:par>
-                              <p:par>
-                                <p:cTn id="42" presetID="9" presetClass="emph" presetSubtype="0" grpId="1" nodeType="withEffect">
-                                  <p:stCondLst>
-                                    <p:cond delay="0"/>
-                                  </p:stCondLst>
-                                  <p:childTnLst>
-                                    <p:set>
-                                      <p:cBhvr rctx="PPT">
-                                        <p:cTn id="43" dur="indefinite"/>
-                                        <p:tgtEl>
-                                          <p:spTgt spid="70"/>
-                                        </p:tgtEl>
-                                        <p:attrNameLst>
-                                          <p:attrName>style.opacity</p:attrName>
-                                        </p:attrNameLst>
-                                      </p:cBhvr>
-                                      <p:to>
-                                        <p:strVal val="0.35"/>
-                                      </p:to>
-                                    </p:set>
-                                    <p:animEffect filter="image" prLst="opacity: 0.35">
-                                      <p:cBhvr rctx="IE">
-                                        <p:cTn id="44" dur="indefinite"/>
-                                        <p:tgtEl>
-                                          <p:spTgt spid="70"/>
                                         </p:tgtEl>
                                       </p:cBhvr>
                                     </p:animEffect>
@@ -19802,17 +21902,14 @@
       <p:bldP spid="63" grpId="0"/>
       <p:bldP spid="64" grpId="0" animBg="1"/>
       <p:bldP spid="64" grpId="1" animBg="1"/>
-      <p:bldP spid="66" grpId="0" animBg="1"/>
       <p:bldP spid="68" grpId="0" animBg="1"/>
       <p:bldP spid="68" grpId="1" animBg="1"/>
-      <p:bldP spid="70" grpId="0" animBg="1"/>
-      <p:bldP spid="70" grpId="1" animBg="1"/>
     </p:bldLst>
   </p:timing>
 </p:sld>
 </file>
 
-<file path=ppt/slides/slide3.xml><?xml version="1.0" encoding="utf-8"?>
+<file path=ppt/slides/slide4.xml><?xml version="1.0" encoding="utf-8"?>
 <p:sld xmlns:a="http://schemas.openxmlformats.org/drawingml/2006/main" xmlns:r="http://schemas.openxmlformats.org/officeDocument/2006/relationships" xmlns:p="http://schemas.openxmlformats.org/presentationml/2006/main">
   <p:cSld>
     <p:spTree>
@@ -19884,6 +21981,322 @@
           </a:p>
         </p:txBody>
       </p:sp>
+      <p:sp>
+        <p:nvSpPr>
+          <p:cNvPr id="2" name="TextBox 1"/>
+          <p:cNvSpPr txBox="1"/>
+          <p:nvPr/>
+        </p:nvSpPr>
+        <p:spPr>
+          <a:xfrm>
+            <a:off x="1295158" y="681784"/>
+            <a:ext cx="3320140" cy="5909310"/>
+          </a:xfrm>
+          <a:prstGeom prst="rect">
+            <a:avLst/>
+          </a:prstGeom>
+          <a:noFill/>
+        </p:spPr>
+        <p:txBody>
+          <a:bodyPr wrap="none" rtlCol="0">
+            <a:spAutoFit/>
+          </a:bodyPr>
+          <a:lstStyle/>
+          <a:p>
+            <a:r>
+              <a:rPr lang="en-GB" sz="1400" b="1" dirty="0">
+                <a:latin typeface="Courier New" panose="02070309020205020404" pitchFamily="49" charset="0"/>
+                <a:cs typeface="Courier New" panose="02070309020205020404" pitchFamily="49" charset="0"/>
+              </a:rPr>
+              <a:t>@HD	VN:1.0</a:t>
+            </a:r>
+          </a:p>
+          <a:p>
+            <a:r>
+              <a:rPr lang="en-GB" sz="1400" b="1" dirty="0">
+                <a:latin typeface="Courier New" panose="02070309020205020404" pitchFamily="49" charset="0"/>
+                <a:cs typeface="Courier New" panose="02070309020205020404" pitchFamily="49" charset="0"/>
+              </a:rPr>
+              <a:t>@PG	</a:t>
+            </a:r>
+            <a:r>
+              <a:rPr lang="en-GB" sz="1400" b="1" dirty="0" err="1">
+                <a:latin typeface="Courier New" panose="02070309020205020404" pitchFamily="49" charset="0"/>
+                <a:cs typeface="Courier New" panose="02070309020205020404" pitchFamily="49" charset="0"/>
+              </a:rPr>
+              <a:t>ID:pash</a:t>
+            </a:r>
+            <a:endParaRPr lang="en-GB" sz="1400" b="1" dirty="0">
+              <a:latin typeface="Courier New" panose="02070309020205020404" pitchFamily="49" charset="0"/>
+              <a:cs typeface="Courier New" panose="02070309020205020404" pitchFamily="49" charset="0"/>
+            </a:endParaRPr>
+          </a:p>
+          <a:p>
+            <a:r>
+              <a:rPr lang="en-GB" sz="1400" b="1" dirty="0">
+                <a:latin typeface="Courier New" panose="02070309020205020404" pitchFamily="49" charset="0"/>
+                <a:cs typeface="Courier New" panose="02070309020205020404" pitchFamily="49" charset="0"/>
+              </a:rPr>
+              <a:t>@RG  ID:-- SM:H1 CN:UCSD</a:t>
+            </a:r>
+          </a:p>
+          <a:p>
+            <a:r>
+              <a:rPr lang="en-GB" sz="1400" b="1" dirty="0">
+                <a:latin typeface="Courier New" panose="02070309020205020404" pitchFamily="49" charset="0"/>
+                <a:cs typeface="Courier New" panose="02070309020205020404" pitchFamily="49" charset="0"/>
+              </a:rPr>
+              <a:t>@SQ	SN:chr10	LN:135374737</a:t>
+            </a:r>
+          </a:p>
+          <a:p>
+            <a:r>
+              <a:rPr lang="en-GB" sz="1400" b="1" dirty="0">
+                <a:latin typeface="Courier New" panose="02070309020205020404" pitchFamily="49" charset="0"/>
+                <a:cs typeface="Courier New" panose="02070309020205020404" pitchFamily="49" charset="0"/>
+              </a:rPr>
+              <a:t>@SQ	SN:chr11	LN:134452384</a:t>
+            </a:r>
+          </a:p>
+          <a:p>
+            <a:r>
+              <a:rPr lang="en-GB" sz="1400" b="1" dirty="0">
+                <a:latin typeface="Courier New" panose="02070309020205020404" pitchFamily="49" charset="0"/>
+                <a:cs typeface="Courier New" panose="02070309020205020404" pitchFamily="49" charset="0"/>
+              </a:rPr>
+              <a:t>@SQ	SN:chr12	LN:132349534</a:t>
+            </a:r>
+          </a:p>
+          <a:p>
+            <a:r>
+              <a:rPr lang="en-GB" sz="1400" b="1" dirty="0">
+                <a:latin typeface="Courier New" panose="02070309020205020404" pitchFamily="49" charset="0"/>
+                <a:cs typeface="Courier New" panose="02070309020205020404" pitchFamily="49" charset="0"/>
+              </a:rPr>
+              <a:t>@SQ	SN:chr13	LN:114142980</a:t>
+            </a:r>
+          </a:p>
+          <a:p>
+            <a:r>
+              <a:rPr lang="en-GB" sz="1400" b="1" dirty="0">
+                <a:latin typeface="Courier New" panose="02070309020205020404" pitchFamily="49" charset="0"/>
+                <a:cs typeface="Courier New" panose="02070309020205020404" pitchFamily="49" charset="0"/>
+              </a:rPr>
+              <a:t>@SQ	SN:chr14	LN:106368585</a:t>
+            </a:r>
+          </a:p>
+          <a:p>
+            <a:r>
+              <a:rPr lang="en-GB" sz="1400" b="1" dirty="0">
+                <a:latin typeface="Courier New" panose="02070309020205020404" pitchFamily="49" charset="0"/>
+                <a:cs typeface="Courier New" panose="02070309020205020404" pitchFamily="49" charset="0"/>
+              </a:rPr>
+              <a:t>@SQ	SN:chr15	LN:100338915</a:t>
+            </a:r>
+          </a:p>
+          <a:p>
+            <a:r>
+              <a:rPr lang="en-GB" sz="1400" b="1" dirty="0">
+                <a:latin typeface="Courier New" panose="02070309020205020404" pitchFamily="49" charset="0"/>
+                <a:cs typeface="Courier New" panose="02070309020205020404" pitchFamily="49" charset="0"/>
+              </a:rPr>
+              <a:t>@SQ	SN:chr16	LN:88827254</a:t>
+            </a:r>
+          </a:p>
+          <a:p>
+            <a:r>
+              <a:rPr lang="en-GB" sz="1400" b="1" dirty="0">
+                <a:latin typeface="Courier New" panose="02070309020205020404" pitchFamily="49" charset="0"/>
+                <a:cs typeface="Courier New" panose="02070309020205020404" pitchFamily="49" charset="0"/>
+              </a:rPr>
+              <a:t>@SQ	SN:chr17	LN:78774742</a:t>
+            </a:r>
+          </a:p>
+          <a:p>
+            <a:r>
+              <a:rPr lang="en-GB" sz="1400" b="1" dirty="0">
+                <a:latin typeface="Courier New" panose="02070309020205020404" pitchFamily="49" charset="0"/>
+                <a:cs typeface="Courier New" panose="02070309020205020404" pitchFamily="49" charset="0"/>
+              </a:rPr>
+              <a:t>@SQ	SN:chr18	LN:76117153</a:t>
+            </a:r>
+          </a:p>
+          <a:p>
+            <a:r>
+              <a:rPr lang="en-GB" sz="1400" b="1" dirty="0">
+                <a:latin typeface="Courier New" panose="02070309020205020404" pitchFamily="49" charset="0"/>
+                <a:cs typeface="Courier New" panose="02070309020205020404" pitchFamily="49" charset="0"/>
+              </a:rPr>
+              <a:t>@SQ	SN:chr19	LN:63811651</a:t>
+            </a:r>
+          </a:p>
+          <a:p>
+            <a:r>
+              <a:rPr lang="en-GB" sz="1400" b="1" dirty="0">
+                <a:latin typeface="Courier New" panose="02070309020205020404" pitchFamily="49" charset="0"/>
+                <a:cs typeface="Courier New" panose="02070309020205020404" pitchFamily="49" charset="0"/>
+              </a:rPr>
+              <a:t>@SQ	SN:chr1	LN:247249719</a:t>
+            </a:r>
+          </a:p>
+          <a:p>
+            <a:r>
+              <a:rPr lang="en-GB" sz="1400" b="1" dirty="0">
+                <a:latin typeface="Courier New" panose="02070309020205020404" pitchFamily="49" charset="0"/>
+                <a:cs typeface="Courier New" panose="02070309020205020404" pitchFamily="49" charset="0"/>
+              </a:rPr>
+              <a:t>@SQ	SN:chr20	LN:62435964</a:t>
+            </a:r>
+          </a:p>
+          <a:p>
+            <a:r>
+              <a:rPr lang="en-GB" sz="1400" b="1" dirty="0">
+                <a:latin typeface="Courier New" panose="02070309020205020404" pitchFamily="49" charset="0"/>
+                <a:cs typeface="Courier New" panose="02070309020205020404" pitchFamily="49" charset="0"/>
+              </a:rPr>
+              <a:t>@SQ	SN:chr21	LN:46944323</a:t>
+            </a:r>
+          </a:p>
+          <a:p>
+            <a:r>
+              <a:rPr lang="en-GB" sz="1400" b="1" dirty="0">
+                <a:latin typeface="Courier New" panose="02070309020205020404" pitchFamily="49" charset="0"/>
+                <a:cs typeface="Courier New" panose="02070309020205020404" pitchFamily="49" charset="0"/>
+              </a:rPr>
+              <a:t>@SQ	SN:chr22	LN:49691432</a:t>
+            </a:r>
+          </a:p>
+          <a:p>
+            <a:r>
+              <a:rPr lang="en-GB" sz="1400" b="1" dirty="0">
+                <a:latin typeface="Courier New" panose="02070309020205020404" pitchFamily="49" charset="0"/>
+                <a:cs typeface="Courier New" panose="02070309020205020404" pitchFamily="49" charset="0"/>
+              </a:rPr>
+              <a:t>@SQ	SN:chr2	LN:242951149</a:t>
+            </a:r>
+          </a:p>
+          <a:p>
+            <a:r>
+              <a:rPr lang="en-GB" sz="1400" b="1" dirty="0">
+                <a:latin typeface="Courier New" panose="02070309020205020404" pitchFamily="49" charset="0"/>
+                <a:cs typeface="Courier New" panose="02070309020205020404" pitchFamily="49" charset="0"/>
+              </a:rPr>
+              <a:t>@SQ	SN:chr3	LN:199501827</a:t>
+            </a:r>
+          </a:p>
+          <a:p>
+            <a:r>
+              <a:rPr lang="en-GB" sz="1400" b="1" dirty="0">
+                <a:latin typeface="Courier New" panose="02070309020205020404" pitchFamily="49" charset="0"/>
+                <a:cs typeface="Courier New" panose="02070309020205020404" pitchFamily="49" charset="0"/>
+              </a:rPr>
+              <a:t>@SQ	SN:chr4	LN:191273063</a:t>
+            </a:r>
+          </a:p>
+          <a:p>
+            <a:r>
+              <a:rPr lang="en-GB" sz="1400" b="1" dirty="0">
+                <a:latin typeface="Courier New" panose="02070309020205020404" pitchFamily="49" charset="0"/>
+                <a:cs typeface="Courier New" panose="02070309020205020404" pitchFamily="49" charset="0"/>
+              </a:rPr>
+              <a:t>@SQ	SN:chr5	LN:180857866</a:t>
+            </a:r>
+          </a:p>
+          <a:p>
+            <a:r>
+              <a:rPr lang="en-GB" sz="1400" b="1" dirty="0">
+                <a:latin typeface="Courier New" panose="02070309020205020404" pitchFamily="49" charset="0"/>
+                <a:cs typeface="Courier New" panose="02070309020205020404" pitchFamily="49" charset="0"/>
+              </a:rPr>
+              <a:t>@SQ	SN:chr6	LN:170899992</a:t>
+            </a:r>
+          </a:p>
+          <a:p>
+            <a:r>
+              <a:rPr lang="en-GB" sz="1400" b="1" dirty="0">
+                <a:latin typeface="Courier New" panose="02070309020205020404" pitchFamily="49" charset="0"/>
+                <a:cs typeface="Courier New" panose="02070309020205020404" pitchFamily="49" charset="0"/>
+              </a:rPr>
+              <a:t>@SQ	SN:chr7	LN:158821424</a:t>
+            </a:r>
+          </a:p>
+          <a:p>
+            <a:r>
+              <a:rPr lang="en-GB" sz="1400" b="1" dirty="0">
+                <a:latin typeface="Courier New" panose="02070309020205020404" pitchFamily="49" charset="0"/>
+                <a:cs typeface="Courier New" panose="02070309020205020404" pitchFamily="49" charset="0"/>
+              </a:rPr>
+              <a:t>@SQ	SN:chr8	LN:146274826</a:t>
+            </a:r>
+          </a:p>
+          <a:p>
+            <a:r>
+              <a:rPr lang="en-GB" sz="1400" b="1" dirty="0">
+                <a:latin typeface="Courier New" panose="02070309020205020404" pitchFamily="49" charset="0"/>
+                <a:cs typeface="Courier New" panose="02070309020205020404" pitchFamily="49" charset="0"/>
+              </a:rPr>
+              <a:t>@SQ	SN:chr9	LN:140273252</a:t>
+            </a:r>
+          </a:p>
+          <a:p>
+            <a:r>
+              <a:rPr lang="en-GB" sz="1400" b="1" dirty="0">
+                <a:latin typeface="Courier New" panose="02070309020205020404" pitchFamily="49" charset="0"/>
+                <a:cs typeface="Courier New" panose="02070309020205020404" pitchFamily="49" charset="0"/>
+              </a:rPr>
+              <a:t>@SQ	</a:t>
+            </a:r>
+            <a:r>
+              <a:rPr lang="en-GB" sz="1400" b="1" dirty="0" err="1">
+                <a:latin typeface="Courier New" panose="02070309020205020404" pitchFamily="49" charset="0"/>
+                <a:cs typeface="Courier New" panose="02070309020205020404" pitchFamily="49" charset="0"/>
+              </a:rPr>
+              <a:t>SN:chrX</a:t>
+            </a:r>
+            <a:r>
+              <a:rPr lang="en-GB" sz="1400" b="1" dirty="0">
+                <a:latin typeface="Courier New" panose="02070309020205020404" pitchFamily="49" charset="0"/>
+                <a:cs typeface="Courier New" panose="02070309020205020404" pitchFamily="49" charset="0"/>
+              </a:rPr>
+              <a:t>	LN:154913754</a:t>
+            </a:r>
+          </a:p>
+          <a:p>
+            <a:r>
+              <a:rPr lang="en-GB" sz="1400" b="1" dirty="0">
+                <a:latin typeface="Courier New" panose="02070309020205020404" pitchFamily="49" charset="0"/>
+                <a:cs typeface="Courier New" panose="02070309020205020404" pitchFamily="49" charset="0"/>
+              </a:rPr>
+              <a:t>@SQ	</a:t>
+            </a:r>
+            <a:r>
+              <a:rPr lang="en-GB" sz="1400" b="1" dirty="0" err="1">
+                <a:latin typeface="Courier New" panose="02070309020205020404" pitchFamily="49" charset="0"/>
+                <a:cs typeface="Courier New" panose="02070309020205020404" pitchFamily="49" charset="0"/>
+              </a:rPr>
+              <a:t>SN:chrY</a:t>
+            </a:r>
+            <a:r>
+              <a:rPr lang="en-GB" sz="1400" b="1" dirty="0">
+                <a:latin typeface="Courier New" panose="02070309020205020404" pitchFamily="49" charset="0"/>
+                <a:cs typeface="Courier New" panose="02070309020205020404" pitchFamily="49" charset="0"/>
+              </a:rPr>
+              <a:t>	</a:t>
+            </a:r>
+            <a:r>
+              <a:rPr lang="en-GB" sz="1400" b="1" dirty="0" smtClean="0">
+                <a:latin typeface="Courier New" panose="02070309020205020404" pitchFamily="49" charset="0"/>
+                <a:cs typeface="Courier New" panose="02070309020205020404" pitchFamily="49" charset="0"/>
+              </a:rPr>
+              <a:t>LN:57772954</a:t>
+            </a:r>
+            <a:endParaRPr lang="en-GB" sz="1400" b="1" dirty="0">
+              <a:latin typeface="Courier New" panose="02070309020205020404" pitchFamily="49" charset="0"/>
+              <a:cs typeface="Courier New" panose="02070309020205020404" pitchFamily="49" charset="0"/>
+            </a:endParaRPr>
+          </a:p>
+        </p:txBody>
+      </p:sp>
     </p:spTree>
     <p:extLst>
       <p:ext uri="{BB962C8B-B14F-4D97-AF65-F5344CB8AC3E}">
@@ -19904,7 +22317,7 @@
 </p:sld>
 </file>
 
-<file path=ppt/slides/slide4.xml><?xml version="1.0" encoding="utf-8"?>
+<file path=ppt/slides/slide5.xml><?xml version="1.0" encoding="utf-8"?>
 <p:sld xmlns:a="http://schemas.openxmlformats.org/drawingml/2006/main" xmlns:r="http://schemas.openxmlformats.org/officeDocument/2006/relationships" xmlns:p="http://schemas.openxmlformats.org/presentationml/2006/main">
   <p:cSld>
     <p:spTree>
@@ -22439,7 +24852,7 @@
 </p:sld>
 </file>
 
-<file path=ppt/slides/slide5.xml><?xml version="1.0" encoding="utf-8"?>
+<file path=ppt/slides/slide6.xml><?xml version="1.0" encoding="utf-8"?>
 <p:sld xmlns:a="http://schemas.openxmlformats.org/drawingml/2006/main" xmlns:r="http://schemas.openxmlformats.org/officeDocument/2006/relationships" xmlns:p="http://schemas.openxmlformats.org/presentationml/2006/main">
   <p:cSld>
     <p:spTree>
@@ -24278,7 +26691,7 @@
 </p:sld>
 </file>
 
-<file path=ppt/slides/slide6.xml><?xml version="1.0" encoding="utf-8"?>
+<file path=ppt/slides/slide7.xml><?xml version="1.0" encoding="utf-8"?>
 <p:sld xmlns:a="http://schemas.openxmlformats.org/drawingml/2006/main" xmlns:r="http://schemas.openxmlformats.org/officeDocument/2006/relationships" xmlns:p="http://schemas.openxmlformats.org/presentationml/2006/main">
   <p:cSld>
     <p:spTree>
@@ -25615,7 +28028,7 @@
 </p:sld>
 </file>
 
-<file path=ppt/slides/slide7.xml><?xml version="1.0" encoding="utf-8"?>
+<file path=ppt/slides/slide8.xml><?xml version="1.0" encoding="utf-8"?>
 <p:sld xmlns:a="http://schemas.openxmlformats.org/drawingml/2006/main" xmlns:r="http://schemas.openxmlformats.org/officeDocument/2006/relationships" xmlns:p="http://schemas.openxmlformats.org/presentationml/2006/main">
   <p:cSld>
     <p:spTree>
@@ -28205,7 +30618,7 @@
 </p:sld>
 </file>
 
-<file path=ppt/slides/slide8.xml><?xml version="1.0" encoding="utf-8"?>
+<file path=ppt/slides/slide9.xml><?xml version="1.0" encoding="utf-8"?>
 <p:sld xmlns:a="http://schemas.openxmlformats.org/drawingml/2006/main" xmlns:r="http://schemas.openxmlformats.org/officeDocument/2006/relationships" xmlns:p="http://schemas.openxmlformats.org/presentationml/2006/main">
   <p:cSld>
     <p:spTree>
@@ -30107,1488 +32520,6 @@
 </p:sld>
 </file>
 
-<file path=ppt/slides/slide9.xml><?xml version="1.0" encoding="utf-8"?>
-<p:sld xmlns:a="http://schemas.openxmlformats.org/drawingml/2006/main" xmlns:r="http://schemas.openxmlformats.org/officeDocument/2006/relationships" xmlns:p="http://schemas.openxmlformats.org/presentationml/2006/main">
-  <p:cSld>
-    <p:spTree>
-      <p:nvGrpSpPr>
-        <p:cNvPr id="1" name=""/>
-        <p:cNvGrpSpPr/>
-        <p:nvPr/>
-      </p:nvGrpSpPr>
-      <p:grpSpPr>
-        <a:xfrm>
-          <a:off x="0" y="0"/>
-          <a:ext cx="0" cy="0"/>
-          <a:chOff x="0" y="0"/>
-          <a:chExt cx="0" cy="0"/>
-        </a:xfrm>
-      </p:grpSpPr>
-      <p:sp>
-        <p:nvSpPr>
-          <p:cNvPr id="14" name="TextBox 13">
-            <a:extLst>
-              <a:ext uri="{FF2B5EF4-FFF2-40B4-BE49-F238E27FC236}">
-                <a16:creationId xmlns:a16="http://schemas.microsoft.com/office/drawing/2014/main" xmlns="" id="{FDE44C33-EA15-4D14-8324-71F27282442F}"/>
-              </a:ext>
-            </a:extLst>
-          </p:cNvPr>
-          <p:cNvSpPr txBox="1"/>
-          <p:nvPr/>
-        </p:nvSpPr>
-        <p:spPr>
-          <a:xfrm>
-            <a:off x="3037110" y="-6111"/>
-            <a:ext cx="6075106" cy="644235"/>
-          </a:xfrm>
-          <a:prstGeom prst="rect">
-            <a:avLst/>
-          </a:prstGeom>
-          <a:solidFill>
-            <a:schemeClr val="bg1"/>
-          </a:solidFill>
-        </p:spPr>
-        <p:txBody>
-          <a:bodyPr wrap="square" rtlCol="0" anchor="ctr">
-            <a:spAutoFit/>
-          </a:bodyPr>
-          <a:lstStyle/>
-          <a:p>
-            <a:r>
-              <a:rPr lang="en-GB" sz="3600" b="1" u="sng" dirty="0">
-                <a:solidFill>
-                  <a:srgbClr val="FF0000"/>
-                </a:solidFill>
-                <a:highlight>
-                  <a:srgbClr val="FFFF00"/>
-                </a:highlight>
-                <a:latin typeface="Courier New" panose="02070309020205020404" pitchFamily="49" charset="0"/>
-                <a:cs typeface="Courier New" panose="02070309020205020404" pitchFamily="49" charset="0"/>
-                <a:hlinkClick r:id="rId2"/>
-              </a:rPr>
-              <a:t>FASTQ Sequence format</a:t>
-            </a:r>
-            <a:endParaRPr lang="en-GB" sz="3600" b="1" u="sng" dirty="0">
-              <a:solidFill>
-                <a:srgbClr val="FF0000"/>
-              </a:solidFill>
-              <a:highlight>
-                <a:srgbClr val="FFFF00"/>
-              </a:highlight>
-              <a:latin typeface="Courier New" panose="02070309020205020404" pitchFamily="49" charset="0"/>
-              <a:cs typeface="Courier New" panose="02070309020205020404" pitchFamily="49" charset="0"/>
-            </a:endParaRPr>
-          </a:p>
-        </p:txBody>
-      </p:sp>
-      <p:sp>
-        <p:nvSpPr>
-          <p:cNvPr id="4" name="TextBox 3">
-            <a:extLst>
-              <a:ext uri="{FF2B5EF4-FFF2-40B4-BE49-F238E27FC236}">
-                <a16:creationId xmlns:a16="http://schemas.microsoft.com/office/drawing/2014/main" xmlns="" id="{438442CF-1B82-4A10-87A1-614331CA498E}"/>
-              </a:ext>
-            </a:extLst>
-          </p:cNvPr>
-          <p:cNvSpPr txBox="1"/>
-          <p:nvPr/>
-        </p:nvSpPr>
-        <p:spPr>
-          <a:xfrm>
-            <a:off x="1019114" y="1291702"/>
-            <a:ext cx="10153772" cy="400110"/>
-          </a:xfrm>
-          <a:prstGeom prst="rect">
-            <a:avLst/>
-          </a:prstGeom>
-          <a:solidFill>
-            <a:schemeClr val="accent2">
-              <a:lumMod val="40000"/>
-              <a:lumOff val="60000"/>
-            </a:schemeClr>
-          </a:solidFill>
-        </p:spPr>
-        <p:txBody>
-          <a:bodyPr wrap="square" rtlCol="0">
-            <a:spAutoFit/>
-          </a:bodyPr>
-          <a:lstStyle/>
-          <a:p>
-            <a:r>
-              <a:rPr lang="en-GB" sz="2000" dirty="0" smtClean="0">
-                <a:latin typeface="Times New Roman" panose="02020603050405020304" pitchFamily="18" charset="0"/>
-                <a:cs typeface="Times New Roman" panose="02020603050405020304" pitchFamily="18" charset="0"/>
-              </a:rPr>
-              <a:t>The </a:t>
-            </a:r>
-            <a:r>
-              <a:rPr lang="en-GB" sz="2000" b="1" dirty="0" smtClean="0">
-                <a:latin typeface="Times New Roman" panose="02020603050405020304" pitchFamily="18" charset="0"/>
-                <a:cs typeface="Times New Roman" panose="02020603050405020304" pitchFamily="18" charset="0"/>
-              </a:rPr>
-              <a:t>Base Quality Scores </a:t>
-            </a:r>
-            <a:r>
-              <a:rPr lang="en-GB" sz="2000" dirty="0" smtClean="0">
-                <a:latin typeface="Times New Roman" panose="02020603050405020304" pitchFamily="18" charset="0"/>
-                <a:cs typeface="Times New Roman" panose="02020603050405020304" pitchFamily="18" charset="0"/>
-              </a:rPr>
-              <a:t>in </a:t>
-            </a:r>
-            <a:r>
-              <a:rPr lang="en-GB" sz="2000" b="1" dirty="0" smtClean="0">
-                <a:latin typeface="Times New Roman" panose="02020603050405020304" pitchFamily="18" charset="0"/>
-                <a:cs typeface="Times New Roman" panose="02020603050405020304" pitchFamily="18" charset="0"/>
-              </a:rPr>
-              <a:t>FASTQ</a:t>
-            </a:r>
-            <a:r>
-              <a:rPr lang="en-GB" sz="2000" dirty="0" smtClean="0">
-                <a:latin typeface="Times New Roman" panose="02020603050405020304" pitchFamily="18" charset="0"/>
-                <a:cs typeface="Times New Roman" panose="02020603050405020304" pitchFamily="18" charset="0"/>
-              </a:rPr>
-              <a:t> files are </a:t>
-            </a:r>
-            <a:r>
-              <a:rPr lang="en-GB" sz="2000" b="1" dirty="0" smtClean="0">
-                <a:latin typeface="Times New Roman" panose="02020603050405020304" pitchFamily="18" charset="0"/>
-                <a:cs typeface="Times New Roman" panose="02020603050405020304" pitchFamily="18" charset="0"/>
-              </a:rPr>
-              <a:t>PHRED</a:t>
-            </a:r>
-            <a:r>
-              <a:rPr lang="en-GB" sz="2000" dirty="0" smtClean="0">
-                <a:latin typeface="Times New Roman" panose="02020603050405020304" pitchFamily="18" charset="0"/>
-                <a:cs typeface="Times New Roman" panose="02020603050405020304" pitchFamily="18" charset="0"/>
-              </a:rPr>
-              <a:t> </a:t>
-            </a:r>
-            <a:r>
-              <a:rPr lang="en-GB" sz="2000" b="1" dirty="0" smtClean="0">
-                <a:latin typeface="Times New Roman" panose="02020603050405020304" pitchFamily="18" charset="0"/>
-                <a:cs typeface="Times New Roman" panose="02020603050405020304" pitchFamily="18" charset="0"/>
-              </a:rPr>
-              <a:t>Scores</a:t>
-            </a:r>
-            <a:r>
-              <a:rPr lang="en-GB" sz="2000" dirty="0" smtClean="0">
-                <a:latin typeface="Times New Roman" panose="02020603050405020304" pitchFamily="18" charset="0"/>
-                <a:cs typeface="Times New Roman" panose="02020603050405020304" pitchFamily="18" charset="0"/>
-              </a:rPr>
-              <a:t>.</a:t>
-            </a:r>
-            <a:endParaRPr lang="en-GB" sz="2000" dirty="0"/>
-          </a:p>
-        </p:txBody>
-      </p:sp>
-      <p:sp>
-        <p:nvSpPr>
-          <p:cNvPr id="6" name="TextBox 5">
-            <a:extLst>
-              <a:ext uri="{FF2B5EF4-FFF2-40B4-BE49-F238E27FC236}">
-                <a16:creationId xmlns:a16="http://schemas.microsoft.com/office/drawing/2014/main" xmlns="" id="{438442CF-1B82-4A10-87A1-614331CA498E}"/>
-              </a:ext>
-            </a:extLst>
-          </p:cNvPr>
-          <p:cNvSpPr txBox="1"/>
-          <p:nvPr/>
-        </p:nvSpPr>
-        <p:spPr>
-          <a:xfrm>
-            <a:off x="1019114" y="2023991"/>
-            <a:ext cx="10153772" cy="707886"/>
-          </a:xfrm>
-          <a:prstGeom prst="rect">
-            <a:avLst/>
-          </a:prstGeom>
-          <a:solidFill>
-            <a:schemeClr val="accent2">
-              <a:lumMod val="40000"/>
-              <a:lumOff val="60000"/>
-            </a:schemeClr>
-          </a:solidFill>
-        </p:spPr>
-        <p:txBody>
-          <a:bodyPr wrap="square" rtlCol="0">
-            <a:spAutoFit/>
-          </a:bodyPr>
-          <a:lstStyle/>
-          <a:p>
-            <a:r>
-              <a:rPr lang="en-GB" sz="2000" dirty="0" smtClean="0">
-                <a:latin typeface="Times New Roman" panose="02020603050405020304" pitchFamily="18" charset="0"/>
-                <a:cs typeface="Times New Roman" panose="02020603050405020304" pitchFamily="18" charset="0"/>
-              </a:rPr>
-              <a:t>The </a:t>
-            </a:r>
-            <a:r>
-              <a:rPr lang="en-GB" sz="2000" b="1" dirty="0">
-                <a:latin typeface="Times New Roman" panose="02020603050405020304" pitchFamily="18" charset="0"/>
-                <a:cs typeface="Times New Roman" panose="02020603050405020304" pitchFamily="18" charset="0"/>
-              </a:rPr>
-              <a:t>PHRED</a:t>
-            </a:r>
-            <a:r>
-              <a:rPr lang="en-GB" sz="2000" dirty="0">
-                <a:latin typeface="Times New Roman" panose="02020603050405020304" pitchFamily="18" charset="0"/>
-                <a:cs typeface="Times New Roman" panose="02020603050405020304" pitchFamily="18" charset="0"/>
-              </a:rPr>
-              <a:t> </a:t>
-            </a:r>
-            <a:r>
-              <a:rPr lang="en-GB" sz="2000" b="1" dirty="0" smtClean="0">
-                <a:latin typeface="Times New Roman" panose="02020603050405020304" pitchFamily="18" charset="0"/>
-                <a:cs typeface="Times New Roman" panose="02020603050405020304" pitchFamily="18" charset="0"/>
-              </a:rPr>
-              <a:t>Score</a:t>
-            </a:r>
-            <a:r>
-              <a:rPr lang="en-GB" sz="2000" dirty="0" smtClean="0">
-                <a:latin typeface="Times New Roman" panose="02020603050405020304" pitchFamily="18" charset="0"/>
-                <a:cs typeface="Times New Roman" panose="02020603050405020304" pitchFamily="18" charset="0"/>
-              </a:rPr>
-              <a:t> for a given </a:t>
-            </a:r>
-            <a:r>
-              <a:rPr lang="en-GB" sz="2000" b="1" dirty="0" smtClean="0">
-                <a:latin typeface="Times New Roman" panose="02020603050405020304" pitchFamily="18" charset="0"/>
-                <a:cs typeface="Times New Roman" panose="02020603050405020304" pitchFamily="18" charset="0"/>
-              </a:rPr>
-              <a:t>Base Call </a:t>
-            </a:r>
-            <a:r>
-              <a:rPr lang="en-GB" sz="2000" dirty="0" smtClean="0">
-                <a:latin typeface="Times New Roman" panose="02020603050405020304" pitchFamily="18" charset="0"/>
-                <a:cs typeface="Times New Roman" panose="02020603050405020304" pitchFamily="18" charset="0"/>
-              </a:rPr>
-              <a:t>is derived from an estimate of the </a:t>
-            </a:r>
-            <a:r>
-              <a:rPr lang="en-GB" sz="2000" b="1" dirty="0" smtClean="0">
-                <a:latin typeface="Times New Roman" panose="02020603050405020304" pitchFamily="18" charset="0"/>
-                <a:cs typeface="Times New Roman" panose="02020603050405020304" pitchFamily="18" charset="0"/>
-              </a:rPr>
-              <a:t>Probability</a:t>
-            </a:r>
-            <a:r>
-              <a:rPr lang="en-GB" sz="2000" dirty="0" smtClean="0">
-                <a:latin typeface="Times New Roman" panose="02020603050405020304" pitchFamily="18" charset="0"/>
-                <a:cs typeface="Times New Roman" panose="02020603050405020304" pitchFamily="18" charset="0"/>
-              </a:rPr>
-              <a:t> of that </a:t>
-            </a:r>
-            <a:r>
-              <a:rPr lang="en-GB" sz="2000" b="1" dirty="0">
-                <a:latin typeface="Times New Roman" panose="02020603050405020304" pitchFamily="18" charset="0"/>
-                <a:cs typeface="Times New Roman" panose="02020603050405020304" pitchFamily="18" charset="0"/>
-              </a:rPr>
-              <a:t>B</a:t>
-            </a:r>
-            <a:r>
-              <a:rPr lang="en-GB" sz="2000" b="1" dirty="0" smtClean="0">
-                <a:latin typeface="Times New Roman" panose="02020603050405020304" pitchFamily="18" charset="0"/>
-                <a:cs typeface="Times New Roman" panose="02020603050405020304" pitchFamily="18" charset="0"/>
-              </a:rPr>
-              <a:t>ase</a:t>
-            </a:r>
-            <a:r>
-              <a:rPr lang="en-GB" sz="2000" dirty="0" smtClean="0">
-                <a:latin typeface="Times New Roman" panose="02020603050405020304" pitchFamily="18" charset="0"/>
-                <a:cs typeface="Times New Roman" panose="02020603050405020304" pitchFamily="18" charset="0"/>
-              </a:rPr>
-              <a:t> being </a:t>
-            </a:r>
-            <a:r>
-              <a:rPr lang="en-GB" sz="2000" b="1" dirty="0" smtClean="0">
-                <a:latin typeface="Times New Roman" panose="02020603050405020304" pitchFamily="18" charset="0"/>
-                <a:cs typeface="Times New Roman" panose="02020603050405020304" pitchFamily="18" charset="0"/>
-              </a:rPr>
-              <a:t>Called</a:t>
-            </a:r>
-            <a:r>
-              <a:rPr lang="en-GB" sz="2000" dirty="0" smtClean="0">
-                <a:latin typeface="Times New Roman" panose="02020603050405020304" pitchFamily="18" charset="0"/>
-                <a:cs typeface="Times New Roman" panose="02020603050405020304" pitchFamily="18" charset="0"/>
-              </a:rPr>
-              <a:t> incorrectly</a:t>
-            </a:r>
-            <a:endParaRPr lang="en-GB" sz="2000" dirty="0"/>
-          </a:p>
-        </p:txBody>
-      </p:sp>
-      <p:sp>
-        <p:nvSpPr>
-          <p:cNvPr id="7" name="TextBox 6">
-            <a:extLst>
-              <a:ext uri="{FF2B5EF4-FFF2-40B4-BE49-F238E27FC236}">
-                <a16:creationId xmlns:a16="http://schemas.microsoft.com/office/drawing/2014/main" xmlns="" id="{438442CF-1B82-4A10-87A1-614331CA498E}"/>
-              </a:ext>
-            </a:extLst>
-          </p:cNvPr>
-          <p:cNvSpPr txBox="1"/>
-          <p:nvPr/>
-        </p:nvSpPr>
-        <p:spPr>
-          <a:xfrm>
-            <a:off x="1019114" y="3064056"/>
-            <a:ext cx="10153772" cy="707886"/>
-          </a:xfrm>
-          <a:prstGeom prst="rect">
-            <a:avLst/>
-          </a:prstGeom>
-          <a:solidFill>
-            <a:schemeClr val="accent2">
-              <a:lumMod val="40000"/>
-              <a:lumOff val="60000"/>
-            </a:schemeClr>
-          </a:solidFill>
-        </p:spPr>
-        <p:txBody>
-          <a:bodyPr wrap="square" rtlCol="0">
-            <a:spAutoFit/>
-          </a:bodyPr>
-          <a:lstStyle/>
-          <a:p>
-            <a:r>
-              <a:rPr lang="en-GB" sz="2000" dirty="0" smtClean="0">
-                <a:latin typeface="Times New Roman" panose="02020603050405020304" pitchFamily="18" charset="0"/>
-                <a:cs typeface="Times New Roman" panose="02020603050405020304" pitchFamily="18" charset="0"/>
-              </a:rPr>
-              <a:t>Where</a:t>
-            </a:r>
-            <a:r>
-              <a:rPr lang="en-GB" sz="2000" b="1" dirty="0" smtClean="0">
-                <a:latin typeface="Times New Roman" panose="02020603050405020304" pitchFamily="18" charset="0"/>
-                <a:cs typeface="Times New Roman" panose="02020603050405020304" pitchFamily="18" charset="0"/>
-              </a:rPr>
-              <a:t> Q</a:t>
-            </a:r>
-            <a:r>
-              <a:rPr lang="en-GB" sz="2000" dirty="0" smtClean="0">
-                <a:latin typeface="Times New Roman" panose="02020603050405020304" pitchFamily="18" charset="0"/>
-                <a:cs typeface="Times New Roman" panose="02020603050405020304" pitchFamily="18" charset="0"/>
-              </a:rPr>
-              <a:t> is the </a:t>
-            </a:r>
-            <a:r>
-              <a:rPr lang="en-GB" sz="2000" b="1" dirty="0">
-                <a:latin typeface="Times New Roman" panose="02020603050405020304" pitchFamily="18" charset="0"/>
-                <a:cs typeface="Times New Roman" panose="02020603050405020304" pitchFamily="18" charset="0"/>
-              </a:rPr>
-              <a:t>PHRED</a:t>
-            </a:r>
-            <a:r>
-              <a:rPr lang="en-GB" sz="2000" dirty="0">
-                <a:latin typeface="Times New Roman" panose="02020603050405020304" pitchFamily="18" charset="0"/>
-                <a:cs typeface="Times New Roman" panose="02020603050405020304" pitchFamily="18" charset="0"/>
-              </a:rPr>
-              <a:t> </a:t>
-            </a:r>
-            <a:r>
-              <a:rPr lang="en-GB" sz="2000" b="1" dirty="0" smtClean="0">
-                <a:latin typeface="Times New Roman" panose="02020603050405020304" pitchFamily="18" charset="0"/>
-                <a:cs typeface="Times New Roman" panose="02020603050405020304" pitchFamily="18" charset="0"/>
-              </a:rPr>
-              <a:t>Score </a:t>
-            </a:r>
-            <a:r>
-              <a:rPr lang="en-GB" sz="2000" dirty="0" smtClean="0">
-                <a:latin typeface="Times New Roman" panose="02020603050405020304" pitchFamily="18" charset="0"/>
-                <a:cs typeface="Times New Roman" panose="02020603050405020304" pitchFamily="18" charset="0"/>
-              </a:rPr>
-              <a:t>for a given </a:t>
-            </a:r>
-            <a:r>
-              <a:rPr lang="en-GB" sz="2000" b="1" dirty="0" smtClean="0">
-                <a:latin typeface="Times New Roman" panose="02020603050405020304" pitchFamily="18" charset="0"/>
-                <a:cs typeface="Times New Roman" panose="02020603050405020304" pitchFamily="18" charset="0"/>
-              </a:rPr>
-              <a:t>Base Call </a:t>
-            </a:r>
-            <a:r>
-              <a:rPr lang="en-GB" sz="2000" dirty="0" smtClean="0">
-                <a:latin typeface="Times New Roman" panose="02020603050405020304" pitchFamily="18" charset="0"/>
-                <a:cs typeface="Times New Roman" panose="02020603050405020304" pitchFamily="18" charset="0"/>
-              </a:rPr>
-              <a:t>and </a:t>
-            </a:r>
-            <a:r>
-              <a:rPr lang="en-GB" sz="2000" b="1" dirty="0" smtClean="0">
-                <a:latin typeface="Times New Roman" panose="02020603050405020304" pitchFamily="18" charset="0"/>
-                <a:cs typeface="Times New Roman" panose="02020603050405020304" pitchFamily="18" charset="0"/>
-              </a:rPr>
-              <a:t>P </a:t>
-            </a:r>
-            <a:r>
-              <a:rPr lang="en-GB" sz="2000" dirty="0" smtClean="0">
-                <a:latin typeface="Times New Roman" panose="02020603050405020304" pitchFamily="18" charset="0"/>
-                <a:cs typeface="Times New Roman" panose="02020603050405020304" pitchFamily="18" charset="0"/>
-              </a:rPr>
-              <a:t>is the estimated </a:t>
-            </a:r>
-            <a:r>
-              <a:rPr lang="en-GB" sz="2000" b="1" dirty="0" smtClean="0">
-                <a:latin typeface="Times New Roman" panose="02020603050405020304" pitchFamily="18" charset="0"/>
-                <a:cs typeface="Times New Roman" panose="02020603050405020304" pitchFamily="18" charset="0"/>
-              </a:rPr>
-              <a:t>Probability of Error </a:t>
-            </a:r>
-            <a:r>
-              <a:rPr lang="en-GB" sz="2000" dirty="0" smtClean="0">
-                <a:latin typeface="Times New Roman" panose="02020603050405020304" pitchFamily="18" charset="0"/>
-                <a:cs typeface="Times New Roman" panose="02020603050405020304" pitchFamily="18" charset="0"/>
-              </a:rPr>
-              <a:t>for that </a:t>
-            </a:r>
-            <a:r>
-              <a:rPr lang="en-GB" sz="2000" b="1" dirty="0" smtClean="0">
-                <a:latin typeface="Times New Roman" panose="02020603050405020304" pitchFamily="18" charset="0"/>
-                <a:cs typeface="Times New Roman" panose="02020603050405020304" pitchFamily="18" charset="0"/>
-              </a:rPr>
-              <a:t>Base Call</a:t>
-            </a:r>
-            <a:r>
-              <a:rPr lang="en-GB" sz="2000" dirty="0" smtClean="0">
-                <a:latin typeface="Times New Roman" panose="02020603050405020304" pitchFamily="18" charset="0"/>
-                <a:cs typeface="Times New Roman" panose="02020603050405020304" pitchFamily="18" charset="0"/>
-              </a:rPr>
-              <a:t>, the following formula applies:</a:t>
-            </a:r>
-          </a:p>
-        </p:txBody>
-      </p:sp>
-      <p:sp>
-        <p:nvSpPr>
-          <p:cNvPr id="3" name="AutoShape 2" descr="Q=-10\ \log _{{10}}P"/>
-          <p:cNvSpPr>
-            <a:spLocks noChangeAspect="1" noChangeArrowheads="1"/>
-          </p:cNvSpPr>
-          <p:nvPr/>
-        </p:nvSpPr>
-        <p:spPr bwMode="auto">
-          <a:xfrm>
-            <a:off x="6313955" y="-144463"/>
-            <a:ext cx="304800" cy="304801"/>
-          </a:xfrm>
-          <a:prstGeom prst="rect">
-            <a:avLst/>
-          </a:prstGeom>
-          <a:noFill/>
-          <a:extLst>
-            <a:ext uri="{909E8E84-426E-40DD-AFC4-6F175D3DCCD1}">
-              <a14:hiddenFill xmlns:a14="http://schemas.microsoft.com/office/drawing/2010/main">
-                <a:solidFill>
-                  <a:srgbClr val="FFFFFF"/>
-                </a:solidFill>
-              </a14:hiddenFill>
-            </a:ext>
-          </a:extLst>
-        </p:spPr>
-        <p:txBody>
-          <a:bodyPr vert="horz" wrap="square" lIns="91440" tIns="45720" rIns="91440" bIns="45720" numCol="1" anchor="t" anchorCtr="0" compatLnSpc="1">
-            <a:prstTxWarp prst="textNoShape">
-              <a:avLst/>
-            </a:prstTxWarp>
-          </a:bodyPr>
-          <a:lstStyle/>
-          <a:p>
-            <a:endParaRPr lang="en-GB"/>
-          </a:p>
-        </p:txBody>
-      </p:sp>
-      <p:sp>
-        <p:nvSpPr>
-          <p:cNvPr id="9" name="AutoShape 4" descr="Q=-10\ \log _{{10}}P"/>
-          <p:cNvSpPr>
-            <a:spLocks noChangeAspect="1" noChangeArrowheads="1"/>
-          </p:cNvSpPr>
-          <p:nvPr/>
-        </p:nvSpPr>
-        <p:spPr bwMode="auto">
-          <a:xfrm>
-            <a:off x="6313955" y="7937"/>
-            <a:ext cx="304800" cy="304801"/>
-          </a:xfrm>
-          <a:prstGeom prst="rect">
-            <a:avLst/>
-          </a:prstGeom>
-          <a:noFill/>
-          <a:extLst>
-            <a:ext uri="{909E8E84-426E-40DD-AFC4-6F175D3DCCD1}">
-              <a14:hiddenFill xmlns:a14="http://schemas.microsoft.com/office/drawing/2010/main">
-                <a:solidFill>
-                  <a:srgbClr val="FFFFFF"/>
-                </a:solidFill>
-              </a14:hiddenFill>
-            </a:ext>
-          </a:extLst>
-        </p:spPr>
-        <p:txBody>
-          <a:bodyPr vert="horz" wrap="square" lIns="91440" tIns="45720" rIns="91440" bIns="45720" numCol="1" anchor="t" anchorCtr="0" compatLnSpc="1">
-            <a:prstTxWarp prst="textNoShape">
-              <a:avLst/>
-            </a:prstTxWarp>
-          </a:bodyPr>
-          <a:lstStyle/>
-          <a:p>
-            <a:endParaRPr lang="en-GB"/>
-          </a:p>
-        </p:txBody>
-      </p:sp>
-      <p:sp>
-        <p:nvSpPr>
-          <p:cNvPr id="10" name="TextBox 9">
-            <a:extLst>
-              <a:ext uri="{FF2B5EF4-FFF2-40B4-BE49-F238E27FC236}">
-                <a16:creationId xmlns:a16="http://schemas.microsoft.com/office/drawing/2014/main" xmlns="" id="{438442CF-1B82-4A10-87A1-614331CA498E}"/>
-              </a:ext>
-            </a:extLst>
-          </p:cNvPr>
-          <p:cNvSpPr txBox="1"/>
-          <p:nvPr/>
-        </p:nvSpPr>
-        <p:spPr>
-          <a:xfrm>
-            <a:off x="1808073" y="5451963"/>
-            <a:ext cx="5599641" cy="400110"/>
-          </a:xfrm>
-          <a:prstGeom prst="rect">
-            <a:avLst/>
-          </a:prstGeom>
-          <a:solidFill>
-            <a:schemeClr val="accent6">
-              <a:lumMod val="20000"/>
-              <a:lumOff val="80000"/>
-            </a:schemeClr>
-          </a:solidFill>
-        </p:spPr>
-        <p:txBody>
-          <a:bodyPr wrap="square" rtlCol="0">
-            <a:spAutoFit/>
-          </a:bodyPr>
-          <a:lstStyle/>
-          <a:p>
-            <a:r>
-              <a:rPr lang="en-GB" sz="2000" b="1" dirty="0" smtClean="0">
-                <a:latin typeface="Times New Roman" panose="02020603050405020304" pitchFamily="18" charset="0"/>
-                <a:cs typeface="Times New Roman" panose="02020603050405020304" pitchFamily="18" charset="0"/>
-              </a:rPr>
-              <a:t>P</a:t>
-            </a:r>
-            <a:r>
-              <a:rPr lang="en-GB" sz="2000" dirty="0" smtClean="0">
-                <a:latin typeface="Times New Roman" panose="02020603050405020304" pitchFamily="18" charset="0"/>
-                <a:cs typeface="Times New Roman" panose="02020603050405020304" pitchFamily="18" charset="0"/>
-              </a:rPr>
-              <a:t> is a </a:t>
-            </a:r>
-            <a:r>
-              <a:rPr lang="en-GB" sz="2000" b="1" dirty="0" smtClean="0">
-                <a:latin typeface="Times New Roman" panose="02020603050405020304" pitchFamily="18" charset="0"/>
-                <a:cs typeface="Times New Roman" panose="02020603050405020304" pitchFamily="18" charset="0"/>
-              </a:rPr>
-              <a:t>Probability</a:t>
-            </a:r>
-            <a:r>
-              <a:rPr lang="en-GB" sz="2000" dirty="0" smtClean="0">
-                <a:latin typeface="Times New Roman" panose="02020603050405020304" pitchFamily="18" charset="0"/>
-                <a:cs typeface="Times New Roman" panose="02020603050405020304" pitchFamily="18" charset="0"/>
-              </a:rPr>
-              <a:t> and so has </a:t>
-            </a:r>
-            <a:r>
-              <a:rPr lang="en-GB" sz="2000" b="1" dirty="0" smtClean="0">
-                <a:latin typeface="Times New Roman" panose="02020603050405020304" pitchFamily="18" charset="0"/>
-                <a:cs typeface="Times New Roman" panose="02020603050405020304" pitchFamily="18" charset="0"/>
-              </a:rPr>
-              <a:t>Range</a:t>
-            </a:r>
-            <a:r>
-              <a:rPr lang="en-GB" sz="2000" dirty="0" smtClean="0">
-                <a:latin typeface="Times New Roman" panose="02020603050405020304" pitchFamily="18" charset="0"/>
-                <a:cs typeface="Times New Roman" panose="02020603050405020304" pitchFamily="18" charset="0"/>
-              </a:rPr>
-              <a:t> </a:t>
-            </a:r>
-            <a:r>
-              <a:rPr lang="en-GB" sz="2000" b="1" dirty="0" smtClean="0">
-                <a:latin typeface="Times New Roman" panose="02020603050405020304" pitchFamily="18" charset="0"/>
-                <a:cs typeface="Times New Roman" panose="02020603050405020304" pitchFamily="18" charset="0"/>
-              </a:rPr>
-              <a:t>0 </a:t>
-            </a:r>
-            <a:r>
-              <a:rPr lang="en-GB" sz="2000" b="1" dirty="0" smtClean="0">
-                <a:latin typeface="Times New Roman" panose="02020603050405020304" pitchFamily="18" charset="0"/>
-                <a:cs typeface="Times New Roman" panose="02020603050405020304" pitchFamily="18" charset="0"/>
-                <a:sym typeface="Wingdings" panose="05000000000000000000" pitchFamily="2" charset="2"/>
-              </a:rPr>
-              <a:t></a:t>
-            </a:r>
-            <a:r>
-              <a:rPr lang="en-GB" sz="2000" b="1" dirty="0" smtClean="0">
-                <a:latin typeface="Times New Roman" panose="02020603050405020304" pitchFamily="18" charset="0"/>
-                <a:cs typeface="Times New Roman" panose="02020603050405020304" pitchFamily="18" charset="0"/>
-              </a:rPr>
-              <a:t> 1</a:t>
-            </a:r>
-            <a:endParaRPr lang="en-GB" sz="2000" b="1" dirty="0"/>
-          </a:p>
-        </p:txBody>
-      </p:sp>
-      <p:sp>
-        <p:nvSpPr>
-          <p:cNvPr id="11" name="TextBox 10">
-            <a:extLst>
-              <a:ext uri="{FF2B5EF4-FFF2-40B4-BE49-F238E27FC236}">
-                <a16:creationId xmlns:a16="http://schemas.microsoft.com/office/drawing/2014/main" xmlns="" id="{438442CF-1B82-4A10-87A1-614331CA498E}"/>
-              </a:ext>
-            </a:extLst>
-          </p:cNvPr>
-          <p:cNvSpPr txBox="1"/>
-          <p:nvPr/>
-        </p:nvSpPr>
-        <p:spPr>
-          <a:xfrm>
-            <a:off x="1797404" y="6184253"/>
-            <a:ext cx="5620978" cy="400110"/>
-          </a:xfrm>
-          <a:prstGeom prst="rect">
-            <a:avLst/>
-          </a:prstGeom>
-          <a:solidFill>
-            <a:schemeClr val="accent6">
-              <a:lumMod val="20000"/>
-              <a:lumOff val="80000"/>
-            </a:schemeClr>
-          </a:solidFill>
-        </p:spPr>
-        <p:txBody>
-          <a:bodyPr wrap="square" rtlCol="0">
-            <a:spAutoFit/>
-          </a:bodyPr>
-          <a:lstStyle/>
-          <a:p>
-            <a:r>
-              <a:rPr lang="en-GB" sz="2000" b="1" dirty="0">
-                <a:latin typeface="Times New Roman" panose="02020603050405020304" pitchFamily="18" charset="0"/>
-                <a:cs typeface="Times New Roman" panose="02020603050405020304" pitchFamily="18" charset="0"/>
-              </a:rPr>
-              <a:t>Q</a:t>
-            </a:r>
-            <a:r>
-              <a:rPr lang="en-GB" sz="2000" dirty="0" smtClean="0">
-                <a:latin typeface="Times New Roman" panose="02020603050405020304" pitchFamily="18" charset="0"/>
-                <a:cs typeface="Times New Roman" panose="02020603050405020304" pitchFamily="18" charset="0"/>
-              </a:rPr>
-              <a:t> is a function of </a:t>
-            </a:r>
-            <a:r>
-              <a:rPr lang="en-GB" sz="2000" b="1" dirty="0" smtClean="0">
-                <a:latin typeface="Times New Roman" panose="02020603050405020304" pitchFamily="18" charset="0"/>
-                <a:cs typeface="Times New Roman" panose="02020603050405020304" pitchFamily="18" charset="0"/>
-              </a:rPr>
-              <a:t>P</a:t>
-            </a:r>
-            <a:r>
-              <a:rPr lang="en-GB" sz="2000" dirty="0" smtClean="0">
-                <a:latin typeface="Times New Roman" panose="02020603050405020304" pitchFamily="18" charset="0"/>
-                <a:cs typeface="Times New Roman" panose="02020603050405020304" pitchFamily="18" charset="0"/>
-              </a:rPr>
-              <a:t> that has </a:t>
-            </a:r>
-            <a:r>
-              <a:rPr lang="en-GB" sz="2000" b="1" dirty="0" smtClean="0">
-                <a:latin typeface="Times New Roman" panose="02020603050405020304" pitchFamily="18" charset="0"/>
-                <a:cs typeface="Times New Roman" panose="02020603050405020304" pitchFamily="18" charset="0"/>
-              </a:rPr>
-              <a:t>Range</a:t>
-            </a:r>
-            <a:r>
-              <a:rPr lang="en-GB" sz="2000" dirty="0" smtClean="0">
-                <a:latin typeface="Times New Roman" panose="02020603050405020304" pitchFamily="18" charset="0"/>
-                <a:cs typeface="Times New Roman" panose="02020603050405020304" pitchFamily="18" charset="0"/>
-              </a:rPr>
-              <a:t> </a:t>
-            </a:r>
-            <a:r>
-              <a:rPr lang="en-GB" sz="2000" b="1" dirty="0" smtClean="0">
-                <a:latin typeface="Times New Roman" panose="02020603050405020304" pitchFamily="18" charset="0"/>
-                <a:cs typeface="Times New Roman" panose="02020603050405020304" pitchFamily="18" charset="0"/>
-              </a:rPr>
-              <a:t> 0 </a:t>
-            </a:r>
-            <a:r>
-              <a:rPr lang="en-GB" sz="2000" b="1" dirty="0" smtClean="0">
-                <a:latin typeface="Times New Roman" panose="02020603050405020304" pitchFamily="18" charset="0"/>
-                <a:cs typeface="Times New Roman" panose="02020603050405020304" pitchFamily="18" charset="0"/>
-                <a:sym typeface="Wingdings" panose="05000000000000000000" pitchFamily="2" charset="2"/>
-              </a:rPr>
-              <a:t></a:t>
-            </a:r>
-            <a:r>
-              <a:rPr lang="en-GB" sz="2000" b="1" dirty="0" smtClean="0">
-                <a:latin typeface="Times New Roman" panose="02020603050405020304" pitchFamily="18" charset="0"/>
-                <a:cs typeface="Times New Roman" panose="02020603050405020304" pitchFamily="18" charset="0"/>
-              </a:rPr>
-              <a:t> infinity</a:t>
-            </a:r>
-            <a:r>
-              <a:rPr lang="en-GB" sz="2000" dirty="0" smtClean="0">
-                <a:latin typeface="Times New Roman" panose="02020603050405020304" pitchFamily="18" charset="0"/>
-                <a:cs typeface="Times New Roman" panose="02020603050405020304" pitchFamily="18" charset="0"/>
-              </a:rPr>
-              <a:t>.</a:t>
-            </a:r>
-            <a:endParaRPr lang="en-GB" sz="2000" dirty="0"/>
-          </a:p>
-        </p:txBody>
-      </p:sp>
-      <p:sp>
-        <p:nvSpPr>
-          <p:cNvPr id="12" name="TextBox 11">
-            <a:extLst>
-              <a:ext uri="{FF2B5EF4-FFF2-40B4-BE49-F238E27FC236}">
-                <a16:creationId xmlns:a16="http://schemas.microsoft.com/office/drawing/2014/main" xmlns="" id="{438442CF-1B82-4A10-87A1-614331CA498E}"/>
-              </a:ext>
-            </a:extLst>
-          </p:cNvPr>
-          <p:cNvSpPr txBox="1"/>
-          <p:nvPr/>
-        </p:nvSpPr>
-        <p:spPr>
-          <a:xfrm>
-            <a:off x="1765004" y="4104121"/>
-            <a:ext cx="8661992" cy="1015663"/>
-          </a:xfrm>
-          <a:prstGeom prst="rect">
-            <a:avLst/>
-          </a:prstGeom>
-          <a:solidFill>
-            <a:srgbClr val="FFFF00"/>
-          </a:solidFill>
-        </p:spPr>
-        <p:txBody>
-          <a:bodyPr wrap="square" rtlCol="0">
-            <a:spAutoFit/>
-          </a:bodyPr>
-          <a:lstStyle/>
-          <a:p>
-            <a:pPr algn="ctr"/>
-            <a:r>
-              <a:rPr lang="en-GB" sz="6000" b="1" dirty="0" smtClean="0">
-                <a:latin typeface="Courier New" panose="02070309020205020404" pitchFamily="49" charset="0"/>
-                <a:cs typeface="Courier New" panose="02070309020205020404" pitchFamily="49" charset="0"/>
-              </a:rPr>
-              <a:t>Q =  -10 * log</a:t>
-            </a:r>
-            <a:r>
-              <a:rPr lang="en-GB" sz="6000" b="1" baseline="-25000" dirty="0" smtClean="0">
-                <a:latin typeface="Courier New" panose="02070309020205020404" pitchFamily="49" charset="0"/>
-                <a:cs typeface="Courier New" panose="02070309020205020404" pitchFamily="49" charset="0"/>
-              </a:rPr>
-              <a:t>10</a:t>
-            </a:r>
-            <a:r>
-              <a:rPr lang="en-GB" sz="6000" b="1" dirty="0" smtClean="0">
-                <a:latin typeface="Courier New" panose="02070309020205020404" pitchFamily="49" charset="0"/>
-                <a:cs typeface="Courier New" panose="02070309020205020404" pitchFamily="49" charset="0"/>
-              </a:rPr>
-              <a:t>(P)</a:t>
-            </a:r>
-            <a:endParaRPr lang="en-GB" sz="6000" b="1" dirty="0">
-              <a:latin typeface="Courier New" panose="02070309020205020404" pitchFamily="49" charset="0"/>
-              <a:cs typeface="Courier New" panose="02070309020205020404" pitchFamily="49" charset="0"/>
-            </a:endParaRPr>
-          </a:p>
-        </p:txBody>
-      </p:sp>
-      <p:sp>
-        <p:nvSpPr>
-          <p:cNvPr id="15" name="TextBox 14">
-            <a:extLst>
-              <a:ext uri="{FF2B5EF4-FFF2-40B4-BE49-F238E27FC236}">
-                <a16:creationId xmlns:a16="http://schemas.microsoft.com/office/drawing/2014/main" xmlns="" id="{E43AF4C5-CF5B-4E7E-B438-83CD70BE1265}"/>
-              </a:ext>
-            </a:extLst>
-          </p:cNvPr>
-          <p:cNvSpPr txBox="1"/>
-          <p:nvPr/>
-        </p:nvSpPr>
-        <p:spPr>
-          <a:xfrm>
-            <a:off x="2008528" y="0"/>
-            <a:ext cx="8174945" cy="729430"/>
-          </a:xfrm>
-          <a:prstGeom prst="rect">
-            <a:avLst/>
-          </a:prstGeom>
-          <a:solidFill>
-            <a:srgbClr val="FF0000"/>
-          </a:solidFill>
-        </p:spPr>
-        <p:txBody>
-          <a:bodyPr wrap="square" rtlCol="0" anchor="ctr">
-            <a:spAutoFit/>
-          </a:bodyPr>
-          <a:lstStyle/>
-          <a:p>
-            <a:pPr algn="ctr">
-              <a:lnSpc>
-                <a:spcPct val="115000"/>
-              </a:lnSpc>
-              <a:spcAft>
-                <a:spcPts val="1000"/>
-              </a:spcAft>
-            </a:pPr>
-            <a:r>
-              <a:rPr lang="en-GB" sz="3600" b="1" u="sng" dirty="0">
-                <a:solidFill>
-                  <a:srgbClr val="EEECE1"/>
-                </a:solidFill>
-                <a:highlight>
-                  <a:srgbClr val="FF0000"/>
-                </a:highlight>
-                <a:latin typeface="Courier New" pitchFamily="49" charset="0"/>
-                <a:ea typeface="Calibri"/>
-                <a:cs typeface="Courier New" pitchFamily="49" charset="0"/>
-              </a:rPr>
-              <a:t>Base </a:t>
-            </a:r>
-            <a:r>
-              <a:rPr lang="en-GB" sz="3600" b="1" u="sng" dirty="0" smtClean="0">
-                <a:solidFill>
-                  <a:schemeClr val="bg2"/>
-                </a:solidFill>
-                <a:highlight>
-                  <a:srgbClr val="FF0000"/>
-                </a:highlight>
-                <a:latin typeface="Courier New" pitchFamily="49" charset="0"/>
-                <a:ea typeface="Calibri"/>
-                <a:cs typeface="Courier New" pitchFamily="49" charset="0"/>
-              </a:rPr>
-              <a:t>Quality (</a:t>
-            </a:r>
-            <a:r>
-              <a:rPr lang="en-GB" sz="3600" dirty="0" smtClean="0">
-                <a:solidFill>
-                  <a:schemeClr val="bg2"/>
-                </a:solidFill>
-                <a:latin typeface="Times New Roman" panose="02020603050405020304" pitchFamily="18" charset="0"/>
-                <a:cs typeface="Times New Roman" panose="02020603050405020304" pitchFamily="18" charset="0"/>
-              </a:rPr>
-              <a:t> </a:t>
-            </a:r>
-            <a:r>
-              <a:rPr lang="en-GB" sz="3600" b="1" dirty="0" smtClean="0">
-                <a:solidFill>
-                  <a:schemeClr val="bg2"/>
-                </a:solidFill>
-                <a:latin typeface="Times New Roman" panose="02020603050405020304" pitchFamily="18" charset="0"/>
-                <a:cs typeface="Times New Roman" panose="02020603050405020304" pitchFamily="18" charset="0"/>
-                <a:hlinkClick r:id="rId3"/>
-              </a:rPr>
-              <a:t>PHRED</a:t>
-            </a:r>
-            <a:r>
-              <a:rPr lang="en-GB" sz="3600" b="1" dirty="0" smtClean="0">
-                <a:solidFill>
-                  <a:schemeClr val="bg2"/>
-                </a:solidFill>
-                <a:latin typeface="Times New Roman" panose="02020603050405020304" pitchFamily="18" charset="0"/>
-                <a:cs typeface="Times New Roman" panose="02020603050405020304" pitchFamily="18" charset="0"/>
-              </a:rPr>
-              <a:t>)</a:t>
-            </a:r>
-            <a:r>
-              <a:rPr lang="en-GB" sz="3600" dirty="0" smtClean="0">
-                <a:solidFill>
-                  <a:schemeClr val="bg2"/>
-                </a:solidFill>
-                <a:latin typeface="Times New Roman" panose="02020603050405020304" pitchFamily="18" charset="0"/>
-                <a:cs typeface="Times New Roman" panose="02020603050405020304" pitchFamily="18" charset="0"/>
-              </a:rPr>
-              <a:t> </a:t>
-            </a:r>
-            <a:r>
-              <a:rPr lang="en-GB" sz="3600" b="1" u="sng" dirty="0" smtClean="0">
-                <a:solidFill>
-                  <a:schemeClr val="bg2"/>
-                </a:solidFill>
-                <a:highlight>
-                  <a:srgbClr val="FF0000"/>
-                </a:highlight>
-                <a:latin typeface="Courier New" pitchFamily="49" charset="0"/>
-                <a:ea typeface="Calibri"/>
-                <a:cs typeface="Courier New" pitchFamily="49" charset="0"/>
-              </a:rPr>
-              <a:t> </a:t>
-            </a:r>
-            <a:r>
-              <a:rPr lang="en-GB" sz="3600" b="1" u="sng" dirty="0">
-                <a:solidFill>
-                  <a:schemeClr val="bg2"/>
-                </a:solidFill>
-                <a:highlight>
-                  <a:srgbClr val="FF0000"/>
-                </a:highlight>
-                <a:latin typeface="Courier New" pitchFamily="49" charset="0"/>
-                <a:ea typeface="Calibri"/>
-                <a:cs typeface="Courier New" pitchFamily="49" charset="0"/>
-              </a:rPr>
-              <a:t>Scores</a:t>
-            </a:r>
-            <a:endParaRPr lang="en-GB" sz="3600" dirty="0">
-              <a:solidFill>
-                <a:schemeClr val="bg2"/>
-              </a:solidFill>
-              <a:latin typeface="Courier New" pitchFamily="49" charset="0"/>
-              <a:ea typeface="Calibri"/>
-              <a:cs typeface="Courier New" pitchFamily="49" charset="0"/>
-            </a:endParaRPr>
-          </a:p>
-        </p:txBody>
-      </p:sp>
-    </p:spTree>
-    <p:extLst>
-      <p:ext uri="{BB962C8B-B14F-4D97-AF65-F5344CB8AC3E}">
-        <p14:creationId xmlns:p14="http://schemas.microsoft.com/office/powerpoint/2010/main" val="2463972691"/>
-      </p:ext>
-    </p:extLst>
-  </p:cSld>
-  <p:clrMapOvr>
-    <a:masterClrMapping/>
-  </p:clrMapOvr>
-  <p:timing>
-    <p:tnLst>
-      <p:par>
-        <p:cTn id="1" dur="indefinite" restart="never" nodeType="tmRoot">
-          <p:childTnLst>
-            <p:seq concurrent="1" nextAc="seek">
-              <p:cTn id="2" dur="indefinite" nodeType="mainSeq">
-                <p:childTnLst>
-                  <p:par>
-                    <p:cTn id="3" fill="hold">
-                      <p:stCondLst>
-                        <p:cond delay="indefinite"/>
-                        <p:cond evt="onBegin" delay="0">
-                          <p:tn val="2"/>
-                        </p:cond>
-                      </p:stCondLst>
-                      <p:childTnLst>
-                        <p:par>
-                          <p:cTn id="4" fill="hold">
-                            <p:stCondLst>
-                              <p:cond delay="0"/>
-                            </p:stCondLst>
-                            <p:childTnLst>
-                              <p:par>
-                                <p:cTn id="5" presetID="10" presetClass="exit" presetSubtype="0" fill="hold" grpId="0" nodeType="withEffect">
-                                  <p:stCondLst>
-                                    <p:cond delay="0"/>
-                                  </p:stCondLst>
-                                  <p:childTnLst>
-                                    <p:animEffect transition="out" filter="fade">
-                                      <p:cBhvr>
-                                        <p:cTn id="6" dur="1000"/>
-                                        <p:tgtEl>
-                                          <p:spTgt spid="14"/>
-                                        </p:tgtEl>
-                                      </p:cBhvr>
-                                    </p:animEffect>
-                                    <p:set>
-                                      <p:cBhvr>
-                                        <p:cTn id="7" dur="1" fill="hold">
-                                          <p:stCondLst>
-                                            <p:cond delay="999"/>
-                                          </p:stCondLst>
-                                        </p:cTn>
-                                        <p:tgtEl>
-                                          <p:spTgt spid="14"/>
-                                        </p:tgtEl>
-                                        <p:attrNameLst>
-                                          <p:attrName>style.visibility</p:attrName>
-                                        </p:attrNameLst>
-                                      </p:cBhvr>
-                                      <p:to>
-                                        <p:strVal val="hidden"/>
-                                      </p:to>
-                                    </p:set>
-                                  </p:childTnLst>
-                                </p:cTn>
-                              </p:par>
-                              <p:par>
-                                <p:cTn id="8" presetID="10" presetClass="entr" presetSubtype="0" fill="hold" grpId="0" nodeType="withEffect">
-                                  <p:stCondLst>
-                                    <p:cond delay="0"/>
-                                  </p:stCondLst>
-                                  <p:childTnLst>
-                                    <p:set>
-                                      <p:cBhvr>
-                                        <p:cTn id="9" dur="1" fill="hold">
-                                          <p:stCondLst>
-                                            <p:cond delay="0"/>
-                                          </p:stCondLst>
-                                        </p:cTn>
-                                        <p:tgtEl>
-                                          <p:spTgt spid="15"/>
-                                        </p:tgtEl>
-                                        <p:attrNameLst>
-                                          <p:attrName>style.visibility</p:attrName>
-                                        </p:attrNameLst>
-                                      </p:cBhvr>
-                                      <p:to>
-                                        <p:strVal val="visible"/>
-                                      </p:to>
-                                    </p:set>
-                                    <p:animEffect transition="in" filter="fade">
-                                      <p:cBhvr>
-                                        <p:cTn id="10" dur="2000"/>
-                                        <p:tgtEl>
-                                          <p:spTgt spid="15"/>
-                                        </p:tgtEl>
-                                      </p:cBhvr>
-                                    </p:animEffect>
-                                  </p:childTnLst>
-                                </p:cTn>
-                              </p:par>
-                            </p:childTnLst>
-                          </p:cTn>
-                        </p:par>
-                        <p:par>
-                          <p:cTn id="11" fill="hold">
-                            <p:stCondLst>
-                              <p:cond delay="2000"/>
-                            </p:stCondLst>
-                            <p:childTnLst>
-                              <p:par>
-                                <p:cTn id="12" presetID="22" presetClass="entr" presetSubtype="8" fill="hold" grpId="1" nodeType="afterEffect">
-                                  <p:stCondLst>
-                                    <p:cond delay="0"/>
-                                  </p:stCondLst>
-                                  <p:childTnLst>
-                                    <p:set>
-                                      <p:cBhvr>
-                                        <p:cTn id="13" dur="1" fill="hold">
-                                          <p:stCondLst>
-                                            <p:cond delay="0"/>
-                                          </p:stCondLst>
-                                        </p:cTn>
-                                        <p:tgtEl>
-                                          <p:spTgt spid="4"/>
-                                        </p:tgtEl>
-                                        <p:attrNameLst>
-                                          <p:attrName>style.visibility</p:attrName>
-                                        </p:attrNameLst>
-                                      </p:cBhvr>
-                                      <p:to>
-                                        <p:strVal val="visible"/>
-                                      </p:to>
-                                    </p:set>
-                                    <p:animEffect transition="in" filter="wipe(left)">
-                                      <p:cBhvr>
-                                        <p:cTn id="14" dur="2300"/>
-                                        <p:tgtEl>
-                                          <p:spTgt spid="4"/>
-                                        </p:tgtEl>
-                                      </p:cBhvr>
-                                    </p:animEffect>
-                                  </p:childTnLst>
-                                </p:cTn>
-                              </p:par>
-                            </p:childTnLst>
-                          </p:cTn>
-                        </p:par>
-                      </p:childTnLst>
-                    </p:cTn>
-                  </p:par>
-                  <p:par>
-                    <p:cTn id="15" fill="hold">
-                      <p:stCondLst>
-                        <p:cond delay="indefinite"/>
-                      </p:stCondLst>
-                      <p:childTnLst>
-                        <p:par>
-                          <p:cTn id="16" fill="hold">
-                            <p:stCondLst>
-                              <p:cond delay="0"/>
-                            </p:stCondLst>
-                            <p:childTnLst>
-                              <p:par>
-                                <p:cTn id="17" presetID="22" presetClass="entr" presetSubtype="8" fill="hold" grpId="1" nodeType="clickEffect">
-                                  <p:stCondLst>
-                                    <p:cond delay="0"/>
-                                  </p:stCondLst>
-                                  <p:childTnLst>
-                                    <p:set>
-                                      <p:cBhvr>
-                                        <p:cTn id="18" dur="1" fill="hold">
-                                          <p:stCondLst>
-                                            <p:cond delay="0"/>
-                                          </p:stCondLst>
-                                        </p:cTn>
-                                        <p:tgtEl>
-                                          <p:spTgt spid="6"/>
-                                        </p:tgtEl>
-                                        <p:attrNameLst>
-                                          <p:attrName>style.visibility</p:attrName>
-                                        </p:attrNameLst>
-                                      </p:cBhvr>
-                                      <p:to>
-                                        <p:strVal val="visible"/>
-                                      </p:to>
-                                    </p:set>
-                                    <p:animEffect transition="in" filter="wipe(left)">
-                                      <p:cBhvr>
-                                        <p:cTn id="19" dur="2000"/>
-                                        <p:tgtEl>
-                                          <p:spTgt spid="6"/>
-                                        </p:tgtEl>
-                                      </p:cBhvr>
-                                    </p:animEffect>
-                                  </p:childTnLst>
-                                </p:cTn>
-                              </p:par>
-                              <p:par>
-                                <p:cTn id="20" presetID="9" presetClass="emph" presetSubtype="0" grpId="0" nodeType="withEffect">
-                                  <p:stCondLst>
-                                    <p:cond delay="0"/>
-                                  </p:stCondLst>
-                                  <p:childTnLst>
-                                    <p:set>
-                                      <p:cBhvr rctx="PPT">
-                                        <p:cTn id="21" dur="indefinite"/>
-                                        <p:tgtEl>
-                                          <p:spTgt spid="4"/>
-                                        </p:tgtEl>
-                                        <p:attrNameLst>
-                                          <p:attrName>style.opacity</p:attrName>
-                                        </p:attrNameLst>
-                                      </p:cBhvr>
-                                      <p:to>
-                                        <p:strVal val="0.25"/>
-                                      </p:to>
-                                    </p:set>
-                                    <p:animEffect filter="image" prLst="opacity: 0.25">
-                                      <p:cBhvr rctx="IE">
-                                        <p:cTn id="22" dur="indefinite"/>
-                                        <p:tgtEl>
-                                          <p:spTgt spid="4"/>
-                                        </p:tgtEl>
-                                      </p:cBhvr>
-                                    </p:animEffect>
-                                  </p:childTnLst>
-                                </p:cTn>
-                              </p:par>
-                            </p:childTnLst>
-                          </p:cTn>
-                        </p:par>
-                      </p:childTnLst>
-                    </p:cTn>
-                  </p:par>
-                  <p:par>
-                    <p:cTn id="23" fill="hold">
-                      <p:stCondLst>
-                        <p:cond delay="indefinite"/>
-                      </p:stCondLst>
-                      <p:childTnLst>
-                        <p:par>
-                          <p:cTn id="24" fill="hold">
-                            <p:stCondLst>
-                              <p:cond delay="0"/>
-                            </p:stCondLst>
-                            <p:childTnLst>
-                              <p:par>
-                                <p:cTn id="25" presetID="22" presetClass="entr" presetSubtype="8" fill="hold" grpId="1" nodeType="clickEffect">
-                                  <p:stCondLst>
-                                    <p:cond delay="0"/>
-                                  </p:stCondLst>
-                                  <p:childTnLst>
-                                    <p:set>
-                                      <p:cBhvr>
-                                        <p:cTn id="26" dur="1" fill="hold">
-                                          <p:stCondLst>
-                                            <p:cond delay="0"/>
-                                          </p:stCondLst>
-                                        </p:cTn>
-                                        <p:tgtEl>
-                                          <p:spTgt spid="7"/>
-                                        </p:tgtEl>
-                                        <p:attrNameLst>
-                                          <p:attrName>style.visibility</p:attrName>
-                                        </p:attrNameLst>
-                                      </p:cBhvr>
-                                      <p:to>
-                                        <p:strVal val="visible"/>
-                                      </p:to>
-                                    </p:set>
-                                    <p:animEffect transition="in" filter="wipe(left)">
-                                      <p:cBhvr>
-                                        <p:cTn id="27" dur="2000"/>
-                                        <p:tgtEl>
-                                          <p:spTgt spid="7"/>
-                                        </p:tgtEl>
-                                      </p:cBhvr>
-                                    </p:animEffect>
-                                  </p:childTnLst>
-                                </p:cTn>
-                              </p:par>
-                              <p:par>
-                                <p:cTn id="28" presetID="9" presetClass="emph" presetSubtype="0" grpId="0" nodeType="withEffect">
-                                  <p:stCondLst>
-                                    <p:cond delay="0"/>
-                                  </p:stCondLst>
-                                  <p:childTnLst>
-                                    <p:set>
-                                      <p:cBhvr rctx="PPT">
-                                        <p:cTn id="29" dur="indefinite"/>
-                                        <p:tgtEl>
-                                          <p:spTgt spid="6"/>
-                                        </p:tgtEl>
-                                        <p:attrNameLst>
-                                          <p:attrName>style.opacity</p:attrName>
-                                        </p:attrNameLst>
-                                      </p:cBhvr>
-                                      <p:to>
-                                        <p:strVal val="0.25"/>
-                                      </p:to>
-                                    </p:set>
-                                    <p:animEffect filter="image" prLst="opacity: 0.25">
-                                      <p:cBhvr rctx="IE">
-                                        <p:cTn id="30" dur="indefinite"/>
-                                        <p:tgtEl>
-                                          <p:spTgt spid="6"/>
-                                        </p:tgtEl>
-                                      </p:cBhvr>
-                                    </p:animEffect>
-                                  </p:childTnLst>
-                                </p:cTn>
-                              </p:par>
-                            </p:childTnLst>
-                          </p:cTn>
-                        </p:par>
-                        <p:par>
-                          <p:cTn id="31" fill="hold">
-                            <p:stCondLst>
-                              <p:cond delay="2000"/>
-                            </p:stCondLst>
-                            <p:childTnLst>
-                              <p:par>
-                                <p:cTn id="32" presetID="22" presetClass="entr" presetSubtype="8" fill="hold" grpId="1" nodeType="afterEffect">
-                                  <p:stCondLst>
-                                    <p:cond delay="0"/>
-                                  </p:stCondLst>
-                                  <p:childTnLst>
-                                    <p:set>
-                                      <p:cBhvr>
-                                        <p:cTn id="33" dur="1" fill="hold">
-                                          <p:stCondLst>
-                                            <p:cond delay="0"/>
-                                          </p:stCondLst>
-                                        </p:cTn>
-                                        <p:tgtEl>
-                                          <p:spTgt spid="12"/>
-                                        </p:tgtEl>
-                                        <p:attrNameLst>
-                                          <p:attrName>style.visibility</p:attrName>
-                                        </p:attrNameLst>
-                                      </p:cBhvr>
-                                      <p:to>
-                                        <p:strVal val="visible"/>
-                                      </p:to>
-                                    </p:set>
-                                    <p:animEffect transition="in" filter="wipe(left)">
-                                      <p:cBhvr>
-                                        <p:cTn id="34" dur="2000"/>
-                                        <p:tgtEl>
-                                          <p:spTgt spid="12"/>
-                                        </p:tgtEl>
-                                      </p:cBhvr>
-                                    </p:animEffect>
-                                  </p:childTnLst>
-                                </p:cTn>
-                              </p:par>
-                            </p:childTnLst>
-                          </p:cTn>
-                        </p:par>
-                      </p:childTnLst>
-                    </p:cTn>
-                  </p:par>
-                  <p:par>
-                    <p:cTn id="35" fill="hold">
-                      <p:stCondLst>
-                        <p:cond delay="indefinite"/>
-                      </p:stCondLst>
-                      <p:childTnLst>
-                        <p:par>
-                          <p:cTn id="36" fill="hold">
-                            <p:stCondLst>
-                              <p:cond delay="0"/>
-                            </p:stCondLst>
-                            <p:childTnLst>
-                              <p:par>
-                                <p:cTn id="37" presetID="22" presetClass="entr" presetSubtype="8" fill="hold" grpId="1" nodeType="clickEffect">
-                                  <p:stCondLst>
-                                    <p:cond delay="0"/>
-                                  </p:stCondLst>
-                                  <p:childTnLst>
-                                    <p:set>
-                                      <p:cBhvr>
-                                        <p:cTn id="38" dur="1" fill="hold">
-                                          <p:stCondLst>
-                                            <p:cond delay="0"/>
-                                          </p:stCondLst>
-                                        </p:cTn>
-                                        <p:tgtEl>
-                                          <p:spTgt spid="10"/>
-                                        </p:tgtEl>
-                                        <p:attrNameLst>
-                                          <p:attrName>style.visibility</p:attrName>
-                                        </p:attrNameLst>
-                                      </p:cBhvr>
-                                      <p:to>
-                                        <p:strVal val="visible"/>
-                                      </p:to>
-                                    </p:set>
-                                    <p:animEffect transition="in" filter="wipe(left)">
-                                      <p:cBhvr>
-                                        <p:cTn id="39" dur="2000"/>
-                                        <p:tgtEl>
-                                          <p:spTgt spid="10"/>
-                                        </p:tgtEl>
-                                      </p:cBhvr>
-                                    </p:animEffect>
-                                  </p:childTnLst>
-                                </p:cTn>
-                              </p:par>
-                              <p:par>
-                                <p:cTn id="40" presetID="9" presetClass="emph" presetSubtype="0" grpId="0" nodeType="withEffect">
-                                  <p:stCondLst>
-                                    <p:cond delay="0"/>
-                                  </p:stCondLst>
-                                  <p:childTnLst>
-                                    <p:set>
-                                      <p:cBhvr rctx="PPT">
-                                        <p:cTn id="41" dur="indefinite"/>
-                                        <p:tgtEl>
-                                          <p:spTgt spid="7"/>
-                                        </p:tgtEl>
-                                        <p:attrNameLst>
-                                          <p:attrName>style.opacity</p:attrName>
-                                        </p:attrNameLst>
-                                      </p:cBhvr>
-                                      <p:to>
-                                        <p:strVal val="0.25"/>
-                                      </p:to>
-                                    </p:set>
-                                    <p:animEffect filter="image" prLst="opacity: 0.25">
-                                      <p:cBhvr rctx="IE">
-                                        <p:cTn id="42" dur="indefinite"/>
-                                        <p:tgtEl>
-                                          <p:spTgt spid="7"/>
-                                        </p:tgtEl>
-                                      </p:cBhvr>
-                                    </p:animEffect>
-                                  </p:childTnLst>
-                                </p:cTn>
-                              </p:par>
-                            </p:childTnLst>
-                          </p:cTn>
-                        </p:par>
-                      </p:childTnLst>
-                    </p:cTn>
-                  </p:par>
-                  <p:par>
-                    <p:cTn id="43" fill="hold">
-                      <p:stCondLst>
-                        <p:cond delay="indefinite"/>
-                      </p:stCondLst>
-                      <p:childTnLst>
-                        <p:par>
-                          <p:cTn id="44" fill="hold">
-                            <p:stCondLst>
-                              <p:cond delay="0"/>
-                            </p:stCondLst>
-                            <p:childTnLst>
-                              <p:par>
-                                <p:cTn id="45" presetID="22" presetClass="entr" presetSubtype="8" fill="hold" grpId="1" nodeType="clickEffect">
-                                  <p:stCondLst>
-                                    <p:cond delay="0"/>
-                                  </p:stCondLst>
-                                  <p:childTnLst>
-                                    <p:set>
-                                      <p:cBhvr>
-                                        <p:cTn id="46" dur="1" fill="hold">
-                                          <p:stCondLst>
-                                            <p:cond delay="0"/>
-                                          </p:stCondLst>
-                                        </p:cTn>
-                                        <p:tgtEl>
-                                          <p:spTgt spid="11"/>
-                                        </p:tgtEl>
-                                        <p:attrNameLst>
-                                          <p:attrName>style.visibility</p:attrName>
-                                        </p:attrNameLst>
-                                      </p:cBhvr>
-                                      <p:to>
-                                        <p:strVal val="visible"/>
-                                      </p:to>
-                                    </p:set>
-                                    <p:animEffect transition="in" filter="wipe(left)">
-                                      <p:cBhvr>
-                                        <p:cTn id="47" dur="2000"/>
-                                        <p:tgtEl>
-                                          <p:spTgt spid="11"/>
-                                        </p:tgtEl>
-                                      </p:cBhvr>
-                                    </p:animEffect>
-                                  </p:childTnLst>
-                                </p:cTn>
-                              </p:par>
-                            </p:childTnLst>
-                          </p:cTn>
-                        </p:par>
-                      </p:childTnLst>
-                    </p:cTn>
-                  </p:par>
-                </p:childTnLst>
-              </p:cTn>
-              <p:prevCondLst>
-                <p:cond evt="onPrev" delay="0">
-                  <p:tgtEl>
-                    <p:sldTgt/>
-                  </p:tgtEl>
-                </p:cond>
-              </p:prevCondLst>
-              <p:nextCondLst>
-                <p:cond evt="onNext" delay="0">
-                  <p:tgtEl>
-                    <p:sldTgt/>
-                  </p:tgtEl>
-                </p:cond>
-              </p:nextCondLst>
-            </p:seq>
-          </p:childTnLst>
-        </p:cTn>
-      </p:par>
-    </p:tnLst>
-    <p:bldLst>
-      <p:bldP spid="14" grpId="0" animBg="1"/>
-      <p:bldP spid="4" grpId="0" animBg="1"/>
-      <p:bldP spid="4" grpId="1" animBg="1"/>
-      <p:bldP spid="6" grpId="0" animBg="1"/>
-      <p:bldP spid="6" grpId="1" animBg="1"/>
-      <p:bldP spid="7" grpId="0" animBg="1"/>
-      <p:bldP spid="7" grpId="1" animBg="1"/>
-      <p:bldP spid="10" grpId="1" animBg="1"/>
-      <p:bldP spid="11" grpId="1" animBg="1"/>
-      <p:bldP spid="12" grpId="1" animBg="1"/>
-      <p:bldP spid="15" grpId="0" animBg="1"/>
-    </p:bldLst>
-  </p:timing>
-</p:sld>
-</file>
-
 <file path=ppt/theme/theme1.xml><?xml version="1.0" encoding="utf-8"?>
 <a:theme xmlns:a="http://schemas.openxmlformats.org/drawingml/2006/main" name="Office Theme">
   <a:themeElements>

</xml_diff>